<commit_message>
Add persona to presentation
</commit_message>
<xml_diff>
--- a/presentations/01_idea_emergency_alerter.pptx
+++ b/presentations/01_idea_emergency_alerter.pptx
@@ -1034,6 +1034,11 @@
         </p:txBody>
       </p:sp>
     </p:spTree>
+    <p:extLst>
+      <p:ext uri="{BB962C8B-B14F-4D97-AF65-F5344CB8AC3E}">
+        <p14:creationId xmlns:p14="http://schemas.microsoft.com/office/powerpoint/2010/main" val="4282590998"/>
+      </p:ext>
+    </p:extLst>
   </p:cSld>
   <p:clrMap bg1="lt1" tx1="dk1" bg2="dk2" tx2="lt2" accent1="accent1" accent2="accent2" accent3="accent3" accent4="accent4" accent5="accent5" accent6="accent6" hlink="hlink" folHlink="folHlink"/>
   <p:notesStyle>
@@ -19303,7 +19308,7 @@
           <p:cNvPr id="7" name="Shape 142">
             <a:extLst>
               <a:ext uri="{FF2B5EF4-FFF2-40B4-BE49-F238E27FC236}">
-                <a16:creationId xmlns:a16="http://schemas.microsoft.com/office/drawing/2014/main" id="{22578643-D4F2-4D65-8661-31443AF016F1}"/>
+                <a16:creationId xmlns:a16="http://schemas.microsoft.com/office/drawing/2014/main" xmlns="" id="{22578643-D4F2-4D65-8661-31443AF016F1}"/>
               </a:ext>
             </a:extLst>
           </p:cNvPr>
@@ -19705,7 +19710,7 @@
           <p:cNvPr id="3" name="Grafik 2">
             <a:extLst>
               <a:ext uri="{FF2B5EF4-FFF2-40B4-BE49-F238E27FC236}">
-                <a16:creationId xmlns:a16="http://schemas.microsoft.com/office/drawing/2014/main" id="{4222AC85-7A8C-484A-B9AA-70FFBC249CDC}"/>
+                <a16:creationId xmlns:a16="http://schemas.microsoft.com/office/drawing/2014/main" xmlns="" id="{4222AC85-7A8C-484A-B9AA-70FFBC249CDC}"/>
               </a:ext>
             </a:extLst>
           </p:cNvPr>
@@ -20286,7 +20291,7 @@
           <p:cNvPr id="1026" name="Picture 2" descr="https://images-na.ssl-images-amazon.com/images/I/41eWJUdMIzL._SX466_.jpg">
             <a:extLst>
               <a:ext uri="{FF2B5EF4-FFF2-40B4-BE49-F238E27FC236}">
-                <a16:creationId xmlns:a16="http://schemas.microsoft.com/office/drawing/2014/main" id="{9AAF2E4A-DBA7-41C1-A58B-8600AB53068B}"/>
+                <a16:creationId xmlns:a16="http://schemas.microsoft.com/office/drawing/2014/main" xmlns="" id="{9AAF2E4A-DBA7-41C1-A58B-8600AB53068B}"/>
               </a:ext>
             </a:extLst>
           </p:cNvPr>
@@ -20333,7 +20338,7 @@
           <p:cNvPr id="4" name="Textfeld 3">
             <a:extLst>
               <a:ext uri="{FF2B5EF4-FFF2-40B4-BE49-F238E27FC236}">
-                <a16:creationId xmlns:a16="http://schemas.microsoft.com/office/drawing/2014/main" id="{B444CF7D-B155-4C42-8DAB-6AD1965C0E88}"/>
+                <a16:creationId xmlns:a16="http://schemas.microsoft.com/office/drawing/2014/main" xmlns="" id="{B444CF7D-B155-4C42-8DAB-6AD1965C0E88}"/>
               </a:ext>
             </a:extLst>
           </p:cNvPr>
@@ -20505,7 +20510,7 @@
               <a:buChar char="●"/>
             </a:pPr>
             <a:r>
-              <a:rPr lang="de-AT"/>
+              <a:rPr lang="de-AT" dirty="0"/>
               <a:t>Susanne</a:t>
             </a:r>
           </a:p>
@@ -20520,8 +20525,256 @@
               <a:buChar char="-"/>
             </a:pPr>
             <a:r>
-              <a:rPr lang="de-AT"/>
-              <a:t>Susanne is an exchange student, who studies Industrial Design. She comes from United States of America and is very enthusiastic about getting to know new people and being part of the 6-months exchange program. She also likes to party.</a:t>
+              <a:rPr lang="de-AT" dirty="0"/>
+              <a:t>Susanne </a:t>
+            </a:r>
+            <a:r>
+              <a:rPr lang="de-AT" dirty="0" err="1"/>
+              <a:t>is</a:t>
+            </a:r>
+            <a:r>
+              <a:rPr lang="de-AT" dirty="0"/>
+              <a:t> an </a:t>
+            </a:r>
+            <a:r>
+              <a:rPr lang="de-AT" dirty="0" err="1"/>
+              <a:t>exchange</a:t>
+            </a:r>
+            <a:r>
+              <a:rPr lang="de-AT" dirty="0"/>
+              <a:t> </a:t>
+            </a:r>
+            <a:r>
+              <a:rPr lang="de-AT" dirty="0" err="1"/>
+              <a:t>student</a:t>
+            </a:r>
+            <a:r>
+              <a:rPr lang="de-AT" dirty="0"/>
+              <a:t>, </a:t>
+            </a:r>
+            <a:r>
+              <a:rPr lang="de-AT" dirty="0" err="1"/>
+              <a:t>who</a:t>
+            </a:r>
+            <a:r>
+              <a:rPr lang="de-AT" dirty="0"/>
+              <a:t> </a:t>
+            </a:r>
+            <a:r>
+              <a:rPr lang="de-AT" dirty="0" err="1"/>
+              <a:t>studies</a:t>
+            </a:r>
+            <a:r>
+              <a:rPr lang="de-AT" dirty="0"/>
+              <a:t> Industrial Design. </a:t>
+            </a:r>
+            <a:r>
+              <a:rPr lang="de-AT" dirty="0" err="1"/>
+              <a:t>She</a:t>
+            </a:r>
+            <a:r>
+              <a:rPr lang="de-AT" dirty="0"/>
+              <a:t> </a:t>
+            </a:r>
+            <a:r>
+              <a:rPr lang="de-AT" dirty="0" err="1"/>
+              <a:t>comes</a:t>
+            </a:r>
+            <a:r>
+              <a:rPr lang="de-AT" dirty="0"/>
+              <a:t> </a:t>
+            </a:r>
+            <a:r>
+              <a:rPr lang="de-AT" dirty="0" err="1"/>
+              <a:t>from</a:t>
+            </a:r>
+            <a:r>
+              <a:rPr lang="de-AT" dirty="0"/>
+              <a:t> United States </a:t>
+            </a:r>
+            <a:r>
+              <a:rPr lang="de-AT" dirty="0" err="1"/>
+              <a:t>of</a:t>
+            </a:r>
+            <a:r>
+              <a:rPr lang="de-AT" dirty="0"/>
+              <a:t> </a:t>
+            </a:r>
+            <a:r>
+              <a:rPr lang="de-AT" dirty="0" err="1"/>
+              <a:t>America</a:t>
+            </a:r>
+            <a:r>
+              <a:rPr lang="de-AT" dirty="0"/>
+              <a:t> </a:t>
+            </a:r>
+            <a:r>
+              <a:rPr lang="de-AT" dirty="0" err="1"/>
+              <a:t>and</a:t>
+            </a:r>
+            <a:r>
+              <a:rPr lang="de-AT" dirty="0"/>
+              <a:t> </a:t>
+            </a:r>
+            <a:r>
+              <a:rPr lang="de-AT" dirty="0" err="1"/>
+              <a:t>is</a:t>
+            </a:r>
+            <a:r>
+              <a:rPr lang="de-AT" dirty="0"/>
+              <a:t> </a:t>
+            </a:r>
+            <a:r>
+              <a:rPr lang="de-AT" dirty="0" err="1"/>
+              <a:t>very</a:t>
+            </a:r>
+            <a:r>
+              <a:rPr lang="de-AT" dirty="0"/>
+              <a:t> </a:t>
+            </a:r>
+            <a:r>
+              <a:rPr lang="de-AT" dirty="0" err="1"/>
+              <a:t>enthusiastic</a:t>
+            </a:r>
+            <a:r>
+              <a:rPr lang="de-AT" dirty="0"/>
+              <a:t> </a:t>
+            </a:r>
+            <a:r>
+              <a:rPr lang="de-AT" dirty="0" err="1"/>
+              <a:t>about</a:t>
+            </a:r>
+            <a:r>
+              <a:rPr lang="de-AT" dirty="0"/>
+              <a:t> </a:t>
+            </a:r>
+            <a:r>
+              <a:rPr lang="de-AT" dirty="0" err="1"/>
+              <a:t>getting</a:t>
+            </a:r>
+            <a:r>
+              <a:rPr lang="de-AT" dirty="0"/>
+              <a:t> </a:t>
+            </a:r>
+            <a:r>
+              <a:rPr lang="de-AT" dirty="0" err="1"/>
+              <a:t>to</a:t>
+            </a:r>
+            <a:r>
+              <a:rPr lang="de-AT" dirty="0"/>
+              <a:t> </a:t>
+            </a:r>
+            <a:r>
+              <a:rPr lang="de-AT" dirty="0" err="1"/>
+              <a:t>know</a:t>
+            </a:r>
+            <a:r>
+              <a:rPr lang="de-AT" dirty="0"/>
+              <a:t> </a:t>
+            </a:r>
+            <a:r>
+              <a:rPr lang="de-AT" dirty="0" err="1"/>
+              <a:t>new</a:t>
+            </a:r>
+            <a:r>
+              <a:rPr lang="de-AT" dirty="0"/>
+              <a:t> </a:t>
+            </a:r>
+            <a:r>
+              <a:rPr lang="de-AT" dirty="0" err="1"/>
+              <a:t>people</a:t>
+            </a:r>
+            <a:r>
+              <a:rPr lang="de-AT" dirty="0"/>
+              <a:t> </a:t>
+            </a:r>
+            <a:r>
+              <a:rPr lang="de-AT" dirty="0" err="1"/>
+              <a:t>and</a:t>
+            </a:r>
+            <a:r>
+              <a:rPr lang="de-AT" dirty="0"/>
+              <a:t> </a:t>
+            </a:r>
+            <a:r>
+              <a:rPr lang="de-AT" dirty="0" err="1"/>
+              <a:t>being</a:t>
+            </a:r>
+            <a:r>
+              <a:rPr lang="de-AT" dirty="0"/>
+              <a:t> </a:t>
+            </a:r>
+            <a:r>
+              <a:rPr lang="de-AT" dirty="0" err="1"/>
+              <a:t>part</a:t>
+            </a:r>
+            <a:r>
+              <a:rPr lang="de-AT" dirty="0"/>
+              <a:t> </a:t>
+            </a:r>
+            <a:r>
+              <a:rPr lang="de-AT" dirty="0" err="1"/>
+              <a:t>of</a:t>
+            </a:r>
+            <a:r>
+              <a:rPr lang="de-AT" dirty="0"/>
+              <a:t> </a:t>
+            </a:r>
+            <a:r>
+              <a:rPr lang="de-AT" dirty="0" err="1"/>
+              <a:t>the</a:t>
+            </a:r>
+            <a:r>
+              <a:rPr lang="de-AT" dirty="0"/>
+              <a:t> 6-months </a:t>
+            </a:r>
+            <a:r>
+              <a:rPr lang="de-AT" dirty="0" err="1"/>
+              <a:t>exchange</a:t>
+            </a:r>
+            <a:r>
+              <a:rPr lang="de-AT" dirty="0"/>
+              <a:t> </a:t>
+            </a:r>
+            <a:r>
+              <a:rPr lang="de-AT" dirty="0" err="1"/>
+              <a:t>program</a:t>
+            </a:r>
+            <a:r>
+              <a:rPr lang="de-AT" dirty="0"/>
+              <a:t>. </a:t>
+            </a:r>
+            <a:r>
+              <a:rPr lang="de-AT" dirty="0" err="1"/>
+              <a:t>She</a:t>
+            </a:r>
+            <a:r>
+              <a:rPr lang="de-AT" dirty="0"/>
+              <a:t> also </a:t>
+            </a:r>
+            <a:r>
+              <a:rPr lang="de-AT" dirty="0" err="1"/>
+              <a:t>likes</a:t>
+            </a:r>
+            <a:r>
+              <a:rPr lang="de-AT" dirty="0"/>
+              <a:t> </a:t>
+            </a:r>
+            <a:r>
+              <a:rPr lang="de-AT" dirty="0" err="1"/>
+              <a:t>to</a:t>
+            </a:r>
+            <a:r>
+              <a:rPr lang="de-AT" dirty="0"/>
+              <a:t> </a:t>
+            </a:r>
+            <a:r>
+              <a:rPr lang="de-AT" dirty="0" err="1"/>
+              <a:t>party</a:t>
+            </a:r>
+            <a:r>
+              <a:rPr lang="de-AT" dirty="0"/>
+              <a:t>.</a:t>
             </a:r>
           </a:p>
           <a:p>
@@ -20535,8 +20788,184 @@
               <a:buChar char="-"/>
             </a:pPr>
             <a:r>
-              <a:rPr lang="de-AT"/>
-              <a:t>She had unpleasant experience coming home from a party, when she run into the beautiful city park. Such an app would help Susanne a lot in case of trouble.</a:t>
+              <a:rPr lang="de-AT" dirty="0" err="1"/>
+              <a:t>She</a:t>
+            </a:r>
+            <a:r>
+              <a:rPr lang="de-AT" dirty="0"/>
+              <a:t> </a:t>
+            </a:r>
+            <a:r>
+              <a:rPr lang="de-AT" dirty="0" err="1"/>
+              <a:t>had</a:t>
+            </a:r>
+            <a:r>
+              <a:rPr lang="de-AT" dirty="0"/>
+              <a:t> </a:t>
+            </a:r>
+            <a:r>
+              <a:rPr lang="de-AT" dirty="0" smtClean="0"/>
+              <a:t>an </a:t>
+            </a:r>
+            <a:r>
+              <a:rPr lang="de-AT" dirty="0" err="1" smtClean="0"/>
+              <a:t>unpleasant</a:t>
+            </a:r>
+            <a:r>
+              <a:rPr lang="de-AT" dirty="0" smtClean="0"/>
+              <a:t> </a:t>
+            </a:r>
+            <a:r>
+              <a:rPr lang="de-AT" dirty="0" err="1"/>
+              <a:t>experience</a:t>
+            </a:r>
+            <a:r>
+              <a:rPr lang="de-AT" dirty="0"/>
+              <a:t> </a:t>
+            </a:r>
+            <a:r>
+              <a:rPr lang="de-AT" dirty="0" err="1"/>
+              <a:t>coming</a:t>
+            </a:r>
+            <a:r>
+              <a:rPr lang="de-AT" dirty="0"/>
+              <a:t> </a:t>
+            </a:r>
+            <a:r>
+              <a:rPr lang="de-AT" dirty="0" err="1"/>
+              <a:t>home</a:t>
+            </a:r>
+            <a:r>
+              <a:rPr lang="de-AT" dirty="0"/>
+              <a:t> </a:t>
+            </a:r>
+            <a:r>
+              <a:rPr lang="de-AT" dirty="0" err="1"/>
+              <a:t>from</a:t>
+            </a:r>
+            <a:r>
+              <a:rPr lang="de-AT" dirty="0"/>
+              <a:t> a </a:t>
+            </a:r>
+            <a:r>
+              <a:rPr lang="de-AT" dirty="0" err="1"/>
+              <a:t>party</a:t>
+            </a:r>
+            <a:r>
+              <a:rPr lang="de-AT" dirty="0"/>
+              <a:t>, </a:t>
+            </a:r>
+            <a:r>
+              <a:rPr lang="de-AT" dirty="0" err="1"/>
+              <a:t>when</a:t>
+            </a:r>
+            <a:r>
+              <a:rPr lang="de-AT" dirty="0"/>
+              <a:t> </a:t>
+            </a:r>
+            <a:r>
+              <a:rPr lang="de-AT" dirty="0" err="1"/>
+              <a:t>she</a:t>
+            </a:r>
+            <a:r>
+              <a:rPr lang="de-AT" dirty="0"/>
+              <a:t> </a:t>
+            </a:r>
+            <a:r>
+              <a:rPr lang="de-AT" dirty="0" err="1"/>
+              <a:t>run</a:t>
+            </a:r>
+            <a:r>
+              <a:rPr lang="de-AT" dirty="0"/>
+              <a:t> </a:t>
+            </a:r>
+            <a:r>
+              <a:rPr lang="de-AT" dirty="0" err="1"/>
+              <a:t>into</a:t>
+            </a:r>
+            <a:r>
+              <a:rPr lang="de-AT" dirty="0"/>
+              <a:t> </a:t>
+            </a:r>
+            <a:r>
+              <a:rPr lang="de-AT" dirty="0" err="1"/>
+              <a:t>the</a:t>
+            </a:r>
+            <a:r>
+              <a:rPr lang="de-AT" dirty="0"/>
+              <a:t> </a:t>
+            </a:r>
+            <a:r>
+              <a:rPr lang="de-AT" dirty="0" err="1"/>
+              <a:t>beautiful</a:t>
+            </a:r>
+            <a:r>
+              <a:rPr lang="de-AT" dirty="0"/>
+              <a:t> </a:t>
+            </a:r>
+            <a:r>
+              <a:rPr lang="de-AT" dirty="0" err="1"/>
+              <a:t>city</a:t>
+            </a:r>
+            <a:r>
+              <a:rPr lang="de-AT" dirty="0"/>
+              <a:t> park. Such an </a:t>
+            </a:r>
+            <a:r>
+              <a:rPr lang="de-AT" dirty="0" err="1"/>
+              <a:t>app</a:t>
+            </a:r>
+            <a:r>
+              <a:rPr lang="de-AT" dirty="0"/>
+              <a:t> </a:t>
+            </a:r>
+            <a:r>
+              <a:rPr lang="de-AT" dirty="0" err="1"/>
+              <a:t>would</a:t>
+            </a:r>
+            <a:r>
+              <a:rPr lang="de-AT" dirty="0"/>
+              <a:t> </a:t>
+            </a:r>
+            <a:r>
+              <a:rPr lang="de-AT" dirty="0" err="1"/>
+              <a:t>help</a:t>
+            </a:r>
+            <a:r>
+              <a:rPr lang="de-AT" dirty="0"/>
+              <a:t> Susanne a </a:t>
+            </a:r>
+            <a:r>
+              <a:rPr lang="de-AT" dirty="0" err="1"/>
+              <a:t>lot</a:t>
+            </a:r>
+            <a:r>
+              <a:rPr lang="de-AT" dirty="0"/>
+              <a:t> in </a:t>
+            </a:r>
+            <a:r>
+              <a:rPr lang="de-AT" dirty="0" err="1"/>
+              <a:t>case</a:t>
+            </a:r>
+            <a:r>
+              <a:rPr lang="de-AT" dirty="0"/>
+              <a:t> </a:t>
+            </a:r>
+            <a:r>
+              <a:rPr lang="de-AT" dirty="0" err="1"/>
+              <a:t>of</a:t>
+            </a:r>
+            <a:r>
+              <a:rPr lang="de-AT" dirty="0"/>
+              <a:t> </a:t>
+            </a:r>
+            <a:r>
+              <a:rPr lang="de-AT" dirty="0" err="1"/>
+              <a:t>trouble</a:t>
+            </a:r>
+            <a:r>
+              <a:rPr lang="de-AT" dirty="0"/>
+              <a:t>.</a:t>
             </a:r>
           </a:p>
           <a:p>
@@ -20549,7 +20978,7 @@
               </a:spcBef>
               <a:buNone/>
             </a:pPr>
-            <a:endParaRPr/>
+            <a:endParaRPr dirty="0"/>
           </a:p>
           <a:p>
             <a:pPr marL="342900" marR="0" lvl="0" indent="-342900" algn="l" rtl="0">
@@ -20566,7 +20995,7 @@
               <a:buFont typeface="Arial"/>
               <a:buNone/>
             </a:pPr>
-            <a:endParaRPr/>
+            <a:endParaRPr dirty="0"/>
           </a:p>
         </p:txBody>
       </p:sp>
@@ -20732,6 +21161,47 @@
           </a:p>
         </p:txBody>
       </p:sp>
+      <p:pic>
+        <p:nvPicPr>
+          <p:cNvPr id="1026" name="Picture 2" descr="Image result for exchange student image"/>
+          <p:cNvPicPr>
+            <a:picLocks noChangeAspect="1" noChangeArrowheads="1"/>
+          </p:cNvPicPr>
+          <p:nvPr/>
+        </p:nvPicPr>
+        <p:blipFill>
+          <a:blip r:embed="rId3">
+            <a:extLst>
+              <a:ext uri="{28A0092B-C50C-407E-A947-70E740481C1C}">
+                <a14:useLocalDpi xmlns:a14="http://schemas.microsoft.com/office/drawing/2010/main" val="0"/>
+              </a:ext>
+            </a:extLst>
+          </a:blip>
+          <a:srcRect/>
+          <a:stretch>
+            <a:fillRect/>
+          </a:stretch>
+        </p:blipFill>
+        <p:spPr bwMode="auto">
+          <a:xfrm>
+            <a:off x="4962244" y="982353"/>
+            <a:ext cx="2619375" cy="1743076"/>
+          </a:xfrm>
+          <a:prstGeom prst="rect">
+            <a:avLst/>
+          </a:prstGeom>
+          <a:noFill/>
+          <a:extLst>
+            <a:ext uri="{909E8E84-426E-40DD-AFC4-6F175D3DCCD1}">
+              <a14:hiddenFill xmlns:a14="http://schemas.microsoft.com/office/drawing/2010/main">
+                <a:solidFill>
+                  <a:srgbClr val="FFFFFF"/>
+                </a:solidFill>
+              </a14:hiddenFill>
+            </a:ext>
+          </a:extLst>
+        </p:spPr>
+      </p:pic>
     </p:spTree>
   </p:cSld>
   <p:clrMapOvr>
@@ -20798,7 +21268,7 @@
               <a:buNone/>
             </a:pPr>
             <a:r>
-              <a:rPr lang="de-AT" sz="3200" b="1" i="0" u="none" strike="noStrike" cap="none">
+              <a:rPr lang="de-AT" sz="3200" b="1" i="0" u="none" strike="noStrike" cap="none" dirty="0" err="1">
                 <a:solidFill>
                   <a:schemeClr val="dk1"/>
                 </a:solidFill>
@@ -20807,7 +21277,19 @@
                 <a:cs typeface="Calibri"/>
                 <a:sym typeface="Calibri"/>
               </a:rPr>
-              <a:t>Personas/User Stories II</a:t>
+              <a:t>Personas</a:t>
+            </a:r>
+            <a:r>
+              <a:rPr lang="de-AT" sz="3200" b="1" i="0" u="none" strike="noStrike" cap="none" dirty="0">
+                <a:solidFill>
+                  <a:schemeClr val="dk1"/>
+                </a:solidFill>
+                <a:latin typeface="Calibri"/>
+                <a:ea typeface="Calibri"/>
+                <a:cs typeface="Calibri"/>
+                <a:sym typeface="Calibri"/>
+              </a:rPr>
+              <a:t>/User Stories II</a:t>
             </a:r>
           </a:p>
         </p:txBody>
@@ -20841,6 +21323,546 @@
           </a:bodyPr>
           <a:lstStyle/>
           <a:p>
+            <a:pPr marL="457200" lvl="0" indent="-381000">
+              <a:lnSpc>
+                <a:spcPct val="115000"/>
+              </a:lnSpc>
+              <a:spcBef>
+                <a:spcPts val="0"/>
+              </a:spcBef>
+              <a:buChar char="●"/>
+            </a:pPr>
+            <a:r>
+              <a:rPr lang="de-AT" dirty="0" smtClean="0"/>
+              <a:t>Klaus</a:t>
+            </a:r>
+            <a:endParaRPr lang="de-AT" dirty="0"/>
+          </a:p>
+          <a:p>
+            <a:pPr marL="914400" lvl="0" indent="-381000">
+              <a:lnSpc>
+                <a:spcPct val="115000"/>
+              </a:lnSpc>
+              <a:spcBef>
+                <a:spcPts val="0"/>
+              </a:spcBef>
+              <a:buChar char="-"/>
+            </a:pPr>
+            <a:r>
+              <a:rPr lang="de-AT" dirty="0" smtClean="0"/>
+              <a:t>Klaus </a:t>
+            </a:r>
+            <a:r>
+              <a:rPr lang="de-AT" dirty="0" err="1" smtClean="0"/>
+              <a:t>is</a:t>
+            </a:r>
+            <a:r>
+              <a:rPr lang="de-AT" dirty="0" smtClean="0"/>
+              <a:t> a </a:t>
+            </a:r>
+            <a:r>
+              <a:rPr lang="de-AT" dirty="0" err="1" smtClean="0"/>
+              <a:t>father</a:t>
+            </a:r>
+            <a:r>
+              <a:rPr lang="de-AT" dirty="0" smtClean="0"/>
+              <a:t> </a:t>
+            </a:r>
+            <a:r>
+              <a:rPr lang="de-AT" dirty="0" err="1" smtClean="0"/>
+              <a:t>of</a:t>
+            </a:r>
+            <a:r>
+              <a:rPr lang="de-AT" dirty="0" smtClean="0"/>
+              <a:t> </a:t>
+            </a:r>
+            <a:r>
+              <a:rPr lang="de-AT" dirty="0" err="1" smtClean="0"/>
+              <a:t>two</a:t>
+            </a:r>
+            <a:r>
+              <a:rPr lang="de-AT" dirty="0" smtClean="0"/>
+              <a:t> </a:t>
+            </a:r>
+            <a:r>
+              <a:rPr lang="de-AT" dirty="0" err="1" smtClean="0"/>
+              <a:t>children</a:t>
+            </a:r>
+            <a:r>
+              <a:rPr lang="de-AT" dirty="0"/>
+              <a:t> </a:t>
+            </a:r>
+            <a:r>
+              <a:rPr lang="de-AT" dirty="0" err="1" smtClean="0"/>
+              <a:t>and</a:t>
+            </a:r>
+            <a:r>
+              <a:rPr lang="de-AT" dirty="0" smtClean="0"/>
+              <a:t> </a:t>
+            </a:r>
+            <a:r>
+              <a:rPr lang="de-AT" dirty="0" err="1" smtClean="0"/>
+              <a:t>is</a:t>
+            </a:r>
+            <a:r>
+              <a:rPr lang="de-AT" dirty="0" smtClean="0"/>
+              <a:t> </a:t>
+            </a:r>
+            <a:r>
+              <a:rPr lang="de-AT" dirty="0" err="1" smtClean="0"/>
+              <a:t>very</a:t>
+            </a:r>
+            <a:r>
+              <a:rPr lang="de-AT" dirty="0" smtClean="0"/>
+              <a:t> </a:t>
+            </a:r>
+            <a:r>
+              <a:rPr lang="de-AT" dirty="0" err="1" smtClean="0"/>
+              <a:t>protective</a:t>
+            </a:r>
+            <a:r>
+              <a:rPr lang="de-AT" dirty="0" smtClean="0"/>
+              <a:t> </a:t>
+            </a:r>
+            <a:r>
+              <a:rPr lang="de-AT" dirty="0" err="1" smtClean="0"/>
+              <a:t>about</a:t>
+            </a:r>
+            <a:r>
+              <a:rPr lang="de-AT" dirty="0" smtClean="0"/>
+              <a:t> </a:t>
+            </a:r>
+            <a:r>
+              <a:rPr lang="de-AT" dirty="0" err="1" smtClean="0"/>
+              <a:t>them</a:t>
+            </a:r>
+            <a:r>
+              <a:rPr lang="de-AT" dirty="0" smtClean="0"/>
+              <a:t>. He </a:t>
+            </a:r>
+            <a:r>
+              <a:rPr lang="de-AT" dirty="0" err="1" smtClean="0"/>
+              <a:t>is</a:t>
+            </a:r>
+            <a:r>
+              <a:rPr lang="de-AT" dirty="0" smtClean="0"/>
+              <a:t> </a:t>
+            </a:r>
+            <a:r>
+              <a:rPr lang="de-AT" dirty="0" err="1" smtClean="0"/>
+              <a:t>always</a:t>
+            </a:r>
+            <a:r>
+              <a:rPr lang="de-AT" dirty="0" smtClean="0"/>
+              <a:t> </a:t>
+            </a:r>
+            <a:r>
+              <a:rPr lang="de-AT" dirty="0" err="1" smtClean="0"/>
+              <a:t>anxious</a:t>
+            </a:r>
+            <a:r>
+              <a:rPr lang="de-AT" dirty="0" smtClean="0"/>
+              <a:t> </a:t>
+            </a:r>
+            <a:r>
+              <a:rPr lang="de-AT" dirty="0" err="1" smtClean="0"/>
+              <a:t>that</a:t>
+            </a:r>
+            <a:r>
+              <a:rPr lang="de-AT" dirty="0" smtClean="0"/>
+              <a:t> </a:t>
+            </a:r>
+            <a:r>
+              <a:rPr lang="de-AT" dirty="0" err="1" smtClean="0"/>
+              <a:t>something</a:t>
+            </a:r>
+            <a:r>
+              <a:rPr lang="de-AT" dirty="0" smtClean="0"/>
+              <a:t> </a:t>
+            </a:r>
+            <a:r>
+              <a:rPr lang="de-AT" dirty="0" err="1" smtClean="0"/>
+              <a:t>could</a:t>
+            </a:r>
+            <a:r>
+              <a:rPr lang="de-AT" dirty="0" smtClean="0"/>
+              <a:t> happen </a:t>
+            </a:r>
+            <a:r>
+              <a:rPr lang="de-AT" dirty="0" err="1" smtClean="0"/>
+              <a:t>to</a:t>
+            </a:r>
+            <a:r>
+              <a:rPr lang="de-AT" dirty="0" smtClean="0"/>
+              <a:t> </a:t>
+            </a:r>
+            <a:r>
+              <a:rPr lang="de-AT" dirty="0" err="1" smtClean="0"/>
+              <a:t>them</a:t>
+            </a:r>
+            <a:r>
+              <a:rPr lang="de-AT" dirty="0" smtClean="0"/>
+              <a:t>. </a:t>
+            </a:r>
+            <a:r>
+              <a:rPr lang="de-AT" dirty="0" err="1" smtClean="0"/>
+              <a:t>Although</a:t>
+            </a:r>
+            <a:r>
+              <a:rPr lang="de-AT" dirty="0" smtClean="0"/>
+              <a:t> </a:t>
+            </a:r>
+            <a:r>
+              <a:rPr lang="de-AT" dirty="0" err="1" smtClean="0"/>
+              <a:t>they</a:t>
+            </a:r>
+            <a:r>
+              <a:rPr lang="de-AT" dirty="0" smtClean="0"/>
+              <a:t> </a:t>
+            </a:r>
+            <a:r>
+              <a:rPr lang="de-AT" dirty="0" err="1" smtClean="0"/>
+              <a:t>have</a:t>
+            </a:r>
+            <a:r>
+              <a:rPr lang="de-AT" dirty="0" smtClean="0"/>
+              <a:t> </a:t>
+            </a:r>
+            <a:r>
+              <a:rPr lang="de-AT" dirty="0" err="1" smtClean="0"/>
+              <a:t>smartphones</a:t>
+            </a:r>
+            <a:r>
+              <a:rPr lang="de-AT" dirty="0" smtClean="0"/>
+              <a:t> he </a:t>
+            </a:r>
+            <a:r>
+              <a:rPr lang="de-AT" dirty="0" err="1" smtClean="0"/>
+              <a:t>is</a:t>
+            </a:r>
+            <a:r>
+              <a:rPr lang="de-AT" dirty="0" smtClean="0"/>
+              <a:t> </a:t>
+            </a:r>
+            <a:r>
+              <a:rPr lang="de-AT" dirty="0" err="1" smtClean="0"/>
+              <a:t>worried</a:t>
+            </a:r>
+            <a:r>
+              <a:rPr lang="de-AT" dirty="0" smtClean="0"/>
+              <a:t> </a:t>
+            </a:r>
+            <a:r>
+              <a:rPr lang="de-AT" dirty="0" err="1" smtClean="0"/>
+              <a:t>they</a:t>
+            </a:r>
+            <a:r>
+              <a:rPr lang="de-AT" dirty="0" smtClean="0"/>
+              <a:t> </a:t>
+            </a:r>
+            <a:r>
+              <a:rPr lang="de-AT" dirty="0" err="1" smtClean="0"/>
+              <a:t>might</a:t>
+            </a:r>
+            <a:r>
+              <a:rPr lang="de-AT" dirty="0" smtClean="0"/>
+              <a:t> not </a:t>
+            </a:r>
+            <a:r>
+              <a:rPr lang="de-AT" dirty="0" err="1" smtClean="0"/>
+              <a:t>be</a:t>
+            </a:r>
+            <a:r>
+              <a:rPr lang="de-AT" dirty="0" smtClean="0"/>
+              <a:t> </a:t>
+            </a:r>
+            <a:r>
+              <a:rPr lang="de-AT" dirty="0" err="1" smtClean="0"/>
+              <a:t>able</a:t>
+            </a:r>
+            <a:r>
+              <a:rPr lang="de-AT" dirty="0" smtClean="0"/>
+              <a:t> </a:t>
+            </a:r>
+            <a:r>
+              <a:rPr lang="de-AT" dirty="0" err="1" smtClean="0"/>
+              <a:t>to</a:t>
+            </a:r>
+            <a:r>
+              <a:rPr lang="de-AT" dirty="0" smtClean="0"/>
+              <a:t> </a:t>
+            </a:r>
+            <a:r>
+              <a:rPr lang="de-AT" dirty="0" err="1" smtClean="0"/>
+              <a:t>contact</a:t>
+            </a:r>
+            <a:r>
+              <a:rPr lang="de-AT" dirty="0" smtClean="0"/>
+              <a:t> </a:t>
+            </a:r>
+            <a:r>
+              <a:rPr lang="de-AT" dirty="0" err="1" smtClean="0"/>
+              <a:t>him</a:t>
+            </a:r>
+            <a:r>
+              <a:rPr lang="de-AT" dirty="0" smtClean="0"/>
+              <a:t> </a:t>
+            </a:r>
+            <a:r>
+              <a:rPr lang="de-AT" dirty="0" err="1" smtClean="0"/>
+              <a:t>when</a:t>
+            </a:r>
+            <a:r>
+              <a:rPr lang="de-AT" dirty="0" smtClean="0"/>
+              <a:t> </a:t>
+            </a:r>
+            <a:r>
+              <a:rPr lang="de-AT" dirty="0" err="1" smtClean="0"/>
+              <a:t>they</a:t>
+            </a:r>
+            <a:r>
+              <a:rPr lang="de-AT" dirty="0" smtClean="0"/>
+              <a:t> </a:t>
+            </a:r>
+            <a:r>
+              <a:rPr lang="de-AT" dirty="0" err="1" smtClean="0"/>
+              <a:t>are</a:t>
+            </a:r>
+            <a:r>
+              <a:rPr lang="de-AT" dirty="0" smtClean="0"/>
+              <a:t> in </a:t>
+            </a:r>
+            <a:r>
+              <a:rPr lang="de-AT" dirty="0" err="1" smtClean="0"/>
+              <a:t>trouble</a:t>
+            </a:r>
+            <a:r>
+              <a:rPr lang="de-AT" dirty="0" smtClean="0"/>
+              <a:t>.</a:t>
+            </a:r>
+            <a:endParaRPr lang="de-AT" dirty="0"/>
+          </a:p>
+          <a:p>
+            <a:pPr marL="914400" lvl="0" indent="-381000">
+              <a:lnSpc>
+                <a:spcPct val="115000"/>
+              </a:lnSpc>
+              <a:spcBef>
+                <a:spcPts val="0"/>
+              </a:spcBef>
+              <a:buChar char="-"/>
+            </a:pPr>
+            <a:r>
+              <a:rPr lang="de-AT" dirty="0" err="1" smtClean="0"/>
+              <a:t>With</a:t>
+            </a:r>
+            <a:r>
+              <a:rPr lang="de-AT" dirty="0" smtClean="0"/>
+              <a:t> </a:t>
+            </a:r>
+            <a:r>
+              <a:rPr lang="de-AT" dirty="0" err="1" smtClean="0"/>
+              <a:t>the</a:t>
+            </a:r>
+            <a:r>
+              <a:rPr lang="de-AT" dirty="0" smtClean="0"/>
+              <a:t> Emergency Alerter </a:t>
+            </a:r>
+            <a:r>
+              <a:rPr lang="de-AT" dirty="0" err="1" smtClean="0"/>
+              <a:t>Smartwatch</a:t>
+            </a:r>
+            <a:r>
+              <a:rPr lang="de-AT" dirty="0" smtClean="0"/>
+              <a:t> </a:t>
+            </a:r>
+            <a:r>
+              <a:rPr lang="de-AT" dirty="0" err="1" smtClean="0"/>
+              <a:t>app</a:t>
+            </a:r>
+            <a:r>
+              <a:rPr lang="de-AT" dirty="0" smtClean="0"/>
+              <a:t>, </a:t>
+            </a:r>
+            <a:r>
+              <a:rPr lang="de-AT" dirty="0" err="1" smtClean="0"/>
+              <a:t>the</a:t>
+            </a:r>
+            <a:r>
+              <a:rPr lang="de-AT" dirty="0" smtClean="0"/>
+              <a:t> </a:t>
+            </a:r>
+            <a:r>
+              <a:rPr lang="de-AT" dirty="0" err="1" smtClean="0"/>
+              <a:t>children</a:t>
+            </a:r>
+            <a:r>
+              <a:rPr lang="de-AT" dirty="0" smtClean="0"/>
+              <a:t> </a:t>
+            </a:r>
+            <a:r>
+              <a:rPr lang="de-AT" dirty="0" err="1" smtClean="0"/>
+              <a:t>only</a:t>
+            </a:r>
+            <a:r>
+              <a:rPr lang="de-AT" dirty="0" smtClean="0"/>
+              <a:t> </a:t>
+            </a:r>
+            <a:r>
+              <a:rPr lang="de-AT" dirty="0" err="1" smtClean="0"/>
+              <a:t>would</a:t>
+            </a:r>
+            <a:r>
+              <a:rPr lang="de-AT" dirty="0" smtClean="0"/>
+              <a:t> </a:t>
+            </a:r>
+            <a:r>
+              <a:rPr lang="de-AT" dirty="0" err="1" smtClean="0"/>
+              <a:t>have</a:t>
+            </a:r>
+            <a:r>
+              <a:rPr lang="de-AT" dirty="0" smtClean="0"/>
+              <a:t> </a:t>
+            </a:r>
+            <a:r>
+              <a:rPr lang="de-AT" dirty="0" err="1" smtClean="0"/>
+              <a:t>to</a:t>
+            </a:r>
+            <a:r>
+              <a:rPr lang="de-AT" dirty="0" smtClean="0"/>
+              <a:t> </a:t>
+            </a:r>
+            <a:r>
+              <a:rPr lang="de-AT" dirty="0" err="1" smtClean="0"/>
+              <a:t>tap</a:t>
+            </a:r>
+            <a:r>
+              <a:rPr lang="de-AT" dirty="0" smtClean="0"/>
+              <a:t> </a:t>
+            </a:r>
+            <a:r>
+              <a:rPr lang="de-AT" dirty="0" err="1" smtClean="0"/>
+              <a:t>one</a:t>
+            </a:r>
+            <a:r>
+              <a:rPr lang="de-AT" dirty="0" smtClean="0"/>
+              <a:t> </a:t>
+            </a:r>
+            <a:r>
+              <a:rPr lang="de-AT" dirty="0" err="1" smtClean="0"/>
+              <a:t>button</a:t>
+            </a:r>
+            <a:r>
+              <a:rPr lang="de-AT" dirty="0" smtClean="0"/>
+              <a:t> </a:t>
+            </a:r>
+            <a:r>
+              <a:rPr lang="de-AT" dirty="0" err="1" smtClean="0"/>
+              <a:t>to</a:t>
+            </a:r>
+            <a:r>
+              <a:rPr lang="de-AT" dirty="0" smtClean="0"/>
+              <a:t> </a:t>
+            </a:r>
+            <a:r>
+              <a:rPr lang="de-AT" dirty="0" err="1" smtClean="0"/>
+              <a:t>instantly</a:t>
+            </a:r>
+            <a:r>
+              <a:rPr lang="de-AT" dirty="0" smtClean="0"/>
+              <a:t> </a:t>
+            </a:r>
+            <a:r>
+              <a:rPr lang="de-AT" dirty="0" err="1" smtClean="0"/>
+              <a:t>notify</a:t>
+            </a:r>
+            <a:r>
+              <a:rPr lang="de-AT" dirty="0" smtClean="0"/>
+              <a:t> </a:t>
+            </a:r>
+            <a:r>
+              <a:rPr lang="de-AT" dirty="0" err="1" smtClean="0"/>
+              <a:t>the</a:t>
+            </a:r>
+            <a:r>
+              <a:rPr lang="de-AT" dirty="0" smtClean="0"/>
+              <a:t> </a:t>
+            </a:r>
+            <a:r>
+              <a:rPr lang="de-AT" dirty="0" err="1" smtClean="0"/>
+              <a:t>police</a:t>
+            </a:r>
+            <a:r>
+              <a:rPr lang="de-AT" dirty="0" smtClean="0"/>
+              <a:t> </a:t>
+            </a:r>
+            <a:r>
+              <a:rPr lang="de-AT" dirty="0" err="1" smtClean="0"/>
+              <a:t>or</a:t>
+            </a:r>
+            <a:r>
+              <a:rPr lang="de-AT" dirty="0" smtClean="0"/>
+              <a:t> </a:t>
+            </a:r>
+            <a:r>
+              <a:rPr lang="de-AT" dirty="0" err="1" smtClean="0"/>
+              <a:t>their</a:t>
+            </a:r>
+            <a:r>
+              <a:rPr lang="de-AT" dirty="0" smtClean="0"/>
+              <a:t> </a:t>
+            </a:r>
+            <a:r>
+              <a:rPr lang="de-AT" dirty="0" err="1" smtClean="0"/>
+              <a:t>father</a:t>
+            </a:r>
+            <a:r>
+              <a:rPr lang="de-AT" dirty="0" smtClean="0"/>
+              <a:t>, </a:t>
+            </a:r>
+            <a:r>
+              <a:rPr lang="de-AT" dirty="0" err="1" smtClean="0"/>
+              <a:t>which</a:t>
+            </a:r>
+            <a:r>
+              <a:rPr lang="de-AT" dirty="0" smtClean="0"/>
+              <a:t> </a:t>
+            </a:r>
+            <a:r>
+              <a:rPr lang="de-AT" dirty="0" err="1" smtClean="0"/>
+              <a:t>would</a:t>
+            </a:r>
+            <a:r>
+              <a:rPr lang="de-AT" dirty="0"/>
+              <a:t> </a:t>
+            </a:r>
+            <a:r>
+              <a:rPr lang="de-AT" dirty="0" err="1" smtClean="0"/>
+              <a:t>help</a:t>
+            </a:r>
+            <a:r>
+              <a:rPr lang="de-AT" dirty="0" smtClean="0"/>
+              <a:t> Klaus relax a </a:t>
+            </a:r>
+            <a:r>
+              <a:rPr lang="de-AT" dirty="0" err="1" smtClean="0"/>
+              <a:t>little</a:t>
+            </a:r>
+            <a:r>
+              <a:rPr lang="de-AT" dirty="0" smtClean="0"/>
+              <a:t> </a:t>
+            </a:r>
+            <a:r>
+              <a:rPr lang="de-AT" dirty="0" err="1" smtClean="0"/>
+              <a:t>more</a:t>
+            </a:r>
+            <a:r>
+              <a:rPr lang="de-AT" dirty="0" smtClean="0"/>
+              <a:t>.</a:t>
+            </a:r>
+            <a:endParaRPr lang="de-AT" dirty="0"/>
+          </a:p>
+          <a:p>
             <a:pPr lvl="0" rtl="0">
               <a:lnSpc>
                 <a:spcPct val="115000"/>
@@ -20850,7 +21872,7 @@
               </a:spcBef>
               <a:buNone/>
             </a:pPr>
-            <a:endParaRPr/>
+            <a:endParaRPr dirty="0"/>
           </a:p>
         </p:txBody>
       </p:sp>
@@ -21016,6 +22038,60 @@
           </a:p>
         </p:txBody>
       </p:sp>
+      <p:pic>
+        <p:nvPicPr>
+          <p:cNvPr id="2051" name="Picture 3"/>
+          <p:cNvPicPr>
+            <a:picLocks noChangeAspect="1" noChangeArrowheads="1"/>
+          </p:cNvPicPr>
+          <p:nvPr/>
+        </p:nvPicPr>
+        <p:blipFill>
+          <a:blip r:embed="rId3">
+            <a:extLst>
+              <a:ext uri="{28A0092B-C50C-407E-A947-70E740481C1C}">
+                <a14:useLocalDpi xmlns:a14="http://schemas.microsoft.com/office/drawing/2010/main" val="0"/>
+              </a:ext>
+            </a:extLst>
+          </a:blip>
+          <a:srcRect/>
+          <a:stretch>
+            <a:fillRect/>
+          </a:stretch>
+        </p:blipFill>
+        <p:spPr bwMode="auto">
+          <a:xfrm>
+            <a:off x="4997254" y="981290"/>
+            <a:ext cx="2609260" cy="1742312"/>
+          </a:xfrm>
+          <a:prstGeom prst="rect">
+            <a:avLst/>
+          </a:prstGeom>
+          <a:noFill/>
+          <a:ln>
+            <a:noFill/>
+          </a:ln>
+          <a:extLst>
+            <a:ext uri="{909E8E84-426E-40DD-AFC4-6F175D3DCCD1}">
+              <a14:hiddenFill xmlns:a14="http://schemas.microsoft.com/office/drawing/2010/main">
+                <a:solidFill>
+                  <a:schemeClr val="accent1"/>
+                </a:solidFill>
+              </a14:hiddenFill>
+            </a:ext>
+            <a:ext uri="{91240B29-F687-4F45-9708-019B960494DF}">
+              <a14:hiddenLine xmlns:a14="http://schemas.microsoft.com/office/drawing/2010/main" w="9525">
+                <a:solidFill>
+                  <a:schemeClr val="tx1"/>
+                </a:solidFill>
+                <a:miter lim="800000"/>
+                <a:headEnd/>
+                <a:tailEnd/>
+              </a14:hiddenLine>
+            </a:ext>
+          </a:extLst>
+        </p:spPr>
+      </p:pic>
     </p:spTree>
   </p:cSld>
   <p:clrMapOvr>

</xml_diff>

<commit_message>
Add two more screens for call and SMS mode
</commit_message>
<xml_diff>
--- a/presentations/01_idea_emergency_alerter.pptx
+++ b/presentations/01_idea_emergency_alerter.pptx
@@ -5,7 +5,7 @@
     <p:sldMasterId id="2147483665" r:id="rId1"/>
   </p:sldMasterIdLst>
   <p:notesMasterIdLst>
-    <p:notesMasterId r:id="rId11"/>
+    <p:notesMasterId r:id="rId13"/>
   </p:notesMasterIdLst>
   <p:sldIdLst>
     <p:sldId id="256" r:id="rId2"/>
@@ -15,8 +15,10 @@
     <p:sldId id="259" r:id="rId6"/>
     <p:sldId id="260" r:id="rId7"/>
     <p:sldId id="261" r:id="rId8"/>
-    <p:sldId id="262" r:id="rId9"/>
-    <p:sldId id="263" r:id="rId10"/>
+    <p:sldId id="266" r:id="rId9"/>
+    <p:sldId id="267" r:id="rId10"/>
+    <p:sldId id="268" r:id="rId11"/>
+    <p:sldId id="263" r:id="rId12"/>
   </p:sldIdLst>
   <p:sldSz cx="9144000" cy="6858000" type="screen4x3"/>
   <p:notesSz cx="6858000" cy="9144000"/>
@@ -1237,6 +1239,208 @@
 </p:notes>
 </file>
 
+<file path=ppt/notesSlides/notesSlide10.xml><?xml version="1.0" encoding="utf-8"?>
+<p:notes xmlns:a="http://schemas.openxmlformats.org/drawingml/2006/main" xmlns:r="http://schemas.openxmlformats.org/officeDocument/2006/relationships" xmlns:p="http://schemas.openxmlformats.org/presentationml/2006/main" showMasterSp="0" showMasterPhAnim="0">
+  <p:cSld>
+    <p:spTree>
+      <p:nvGrpSpPr>
+        <p:cNvPr id="1" name="Shape 173"/>
+        <p:cNvGrpSpPr/>
+        <p:nvPr/>
+      </p:nvGrpSpPr>
+      <p:grpSpPr>
+        <a:xfrm>
+          <a:off x="0" y="0"/>
+          <a:ext cx="0" cy="0"/>
+          <a:chOff x="0" y="0"/>
+          <a:chExt cx="0" cy="0"/>
+        </a:xfrm>
+      </p:grpSpPr>
+      <p:sp>
+        <p:nvSpPr>
+          <p:cNvPr id="174" name="Shape 174"/>
+          <p:cNvSpPr txBox="1">
+            <a:spLocks noGrp="1"/>
+          </p:cNvSpPr>
+          <p:nvPr>
+            <p:ph type="body" idx="1"/>
+          </p:nvPr>
+        </p:nvSpPr>
+        <p:spPr>
+          <a:xfrm>
+            <a:off x="685800" y="4343400"/>
+            <a:ext cx="5486400" cy="4114800"/>
+          </a:xfrm>
+          <a:prstGeom prst="rect">
+            <a:avLst/>
+          </a:prstGeom>
+        </p:spPr>
+        <p:txBody>
+          <a:bodyPr wrap="square" lIns="91425" tIns="91425" rIns="91425" bIns="91425" anchor="t" anchorCtr="0">
+            <a:noAutofit/>
+          </a:bodyPr>
+          <a:lstStyle/>
+          <a:p>
+            <a:pPr lvl="0">
+              <a:spcBef>
+                <a:spcPts val="0"/>
+              </a:spcBef>
+              <a:buNone/>
+            </a:pPr>
+            <a:endParaRPr/>
+          </a:p>
+        </p:txBody>
+      </p:sp>
+      <p:sp>
+        <p:nvSpPr>
+          <p:cNvPr id="175" name="Shape 175"/>
+          <p:cNvSpPr>
+            <a:spLocks noGrp="1" noRot="1" noChangeAspect="1"/>
+          </p:cNvSpPr>
+          <p:nvPr>
+            <p:ph type="sldImg" idx="2"/>
+          </p:nvPr>
+        </p:nvSpPr>
+        <p:spPr>
+          <a:xfrm>
+            <a:off x="1143000" y="685800"/>
+            <a:ext cx="4572000" cy="3429000"/>
+          </a:xfrm>
+          <a:custGeom>
+            <a:avLst/>
+            <a:gdLst/>
+            <a:ahLst/>
+            <a:cxnLst/>
+            <a:rect l="0" t="0" r="0" b="0"/>
+            <a:pathLst>
+              <a:path w="120000" h="120000" extrusionOk="0">
+                <a:moveTo>
+                  <a:pt x="0" y="0"/>
+                </a:moveTo>
+                <a:lnTo>
+                  <a:pt x="120000" y="0"/>
+                </a:lnTo>
+                <a:lnTo>
+                  <a:pt x="120000" y="120000"/>
+                </a:lnTo>
+                <a:lnTo>
+                  <a:pt x="0" y="120000"/>
+                </a:lnTo>
+                <a:close/>
+              </a:path>
+            </a:pathLst>
+          </a:custGeom>
+        </p:spPr>
+      </p:sp>
+    </p:spTree>
+  </p:cSld>
+  <p:clrMapOvr>
+    <a:masterClrMapping/>
+  </p:clrMapOvr>
+</p:notes>
+</file>
+
+<file path=ppt/notesSlides/notesSlide11.xml><?xml version="1.0" encoding="utf-8"?>
+<p:notes xmlns:a="http://schemas.openxmlformats.org/drawingml/2006/main" xmlns:r="http://schemas.openxmlformats.org/officeDocument/2006/relationships" xmlns:p="http://schemas.openxmlformats.org/presentationml/2006/main" showMasterSp="0" showMasterPhAnim="0">
+  <p:cSld>
+    <p:spTree>
+      <p:nvGrpSpPr>
+        <p:cNvPr id="1" name="Shape 191"/>
+        <p:cNvGrpSpPr/>
+        <p:nvPr/>
+      </p:nvGrpSpPr>
+      <p:grpSpPr>
+        <a:xfrm>
+          <a:off x="0" y="0"/>
+          <a:ext cx="0" cy="0"/>
+          <a:chOff x="0" y="0"/>
+          <a:chExt cx="0" cy="0"/>
+        </a:xfrm>
+      </p:grpSpPr>
+      <p:sp>
+        <p:nvSpPr>
+          <p:cNvPr id="192" name="Shape 192"/>
+          <p:cNvSpPr txBox="1">
+            <a:spLocks noGrp="1"/>
+          </p:cNvSpPr>
+          <p:nvPr>
+            <p:ph type="body" idx="1"/>
+          </p:nvPr>
+        </p:nvSpPr>
+        <p:spPr>
+          <a:xfrm>
+            <a:off x="685800" y="4343400"/>
+            <a:ext cx="5486400" cy="4114800"/>
+          </a:xfrm>
+          <a:prstGeom prst="rect">
+            <a:avLst/>
+          </a:prstGeom>
+        </p:spPr>
+        <p:txBody>
+          <a:bodyPr wrap="square" lIns="91425" tIns="91425" rIns="91425" bIns="91425" anchor="t" anchorCtr="0">
+            <a:noAutofit/>
+          </a:bodyPr>
+          <a:lstStyle/>
+          <a:p>
+            <a:pPr lvl="0">
+              <a:spcBef>
+                <a:spcPts val="0"/>
+              </a:spcBef>
+              <a:buNone/>
+            </a:pPr>
+            <a:endParaRPr/>
+          </a:p>
+        </p:txBody>
+      </p:sp>
+      <p:sp>
+        <p:nvSpPr>
+          <p:cNvPr id="193" name="Shape 193"/>
+          <p:cNvSpPr>
+            <a:spLocks noGrp="1" noRot="1" noChangeAspect="1"/>
+          </p:cNvSpPr>
+          <p:nvPr>
+            <p:ph type="sldImg" idx="2"/>
+          </p:nvPr>
+        </p:nvSpPr>
+        <p:spPr>
+          <a:xfrm>
+            <a:off x="1143000" y="685800"/>
+            <a:ext cx="4572000" cy="3429000"/>
+          </a:xfrm>
+          <a:custGeom>
+            <a:avLst/>
+            <a:gdLst/>
+            <a:ahLst/>
+            <a:cxnLst/>
+            <a:rect l="0" t="0" r="0" b="0"/>
+            <a:pathLst>
+              <a:path w="120000" h="120000" extrusionOk="0">
+                <a:moveTo>
+                  <a:pt x="0" y="0"/>
+                </a:moveTo>
+                <a:lnTo>
+                  <a:pt x="120000" y="0"/>
+                </a:lnTo>
+                <a:lnTo>
+                  <a:pt x="120000" y="120000"/>
+                </a:lnTo>
+                <a:lnTo>
+                  <a:pt x="0" y="120000"/>
+                </a:lnTo>
+                <a:close/>
+              </a:path>
+            </a:pathLst>
+          </a:custGeom>
+        </p:spPr>
+      </p:sp>
+    </p:spTree>
+  </p:cSld>
+  <p:clrMapOvr>
+    <a:masterClrMapping/>
+  </p:clrMapOvr>
+</p:notes>
+</file>
+
 <file path=ppt/notesSlides/notesSlide2.xml><?xml version="1.0" encoding="utf-8"?>
 <p:notes xmlns:a="http://schemas.openxmlformats.org/drawingml/2006/main" xmlns:r="http://schemas.openxmlformats.org/officeDocument/2006/relationships" xmlns:p="http://schemas.openxmlformats.org/presentationml/2006/main" showMasterSp="0" showMasterPhAnim="0">
   <p:cSld>
@@ -1853,7 +2057,7 @@
   <p:cSld>
     <p:spTree>
       <p:nvGrpSpPr>
-        <p:cNvPr id="1" name="Shape 182"/>
+        <p:cNvPr id="1" name="Shape 173"/>
         <p:cNvGrpSpPr/>
         <p:nvPr/>
       </p:nvGrpSpPr>
@@ -1867,7 +2071,7 @@
       </p:grpSpPr>
       <p:sp>
         <p:nvSpPr>
-          <p:cNvPr id="183" name="Shape 183"/>
+          <p:cNvPr id="174" name="Shape 174"/>
           <p:cNvSpPr txBox="1">
             <a:spLocks noGrp="1"/>
           </p:cNvSpPr>
@@ -1902,7 +2106,7 @@
       </p:sp>
       <p:sp>
         <p:nvSpPr>
-          <p:cNvPr id="184" name="Shape 184"/>
+          <p:cNvPr id="175" name="Shape 175"/>
           <p:cNvSpPr>
             <a:spLocks noGrp="1" noRot="1" noChangeAspect="1"/>
           </p:cNvSpPr>
@@ -1954,7 +2158,7 @@
   <p:cSld>
     <p:spTree>
       <p:nvGrpSpPr>
-        <p:cNvPr id="1" name="Shape 191"/>
+        <p:cNvPr id="1" name="Shape 173"/>
         <p:cNvGrpSpPr/>
         <p:nvPr/>
       </p:nvGrpSpPr>
@@ -1968,7 +2172,7 @@
       </p:grpSpPr>
       <p:sp>
         <p:nvSpPr>
-          <p:cNvPr id="192" name="Shape 192"/>
+          <p:cNvPr id="174" name="Shape 174"/>
           <p:cNvSpPr txBox="1">
             <a:spLocks noGrp="1"/>
           </p:cNvSpPr>
@@ -2003,7 +2207,7 @@
       </p:sp>
       <p:sp>
         <p:nvSpPr>
-          <p:cNvPr id="193" name="Shape 193"/>
+          <p:cNvPr id="175" name="Shape 175"/>
           <p:cNvSpPr>
             <a:spLocks noGrp="1" noRot="1" noChangeAspect="1"/>
           </p:cNvSpPr>
@@ -18481,6 +18685,319 @@
 </p:sld>
 </file>
 
+<file path=ppt/slides/slide10.xml><?xml version="1.0" encoding="utf-8"?>
+<p:sld xmlns:a="http://schemas.openxmlformats.org/drawingml/2006/main" xmlns:r="http://schemas.openxmlformats.org/officeDocument/2006/relationships" xmlns:p="http://schemas.openxmlformats.org/presentationml/2006/main">
+  <p:cSld>
+    <p:spTree>
+      <p:nvGrpSpPr>
+        <p:cNvPr id="1" name="Shape 176"/>
+        <p:cNvGrpSpPr/>
+        <p:nvPr/>
+      </p:nvGrpSpPr>
+      <p:grpSpPr>
+        <a:xfrm>
+          <a:off x="0" y="0"/>
+          <a:ext cx="0" cy="0"/>
+          <a:chOff x="0" y="0"/>
+          <a:chExt cx="0" cy="0"/>
+        </a:xfrm>
+      </p:grpSpPr>
+      <p:sp>
+        <p:nvSpPr>
+          <p:cNvPr id="177" name="Shape 177"/>
+          <p:cNvSpPr txBox="1">
+            <a:spLocks noGrp="1"/>
+          </p:cNvSpPr>
+          <p:nvPr>
+            <p:ph type="dt" idx="10"/>
+          </p:nvPr>
+        </p:nvSpPr>
+        <p:spPr>
+          <a:xfrm>
+            <a:off x="264980" y="6356350"/>
+            <a:ext cx="2133600" cy="365125"/>
+          </a:xfrm>
+          <a:prstGeom prst="rect">
+            <a:avLst/>
+          </a:prstGeom>
+          <a:noFill/>
+          <a:ln>
+            <a:noFill/>
+          </a:ln>
+        </p:spPr>
+        <p:txBody>
+          <a:bodyPr wrap="square" lIns="91425" tIns="45700" rIns="91425" bIns="45700" anchor="ctr" anchorCtr="0">
+            <a:noAutofit/>
+          </a:bodyPr>
+          <a:lstStyle/>
+          <a:p>
+            <a:pPr marL="0" marR="0" lvl="0" indent="0" algn="l" rtl="0">
+              <a:spcBef>
+                <a:spcPts val="0"/>
+              </a:spcBef>
+              <a:buSzPct val="25000"/>
+              <a:buNone/>
+            </a:pPr>
+            <a:r>
+              <a:rPr lang="de-AT" sz="1000">
+                <a:solidFill>
+                  <a:srgbClr val="888888"/>
+                </a:solidFill>
+                <a:latin typeface="Calibri"/>
+                <a:ea typeface="Calibri"/>
+                <a:cs typeface="Calibri"/>
+                <a:sym typeface="Calibri"/>
+              </a:rPr>
+              <a:t>06.11.2017</a:t>
+            </a:r>
+          </a:p>
+        </p:txBody>
+      </p:sp>
+      <p:sp>
+        <p:nvSpPr>
+          <p:cNvPr id="178" name="Shape 178"/>
+          <p:cNvSpPr txBox="1">
+            <a:spLocks noGrp="1"/>
+          </p:cNvSpPr>
+          <p:nvPr>
+            <p:ph type="ftr" idx="11"/>
+          </p:nvPr>
+        </p:nvSpPr>
+        <p:spPr>
+          <a:xfrm>
+            <a:off x="3124200" y="6356350"/>
+            <a:ext cx="2895600" cy="365100"/>
+          </a:xfrm>
+          <a:prstGeom prst="rect">
+            <a:avLst/>
+          </a:prstGeom>
+          <a:noFill/>
+          <a:ln>
+            <a:noFill/>
+          </a:ln>
+        </p:spPr>
+        <p:txBody>
+          <a:bodyPr wrap="square" lIns="91425" tIns="45700" rIns="91425" bIns="45700" anchor="ctr" anchorCtr="0">
+            <a:noAutofit/>
+          </a:bodyPr>
+          <a:lstStyle/>
+          <a:p>
+            <a:pPr marL="0" marR="0" lvl="0" indent="0" algn="ctr" rtl="0">
+              <a:spcBef>
+                <a:spcPts val="0"/>
+              </a:spcBef>
+              <a:buSzPct val="25000"/>
+              <a:buNone/>
+            </a:pPr>
+            <a:r>
+              <a:rPr lang="de-AT" sz="1000">
+                <a:solidFill>
+                  <a:srgbClr val="888888"/>
+                </a:solidFill>
+                <a:latin typeface="Calibri"/>
+                <a:ea typeface="Calibri"/>
+                <a:cs typeface="Calibri"/>
+                <a:sym typeface="Calibri"/>
+              </a:rPr>
+              <a:t>IM16</a:t>
+            </a:r>
+          </a:p>
+        </p:txBody>
+      </p:sp>
+      <p:sp>
+        <p:nvSpPr>
+          <p:cNvPr id="179" name="Shape 179"/>
+          <p:cNvSpPr txBox="1">
+            <a:spLocks noGrp="1"/>
+          </p:cNvSpPr>
+          <p:nvPr>
+            <p:ph type="sldNum" idx="12"/>
+          </p:nvPr>
+        </p:nvSpPr>
+        <p:spPr>
+          <a:xfrm>
+            <a:off x="6738555" y="6356350"/>
+            <a:ext cx="2133600" cy="365125"/>
+          </a:xfrm>
+          <a:prstGeom prst="rect">
+            <a:avLst/>
+          </a:prstGeom>
+          <a:noFill/>
+          <a:ln>
+            <a:noFill/>
+          </a:ln>
+        </p:spPr>
+        <p:txBody>
+          <a:bodyPr wrap="square" lIns="91425" tIns="45700" rIns="91425" bIns="45700" anchor="ctr" anchorCtr="0">
+            <a:noAutofit/>
+          </a:bodyPr>
+          <a:lstStyle/>
+          <a:p>
+            <a:pPr marL="0" marR="0" lvl="0" indent="0" algn="r" rtl="0">
+              <a:spcBef>
+                <a:spcPts val="0"/>
+              </a:spcBef>
+              <a:buSzPct val="25000"/>
+              <a:buNone/>
+            </a:pPr>
+            <a:fld id="{00000000-1234-1234-1234-123412341234}" type="slidenum">
+              <a:rPr lang="de-AT" sz="1000">
+                <a:solidFill>
+                  <a:srgbClr val="888888"/>
+                </a:solidFill>
+                <a:latin typeface="Calibri"/>
+                <a:ea typeface="Calibri"/>
+                <a:cs typeface="Calibri"/>
+                <a:sym typeface="Calibri"/>
+              </a:rPr>
+              <a:t>10</a:t>
+            </a:fld>
+            <a:endParaRPr lang="de-AT" sz="1000">
+              <a:solidFill>
+                <a:srgbClr val="888888"/>
+              </a:solidFill>
+              <a:latin typeface="Calibri"/>
+              <a:ea typeface="Calibri"/>
+              <a:cs typeface="Calibri"/>
+              <a:sym typeface="Calibri"/>
+            </a:endParaRPr>
+          </a:p>
+        </p:txBody>
+      </p:sp>
+      <p:pic>
+        <p:nvPicPr>
+          <p:cNvPr id="2050" name="Picture 2" descr="C:\Users\michael.stifter\Downloads\Simulator Screen Shot - iPhone 8 Plus - 2017-11-05 at 21.08.31.png"/>
+          <p:cNvPicPr>
+            <a:picLocks noChangeAspect="1" noChangeArrowheads="1"/>
+          </p:cNvPicPr>
+          <p:nvPr/>
+        </p:nvPicPr>
+        <p:blipFill>
+          <a:blip r:embed="rId3">
+            <a:extLst>
+              <a:ext uri="{28A0092B-C50C-407E-A947-70E740481C1C}">
+                <a14:useLocalDpi xmlns:a14="http://schemas.microsoft.com/office/drawing/2010/main" val="0"/>
+              </a:ext>
+            </a:extLst>
+          </a:blip>
+          <a:srcRect/>
+          <a:stretch>
+            <a:fillRect/>
+          </a:stretch>
+        </p:blipFill>
+        <p:spPr bwMode="auto">
+          <a:xfrm>
+            <a:off x="3208070" y="974457"/>
+            <a:ext cx="2860956" cy="5088295"/>
+          </a:xfrm>
+          <a:prstGeom prst="rect">
+            <a:avLst/>
+          </a:prstGeom>
+          <a:noFill/>
+          <a:extLst>
+            <a:ext uri="{909E8E84-426E-40DD-AFC4-6F175D3DCCD1}">
+              <a14:hiddenFill xmlns:a14="http://schemas.microsoft.com/office/drawing/2010/main">
+                <a:solidFill>
+                  <a:srgbClr val="FFFFFF"/>
+                </a:solidFill>
+              </a14:hiddenFill>
+            </a:ext>
+          </a:extLst>
+        </p:spPr>
+      </p:pic>
+    </p:spTree>
+    <p:extLst>
+      <p:ext uri="{BB962C8B-B14F-4D97-AF65-F5344CB8AC3E}">
+        <p14:creationId xmlns:p14="http://schemas.microsoft.com/office/powerpoint/2010/main" val="3925748778"/>
+      </p:ext>
+    </p:extLst>
+  </p:cSld>
+  <p:clrMapOvr>
+    <a:masterClrMapping/>
+  </p:clrMapOvr>
+</p:sld>
+</file>
+
+<file path=ppt/slides/slide11.xml><?xml version="1.0" encoding="utf-8"?>
+<p:sld xmlns:a="http://schemas.openxmlformats.org/drawingml/2006/main" xmlns:r="http://schemas.openxmlformats.org/officeDocument/2006/relationships" xmlns:p="http://schemas.openxmlformats.org/presentationml/2006/main">
+  <p:cSld>
+    <p:spTree>
+      <p:nvGrpSpPr>
+        <p:cNvPr id="1" name="Shape 194"/>
+        <p:cNvGrpSpPr/>
+        <p:nvPr/>
+      </p:nvGrpSpPr>
+      <p:grpSpPr>
+        <a:xfrm>
+          <a:off x="0" y="0"/>
+          <a:ext cx="0" cy="0"/>
+          <a:chOff x="0" y="0"/>
+          <a:chExt cx="0" cy="0"/>
+        </a:xfrm>
+      </p:grpSpPr>
+      <p:sp>
+        <p:nvSpPr>
+          <p:cNvPr id="195" name="Shape 195"/>
+          <p:cNvSpPr txBox="1">
+            <a:spLocks noGrp="1"/>
+          </p:cNvSpPr>
+          <p:nvPr>
+            <p:ph type="ctrTitle"/>
+          </p:nvPr>
+        </p:nvSpPr>
+        <p:spPr>
+          <a:xfrm>
+            <a:off x="277586" y="1401884"/>
+            <a:ext cx="8596539" cy="1470025"/>
+          </a:xfrm>
+          <a:prstGeom prst="rect">
+            <a:avLst/>
+          </a:prstGeom>
+          <a:noFill/>
+          <a:ln>
+            <a:noFill/>
+          </a:ln>
+        </p:spPr>
+        <p:txBody>
+          <a:bodyPr wrap="square" lIns="91425" tIns="45700" rIns="91425" bIns="45700" anchor="t" anchorCtr="0">
+            <a:noAutofit/>
+          </a:bodyPr>
+          <a:lstStyle/>
+          <a:p>
+            <a:pPr marL="0" marR="0" lvl="0" indent="-254000" algn="l" rtl="0">
+              <a:spcBef>
+                <a:spcPts val="0"/>
+              </a:spcBef>
+              <a:buClr>
+                <a:schemeClr val="lt2"/>
+              </a:buClr>
+              <a:buSzPct val="100000"/>
+              <a:buFont typeface="Calibri"/>
+              <a:buNone/>
+            </a:pPr>
+            <a:r>
+              <a:rPr lang="de-AT" sz="4000" b="1" i="0" u="none" strike="noStrike" cap="none">
+                <a:solidFill>
+                  <a:schemeClr val="lt2"/>
+                </a:solidFill>
+                <a:latin typeface="Calibri"/>
+                <a:ea typeface="Calibri"/>
+                <a:cs typeface="Calibri"/>
+                <a:sym typeface="Calibri"/>
+              </a:rPr>
+              <a:t>Thank you for your attention</a:t>
+            </a:r>
+          </a:p>
+        </p:txBody>
+      </p:sp>
+    </p:spTree>
+  </p:cSld>
+  <p:clrMapOvr>
+    <a:masterClrMapping/>
+  </p:clrMapOvr>
+</p:sld>
+</file>
+
 <file path=ppt/slides/slide2.xml><?xml version="1.0" encoding="utf-8"?>
 <p:sld xmlns:a="http://schemas.openxmlformats.org/drawingml/2006/main" xmlns:r="http://schemas.openxmlformats.org/officeDocument/2006/relationships" xmlns:p="http://schemas.openxmlformats.org/presentationml/2006/main">
   <p:cSld>
@@ -18675,7 +19192,7 @@
             </a:r>
           </a:p>
           <a:p>
-            <a:pPr marL="342900" marR="0" lvl="0" indent="-342900" algn="l" rtl="0">
+            <a:pPr marR="0" lvl="0" algn="l" rtl="0">
               <a:spcBef>
                 <a:spcPts val="600"/>
               </a:spcBef>
@@ -18686,21 +19203,7 @@
                 <a:schemeClr val="accent1"/>
               </a:buClr>
               <a:buSzPct val="100000"/>
-              <a:buFont typeface="Arial"/>
-              <a:buChar char="•"/>
             </a:pPr>
-            <a:r>
-              <a:rPr lang="de-AT" sz="2400" b="0" i="0" u="none" strike="noStrike" cap="none" dirty="0" err="1">
-                <a:solidFill>
-                  <a:schemeClr val="dk1"/>
-                </a:solidFill>
-                <a:latin typeface="Calibri"/>
-                <a:ea typeface="Calibri"/>
-                <a:cs typeface="Calibri"/>
-                <a:sym typeface="Calibri"/>
-              </a:rPr>
-              <a:t>Results</a:t>
-            </a:r>
             <a:endParaRPr lang="de-AT" sz="2400" b="0" i="0" u="none" strike="noStrike" cap="none" dirty="0">
               <a:solidFill>
                 <a:schemeClr val="dk1"/>
@@ -19308,7 +19811,7 @@
           <p:cNvPr id="7" name="Shape 142">
             <a:extLst>
               <a:ext uri="{FF2B5EF4-FFF2-40B4-BE49-F238E27FC236}">
-                <a16:creationId xmlns:a16="http://schemas.microsoft.com/office/drawing/2014/main" xmlns="" id="{22578643-D4F2-4D65-8661-31443AF016F1}"/>
+                <a16:creationId xmlns="" xmlns:a16="http://schemas.microsoft.com/office/drawing/2014/main" id="{22578643-D4F2-4D65-8661-31443AF016F1}"/>
               </a:ext>
             </a:extLst>
           </p:cNvPr>
@@ -19710,7 +20213,7 @@
           <p:cNvPr id="3" name="Grafik 2">
             <a:extLst>
               <a:ext uri="{FF2B5EF4-FFF2-40B4-BE49-F238E27FC236}">
-                <a16:creationId xmlns:a16="http://schemas.microsoft.com/office/drawing/2014/main" xmlns="" id="{4222AC85-7A8C-484A-B9AA-70FFBC249CDC}"/>
+                <a16:creationId xmlns="" xmlns:a16="http://schemas.microsoft.com/office/drawing/2014/main" id="{4222AC85-7A8C-484A-B9AA-70FFBC249CDC}"/>
               </a:ext>
             </a:extLst>
           </p:cNvPr>
@@ -20291,7 +20794,7 @@
           <p:cNvPr id="1026" name="Picture 2" descr="https://images-na.ssl-images-amazon.com/images/I/41eWJUdMIzL._SX466_.jpg">
             <a:extLst>
               <a:ext uri="{FF2B5EF4-FFF2-40B4-BE49-F238E27FC236}">
-                <a16:creationId xmlns:a16="http://schemas.microsoft.com/office/drawing/2014/main" xmlns="" id="{9AAF2E4A-DBA7-41C1-A58B-8600AB53068B}"/>
+                <a16:creationId xmlns="" xmlns:a16="http://schemas.microsoft.com/office/drawing/2014/main" id="{9AAF2E4A-DBA7-41C1-A58B-8600AB53068B}"/>
               </a:ext>
             </a:extLst>
           </p:cNvPr>
@@ -20338,7 +20841,7 @@
           <p:cNvPr id="4" name="Textfeld 3">
             <a:extLst>
               <a:ext uri="{FF2B5EF4-FFF2-40B4-BE49-F238E27FC236}">
-                <a16:creationId xmlns:a16="http://schemas.microsoft.com/office/drawing/2014/main" xmlns="" id="{B444CF7D-B155-4C42-8DAB-6AD1965C0E88}"/>
+                <a16:creationId xmlns="" xmlns:a16="http://schemas.microsoft.com/office/drawing/2014/main" id="{B444CF7D-B155-4C42-8DAB-6AD1965C0E88}"/>
               </a:ext>
             </a:extLst>
           </p:cNvPr>
@@ -22294,35 +22797,8 @@
         </p:blipFill>
         <p:spPr>
           <a:xfrm>
-            <a:off x="691475" y="765938"/>
+            <a:off x="2603895" y="765938"/>
             <a:ext cx="3484976" cy="5538250"/>
-          </a:xfrm>
-          <a:prstGeom prst="rect">
-            <a:avLst/>
-          </a:prstGeom>
-          <a:noFill/>
-          <a:ln>
-            <a:noFill/>
-          </a:ln>
-        </p:spPr>
-      </p:pic>
-      <p:pic>
-        <p:nvPicPr>
-          <p:cNvPr id="181" name="Shape 181"/>
-          <p:cNvPicPr preferRelativeResize="0"/>
-          <p:nvPr/>
-        </p:nvPicPr>
-        <p:blipFill rotWithShape="1">
-          <a:blip r:embed="rId4">
-            <a:alphaModFix/>
-          </a:blip>
-          <a:srcRect t="-7210" b="7210"/>
-          <a:stretch/>
-        </p:blipFill>
-        <p:spPr>
-          <a:xfrm>
-            <a:off x="4831600" y="860200"/>
-            <a:ext cx="3306101" cy="5443973"/>
           </a:xfrm>
           <a:prstGeom prst="rect">
             <a:avLst/>
@@ -22346,7 +22822,7 @@
   <p:cSld>
     <p:spTree>
       <p:nvGrpSpPr>
-        <p:cNvPr id="1" name="Shape 185"/>
+        <p:cNvPr id="1" name="Shape 176"/>
         <p:cNvGrpSpPr/>
         <p:nvPr/>
       </p:nvGrpSpPr>
@@ -22360,117 +22836,7 @@
       </p:grpSpPr>
       <p:sp>
         <p:nvSpPr>
-          <p:cNvPr id="186" name="Shape 186"/>
-          <p:cNvSpPr txBox="1">
-            <a:spLocks noGrp="1"/>
-          </p:cNvSpPr>
-          <p:nvPr>
-            <p:ph type="title"/>
-          </p:nvPr>
-        </p:nvSpPr>
-        <p:spPr>
-          <a:xfrm>
-            <a:off x="269875" y="1090515"/>
-            <a:ext cx="8602280" cy="1143000"/>
-          </a:xfrm>
-          <a:prstGeom prst="rect">
-            <a:avLst/>
-          </a:prstGeom>
-          <a:noFill/>
-          <a:ln>
-            <a:noFill/>
-          </a:ln>
-        </p:spPr>
-        <p:txBody>
-          <a:bodyPr wrap="square" lIns="91425" tIns="45700" rIns="91425" bIns="45700" anchor="b" anchorCtr="0">
-            <a:noAutofit/>
-          </a:bodyPr>
-          <a:lstStyle/>
-          <a:p>
-            <a:pPr marL="0" marR="0" lvl="0" indent="-203200" algn="l" rtl="0">
-              <a:spcBef>
-                <a:spcPts val="0"/>
-              </a:spcBef>
-              <a:buClr>
-                <a:schemeClr val="dk1"/>
-              </a:buClr>
-              <a:buSzPct val="100000"/>
-              <a:buFont typeface="Calibri"/>
-              <a:buNone/>
-            </a:pPr>
-            <a:r>
-              <a:rPr lang="de-AT" sz="3200" b="1" i="0" u="none" strike="noStrike" cap="none">
-                <a:solidFill>
-                  <a:schemeClr val="dk1"/>
-                </a:solidFill>
-                <a:latin typeface="Calibri"/>
-                <a:ea typeface="Calibri"/>
-                <a:cs typeface="Calibri"/>
-                <a:sym typeface="Calibri"/>
-              </a:rPr>
-              <a:t>Results</a:t>
-            </a:r>
-          </a:p>
-        </p:txBody>
-      </p:sp>
-      <p:sp>
-        <p:nvSpPr>
-          <p:cNvPr id="187" name="Shape 187"/>
-          <p:cNvSpPr txBox="1">
-            <a:spLocks noGrp="1"/>
-          </p:cNvSpPr>
-          <p:nvPr>
-            <p:ph type="body" idx="1"/>
-          </p:nvPr>
-        </p:nvSpPr>
-        <p:spPr>
-          <a:xfrm>
-            <a:off x="269875" y="2344057"/>
-            <a:ext cx="8604250" cy="3748768"/>
-          </a:xfrm>
-          <a:prstGeom prst="rect">
-            <a:avLst/>
-          </a:prstGeom>
-          <a:noFill/>
-          <a:ln>
-            <a:noFill/>
-          </a:ln>
-        </p:spPr>
-        <p:txBody>
-          <a:bodyPr wrap="square" lIns="91425" tIns="45700" rIns="91425" bIns="45700" anchor="t" anchorCtr="0">
-            <a:noAutofit/>
-          </a:bodyPr>
-          <a:lstStyle/>
-          <a:p>
-            <a:pPr marL="342900" marR="0" lvl="0" indent="-342900" algn="l" rtl="0">
-              <a:spcBef>
-                <a:spcPts val="0"/>
-              </a:spcBef>
-              <a:spcAft>
-                <a:spcPts val="0"/>
-              </a:spcAft>
-              <a:buClr>
-                <a:schemeClr val="accent1"/>
-              </a:buClr>
-              <a:buSzPct val="100000"/>
-              <a:buFont typeface="Arial"/>
-              <a:buNone/>
-            </a:pPr>
-            <a:endParaRPr sz="2400" b="0" i="0" u="none" strike="noStrike" cap="none">
-              <a:solidFill>
-                <a:schemeClr val="dk1"/>
-              </a:solidFill>
-              <a:latin typeface="Calibri"/>
-              <a:ea typeface="Calibri"/>
-              <a:cs typeface="Calibri"/>
-              <a:sym typeface="Calibri"/>
-            </a:endParaRPr>
-          </a:p>
-        </p:txBody>
-      </p:sp>
-      <p:sp>
-        <p:nvSpPr>
-          <p:cNvPr id="188" name="Shape 188"/>
+          <p:cNvPr id="177" name="Shape 177"/>
           <p:cNvSpPr txBox="1">
             <a:spLocks noGrp="1"/>
           </p:cNvSpPr>
@@ -22521,7 +22887,7 @@
       </p:sp>
       <p:sp>
         <p:nvSpPr>
-          <p:cNvPr id="189" name="Shape 189"/>
+          <p:cNvPr id="178" name="Shape 178"/>
           <p:cNvSpPr txBox="1">
             <a:spLocks noGrp="1"/>
           </p:cNvSpPr>
@@ -22532,7 +22898,7 @@
         <p:spPr>
           <a:xfrm>
             <a:off x="3124200" y="6356350"/>
-            <a:ext cx="2895600" cy="365125"/>
+            <a:ext cx="2895600" cy="365100"/>
           </a:xfrm>
           <a:prstGeom prst="rect">
             <a:avLst/>
@@ -22565,14 +22931,14 @@
                 <a:cs typeface="Calibri"/>
                 <a:sym typeface="Calibri"/>
               </a:rPr>
-              <a:t>IMS16</a:t>
+              <a:t>IM16</a:t>
             </a:r>
           </a:p>
         </p:txBody>
       </p:sp>
       <p:sp>
         <p:nvSpPr>
-          <p:cNvPr id="190" name="Shape 190"/>
+          <p:cNvPr id="179" name="Shape 179"/>
           <p:cNvSpPr txBox="1">
             <a:spLocks noGrp="1"/>
           </p:cNvSpPr>
@@ -22630,7 +22996,39 @@
           </a:p>
         </p:txBody>
       </p:sp>
+      <p:pic>
+        <p:nvPicPr>
+          <p:cNvPr id="181" name="Shape 181"/>
+          <p:cNvPicPr preferRelativeResize="0"/>
+          <p:nvPr/>
+        </p:nvPicPr>
+        <p:blipFill rotWithShape="1">
+          <a:blip r:embed="rId3">
+            <a:alphaModFix/>
+          </a:blip>
+          <a:srcRect t="-7210" b="7210"/>
+          <a:stretch/>
+        </p:blipFill>
+        <p:spPr>
+          <a:xfrm>
+            <a:off x="2962340" y="860200"/>
+            <a:ext cx="3306101" cy="5443973"/>
+          </a:xfrm>
+          <a:prstGeom prst="rect">
+            <a:avLst/>
+          </a:prstGeom>
+          <a:noFill/>
+          <a:ln>
+            <a:noFill/>
+          </a:ln>
+        </p:spPr>
+      </p:pic>
     </p:spTree>
+    <p:extLst>
+      <p:ext uri="{BB962C8B-B14F-4D97-AF65-F5344CB8AC3E}">
+        <p14:creationId xmlns:p14="http://schemas.microsoft.com/office/powerpoint/2010/main" val="3925748778"/>
+      </p:ext>
+    </p:extLst>
   </p:cSld>
   <p:clrMapOvr>
     <a:masterClrMapping/>
@@ -22643,7 +23041,7 @@
   <p:cSld>
     <p:spTree>
       <p:nvGrpSpPr>
-        <p:cNvPr id="1" name="Shape 194"/>
+        <p:cNvPr id="1" name="Shape 176"/>
         <p:cNvGrpSpPr/>
         <p:nvPr/>
       </p:nvGrpSpPr>
@@ -22657,18 +23055,18 @@
       </p:grpSpPr>
       <p:sp>
         <p:nvSpPr>
-          <p:cNvPr id="195" name="Shape 195"/>
+          <p:cNvPr id="177" name="Shape 177"/>
           <p:cNvSpPr txBox="1">
             <a:spLocks noGrp="1"/>
           </p:cNvSpPr>
           <p:nvPr>
-            <p:ph type="ctrTitle"/>
+            <p:ph type="dt" idx="10"/>
           </p:nvPr>
         </p:nvSpPr>
         <p:spPr>
           <a:xfrm>
-            <a:off x="277586" y="1401884"/>
-            <a:ext cx="8596539" cy="1470025"/>
+            <a:off x="264980" y="6356350"/>
+            <a:ext cx="2133600" cy="365125"/>
           </a:xfrm>
           <a:prstGeom prst="rect">
             <a:avLst/>
@@ -22679,38 +23077,191 @@
           </a:ln>
         </p:spPr>
         <p:txBody>
-          <a:bodyPr wrap="square" lIns="91425" tIns="45700" rIns="91425" bIns="45700" anchor="t" anchorCtr="0">
+          <a:bodyPr wrap="square" lIns="91425" tIns="45700" rIns="91425" bIns="45700" anchor="ctr" anchorCtr="0">
             <a:noAutofit/>
           </a:bodyPr>
           <a:lstStyle/>
           <a:p>
-            <a:pPr marL="0" marR="0" lvl="0" indent="-254000" algn="l" rtl="0">
-              <a:spcBef>
-                <a:spcPts val="0"/>
-              </a:spcBef>
-              <a:buClr>
-                <a:schemeClr val="lt2"/>
-              </a:buClr>
-              <a:buSzPct val="100000"/>
-              <a:buFont typeface="Calibri"/>
+            <a:pPr marL="0" marR="0" lvl="0" indent="0" algn="l" rtl="0">
+              <a:spcBef>
+                <a:spcPts val="0"/>
+              </a:spcBef>
+              <a:buSzPct val="25000"/>
               <a:buNone/>
             </a:pPr>
             <a:r>
-              <a:rPr lang="de-AT" sz="4000" b="1" i="0" u="none" strike="noStrike" cap="none">
-                <a:solidFill>
-                  <a:schemeClr val="lt2"/>
+              <a:rPr lang="de-AT" sz="1000">
+                <a:solidFill>
+                  <a:srgbClr val="888888"/>
                 </a:solidFill>
                 <a:latin typeface="Calibri"/>
                 <a:ea typeface="Calibri"/>
                 <a:cs typeface="Calibri"/>
                 <a:sym typeface="Calibri"/>
               </a:rPr>
-              <a:t>Thank you for your attention</a:t>
+              <a:t>06.11.2017</a:t>
             </a:r>
           </a:p>
         </p:txBody>
       </p:sp>
+      <p:sp>
+        <p:nvSpPr>
+          <p:cNvPr id="178" name="Shape 178"/>
+          <p:cNvSpPr txBox="1">
+            <a:spLocks noGrp="1"/>
+          </p:cNvSpPr>
+          <p:nvPr>
+            <p:ph type="ftr" idx="11"/>
+          </p:nvPr>
+        </p:nvSpPr>
+        <p:spPr>
+          <a:xfrm>
+            <a:off x="3124200" y="6356350"/>
+            <a:ext cx="2895600" cy="365100"/>
+          </a:xfrm>
+          <a:prstGeom prst="rect">
+            <a:avLst/>
+          </a:prstGeom>
+          <a:noFill/>
+          <a:ln>
+            <a:noFill/>
+          </a:ln>
+        </p:spPr>
+        <p:txBody>
+          <a:bodyPr wrap="square" lIns="91425" tIns="45700" rIns="91425" bIns="45700" anchor="ctr" anchorCtr="0">
+            <a:noAutofit/>
+          </a:bodyPr>
+          <a:lstStyle/>
+          <a:p>
+            <a:pPr marL="0" marR="0" lvl="0" indent="0" algn="ctr" rtl="0">
+              <a:spcBef>
+                <a:spcPts val="0"/>
+              </a:spcBef>
+              <a:buSzPct val="25000"/>
+              <a:buNone/>
+            </a:pPr>
+            <a:r>
+              <a:rPr lang="de-AT" sz="1000">
+                <a:solidFill>
+                  <a:srgbClr val="888888"/>
+                </a:solidFill>
+                <a:latin typeface="Calibri"/>
+                <a:ea typeface="Calibri"/>
+                <a:cs typeface="Calibri"/>
+                <a:sym typeface="Calibri"/>
+              </a:rPr>
+              <a:t>IM16</a:t>
+            </a:r>
+          </a:p>
+        </p:txBody>
+      </p:sp>
+      <p:sp>
+        <p:nvSpPr>
+          <p:cNvPr id="179" name="Shape 179"/>
+          <p:cNvSpPr txBox="1">
+            <a:spLocks noGrp="1"/>
+          </p:cNvSpPr>
+          <p:nvPr>
+            <p:ph type="sldNum" idx="12"/>
+          </p:nvPr>
+        </p:nvSpPr>
+        <p:spPr>
+          <a:xfrm>
+            <a:off x="6738555" y="6356350"/>
+            <a:ext cx="2133600" cy="365125"/>
+          </a:xfrm>
+          <a:prstGeom prst="rect">
+            <a:avLst/>
+          </a:prstGeom>
+          <a:noFill/>
+          <a:ln>
+            <a:noFill/>
+          </a:ln>
+        </p:spPr>
+        <p:txBody>
+          <a:bodyPr wrap="square" lIns="91425" tIns="45700" rIns="91425" bIns="45700" anchor="ctr" anchorCtr="0">
+            <a:noAutofit/>
+          </a:bodyPr>
+          <a:lstStyle/>
+          <a:p>
+            <a:pPr marL="0" marR="0" lvl="0" indent="0" algn="r" rtl="0">
+              <a:spcBef>
+                <a:spcPts val="0"/>
+              </a:spcBef>
+              <a:buSzPct val="25000"/>
+              <a:buNone/>
+            </a:pPr>
+            <a:fld id="{00000000-1234-1234-1234-123412341234}" type="slidenum">
+              <a:rPr lang="de-AT" sz="1000">
+                <a:solidFill>
+                  <a:srgbClr val="888888"/>
+                </a:solidFill>
+                <a:latin typeface="Calibri"/>
+                <a:ea typeface="Calibri"/>
+                <a:cs typeface="Calibri"/>
+                <a:sym typeface="Calibri"/>
+              </a:rPr>
+              <a:t>9</a:t>
+            </a:fld>
+            <a:endParaRPr lang="de-AT" sz="1000">
+              <a:solidFill>
+                <a:srgbClr val="888888"/>
+              </a:solidFill>
+              <a:latin typeface="Calibri"/>
+              <a:ea typeface="Calibri"/>
+              <a:cs typeface="Calibri"/>
+              <a:sym typeface="Calibri"/>
+            </a:endParaRPr>
+          </a:p>
+        </p:txBody>
+      </p:sp>
+      <p:pic>
+        <p:nvPicPr>
+          <p:cNvPr id="1026" name="Picture 2" descr="C:\Users\michael.stifter\Downloads\Simulator Screen Shot - iPhone 8 Plus - 2017-11-05 at 21.08.02.png"/>
+          <p:cNvPicPr>
+            <a:picLocks noChangeAspect="1" noChangeArrowheads="1"/>
+          </p:cNvPicPr>
+          <p:nvPr/>
+        </p:nvPicPr>
+        <p:blipFill>
+          <a:blip r:embed="rId3">
+            <a:extLst>
+              <a:ext uri="{28A0092B-C50C-407E-A947-70E740481C1C}">
+                <a14:useLocalDpi xmlns:a14="http://schemas.microsoft.com/office/drawing/2010/main" val="0"/>
+              </a:ext>
+            </a:extLst>
+          </a:blip>
+          <a:srcRect/>
+          <a:stretch>
+            <a:fillRect/>
+          </a:stretch>
+        </p:blipFill>
+        <p:spPr bwMode="auto">
+          <a:xfrm>
+            <a:off x="2989611" y="751956"/>
+            <a:ext cx="3055139" cy="5433644"/>
+          </a:xfrm>
+          <a:prstGeom prst="rect">
+            <a:avLst/>
+          </a:prstGeom>
+          <a:noFill/>
+          <a:extLst>
+            <a:ext uri="{909E8E84-426E-40DD-AFC4-6F175D3DCCD1}">
+              <a14:hiddenFill xmlns:a14="http://schemas.microsoft.com/office/drawing/2010/main">
+                <a:solidFill>
+                  <a:srgbClr val="FFFFFF"/>
+                </a:solidFill>
+              </a14:hiddenFill>
+            </a:ext>
+          </a:extLst>
+        </p:spPr>
+      </p:pic>
     </p:spTree>
+    <p:extLst>
+      <p:ext uri="{BB962C8B-B14F-4D97-AF65-F5344CB8AC3E}">
+        <p14:creationId xmlns:p14="http://schemas.microsoft.com/office/powerpoint/2010/main" val="3925748778"/>
+      </p:ext>
+    </p:extLst>
   </p:cSld>
   <p:clrMapOvr>
     <a:masterClrMapping/>

</xml_diff>

<commit_message>
Split Userstories into two slides, added notes
</commit_message>
<xml_diff>
--- a/presentations/01_idea_emergency_alerter.pptx
+++ b/presentations/01_idea_emergency_alerter.pptx
@@ -5,7 +5,7 @@
     <p:sldMasterId id="2147483665" r:id="rId1"/>
   </p:sldMasterIdLst>
   <p:notesMasterIdLst>
-    <p:notesMasterId r:id="rId14"/>
+    <p:notesMasterId r:id="rId15"/>
   </p:notesMasterIdLst>
   <p:sldIdLst>
     <p:sldId id="256" r:id="rId2"/>
@@ -15,11 +15,12 @@
     <p:sldId id="259" r:id="rId6"/>
     <p:sldId id="260" r:id="rId7"/>
     <p:sldId id="269" r:id="rId8"/>
-    <p:sldId id="261" r:id="rId9"/>
-    <p:sldId id="266" r:id="rId10"/>
-    <p:sldId id="267" r:id="rId11"/>
-    <p:sldId id="268" r:id="rId12"/>
-    <p:sldId id="263" r:id="rId13"/>
+    <p:sldId id="270" r:id="rId9"/>
+    <p:sldId id="261" r:id="rId10"/>
+    <p:sldId id="266" r:id="rId11"/>
+    <p:sldId id="267" r:id="rId12"/>
+    <p:sldId id="268" r:id="rId13"/>
+    <p:sldId id="263" r:id="rId14"/>
   </p:sldIdLst>
   <p:sldSz cx="9144000" cy="6858000" type="screen4x3"/>
   <p:notesSz cx="6858000" cy="9144000"/>
@@ -225,6 +226,22 @@
       </a:defRPr>
     </a:lvl9pPr>
   </p:defaultTextStyle>
+  <p:extLst>
+    <p:ext uri="{EFAFB233-063F-42B5-8137-9DF3F51BA10A}">
+      <p15:sldGuideLst xmlns:p15="http://schemas.microsoft.com/office/powerpoint/2012/main">
+        <p15:guide id="1" orient="horz" pos="2160">
+          <p15:clr>
+            <a:srgbClr val="A4A3A4"/>
+          </p15:clr>
+        </p15:guide>
+        <p15:guide id="2" pos="2880">
+          <p15:clr>
+            <a:srgbClr val="A4A3A4"/>
+          </p15:clr>
+        </p15:guide>
+      </p15:sldGuideLst>
+    </p:ext>
+  </p:extLst>
 </p:presentation>
 </file>
 
@@ -1447,6 +1464,107 @@
   <p:cSld>
     <p:spTree>
       <p:nvGrpSpPr>
+        <p:cNvPr id="1" name="Shape 173"/>
+        <p:cNvGrpSpPr/>
+        <p:nvPr/>
+      </p:nvGrpSpPr>
+      <p:grpSpPr>
+        <a:xfrm>
+          <a:off x="0" y="0"/>
+          <a:ext cx="0" cy="0"/>
+          <a:chOff x="0" y="0"/>
+          <a:chExt cx="0" cy="0"/>
+        </a:xfrm>
+      </p:grpSpPr>
+      <p:sp>
+        <p:nvSpPr>
+          <p:cNvPr id="174" name="Shape 174"/>
+          <p:cNvSpPr txBox="1">
+            <a:spLocks noGrp="1"/>
+          </p:cNvSpPr>
+          <p:nvPr>
+            <p:ph type="body" idx="1"/>
+          </p:nvPr>
+        </p:nvSpPr>
+        <p:spPr>
+          <a:xfrm>
+            <a:off x="685800" y="4343400"/>
+            <a:ext cx="5486400" cy="4114800"/>
+          </a:xfrm>
+          <a:prstGeom prst="rect">
+            <a:avLst/>
+          </a:prstGeom>
+        </p:spPr>
+        <p:txBody>
+          <a:bodyPr wrap="square" lIns="91425" tIns="91425" rIns="91425" bIns="91425" anchor="t" anchorCtr="0">
+            <a:noAutofit/>
+          </a:bodyPr>
+          <a:lstStyle/>
+          <a:p>
+            <a:pPr lvl="0">
+              <a:spcBef>
+                <a:spcPts val="0"/>
+              </a:spcBef>
+              <a:buNone/>
+            </a:pPr>
+            <a:endParaRPr/>
+          </a:p>
+        </p:txBody>
+      </p:sp>
+      <p:sp>
+        <p:nvSpPr>
+          <p:cNvPr id="175" name="Shape 175"/>
+          <p:cNvSpPr>
+            <a:spLocks noGrp="1" noRot="1" noChangeAspect="1"/>
+          </p:cNvSpPr>
+          <p:nvPr>
+            <p:ph type="sldImg" idx="2"/>
+          </p:nvPr>
+        </p:nvSpPr>
+        <p:spPr>
+          <a:xfrm>
+            <a:off x="1143000" y="685800"/>
+            <a:ext cx="4572000" cy="3429000"/>
+          </a:xfrm>
+          <a:custGeom>
+            <a:avLst/>
+            <a:gdLst/>
+            <a:ahLst/>
+            <a:cxnLst/>
+            <a:rect l="0" t="0" r="0" b="0"/>
+            <a:pathLst>
+              <a:path w="120000" h="120000" extrusionOk="0">
+                <a:moveTo>
+                  <a:pt x="0" y="0"/>
+                </a:moveTo>
+                <a:lnTo>
+                  <a:pt x="120000" y="0"/>
+                </a:lnTo>
+                <a:lnTo>
+                  <a:pt x="120000" y="120000"/>
+                </a:lnTo>
+                <a:lnTo>
+                  <a:pt x="0" y="120000"/>
+                </a:lnTo>
+                <a:close/>
+              </a:path>
+            </a:pathLst>
+          </a:custGeom>
+        </p:spPr>
+      </p:sp>
+    </p:spTree>
+  </p:cSld>
+  <p:clrMapOvr>
+    <a:masterClrMapping/>
+  </p:clrMapOvr>
+</p:notes>
+</file>
+
+<file path=ppt/notesSlides/notesSlide13.xml><?xml version="1.0" encoding="utf-8"?>
+<p:notes xmlns:a="http://schemas.openxmlformats.org/drawingml/2006/main" xmlns:r="http://schemas.openxmlformats.org/officeDocument/2006/relationships" xmlns:p="http://schemas.openxmlformats.org/presentationml/2006/main" showMasterSp="0" showMasterPhAnim="0">
+  <p:cSld>
+    <p:spTree>
+      <p:nvGrpSpPr>
         <p:cNvPr id="1" name="Shape 191"/>
         <p:cNvGrpSpPr/>
         <p:nvPr/>
@@ -1793,7 +1911,79 @@
               </a:spcBef>
               <a:buNone/>
             </a:pPr>
-            <a:endParaRPr/>
+            <a:r>
+              <a:rPr lang="de-DE" dirty="0"/>
+              <a:t>Unsexy </a:t>
+            </a:r>
+            <a:r>
+              <a:rPr lang="de-DE" dirty="0" err="1"/>
+              <a:t>emergency</a:t>
+            </a:r>
+            <a:r>
+              <a:rPr lang="de-DE" dirty="0"/>
+              <a:t> </a:t>
+            </a:r>
+            <a:r>
+              <a:rPr lang="de-DE" dirty="0" err="1"/>
+              <a:t>button</a:t>
+            </a:r>
+            <a:r>
+              <a:rPr lang="de-DE" dirty="0"/>
+              <a:t>.</a:t>
+            </a:r>
+          </a:p>
+          <a:p>
+            <a:pPr lvl="0">
+              <a:spcBef>
+                <a:spcPts val="0"/>
+              </a:spcBef>
+              <a:buNone/>
+            </a:pPr>
+            <a:r>
+              <a:rPr lang="de-DE" dirty="0"/>
+              <a:t>Smartwatch </a:t>
+            </a:r>
+            <a:r>
+              <a:rPr lang="de-DE" dirty="0" err="1"/>
+              <a:t>has</a:t>
+            </a:r>
+            <a:r>
+              <a:rPr lang="de-DE" dirty="0"/>
+              <a:t> </a:t>
+            </a:r>
+            <a:r>
+              <a:rPr lang="de-DE" dirty="0" err="1"/>
+              <a:t>more</a:t>
+            </a:r>
+            <a:r>
+              <a:rPr lang="de-DE" dirty="0"/>
+              <a:t> style</a:t>
+            </a:r>
+          </a:p>
+          <a:p>
+            <a:pPr lvl="0">
+              <a:spcBef>
+                <a:spcPts val="0"/>
+              </a:spcBef>
+              <a:buNone/>
+            </a:pPr>
+            <a:r>
+              <a:rPr lang="de-DE" dirty="0"/>
+              <a:t>Long </a:t>
+            </a:r>
+            <a:r>
+              <a:rPr lang="de-DE" dirty="0" err="1"/>
+              <a:t>click</a:t>
+            </a:r>
+            <a:r>
+              <a:rPr lang="de-DE" dirty="0"/>
+              <a:t>, </a:t>
+            </a:r>
+            <a:r>
+              <a:rPr lang="de-DE" dirty="0" err="1"/>
+              <a:t>multiclick</a:t>
+            </a:r>
+            <a:endParaRPr dirty="0"/>
           </a:p>
         </p:txBody>
       </p:sp>
@@ -2159,7 +2349,7 @@
   <p:cSld>
     <p:spTree>
       <p:nvGrpSpPr>
-        <p:cNvPr id="1" name="Shape 173"/>
+        <p:cNvPr id="1" name="Shape 164"/>
         <p:cNvGrpSpPr/>
         <p:nvPr/>
       </p:nvGrpSpPr>
@@ -2173,7 +2363,7 @@
       </p:grpSpPr>
       <p:sp>
         <p:nvSpPr>
-          <p:cNvPr id="174" name="Shape 174"/>
+          <p:cNvPr id="165" name="Shape 165"/>
           <p:cNvSpPr txBox="1">
             <a:spLocks noGrp="1"/>
           </p:cNvSpPr>
@@ -2196,7 +2386,7 @@
           </a:bodyPr>
           <a:lstStyle/>
           <a:p>
-            <a:pPr lvl="0">
+            <a:pPr lvl="0" rtl="0">
               <a:spcBef>
                 <a:spcPts val="0"/>
               </a:spcBef>
@@ -2208,7 +2398,7 @@
       </p:sp>
       <p:sp>
         <p:nvSpPr>
-          <p:cNvPr id="175" name="Shape 175"/>
+          <p:cNvPr id="166" name="Shape 166"/>
           <p:cNvSpPr>
             <a:spLocks noGrp="1" noRot="1" noChangeAspect="1"/>
           </p:cNvSpPr>
@@ -2248,6 +2438,11 @@
         </p:spPr>
       </p:sp>
     </p:spTree>
+    <p:extLst>
+      <p:ext uri="{BB962C8B-B14F-4D97-AF65-F5344CB8AC3E}">
+        <p14:creationId xmlns:p14="http://schemas.microsoft.com/office/powerpoint/2010/main" val="503166771"/>
+      </p:ext>
+    </p:extLst>
   </p:cSld>
   <p:clrMapOvr>
     <a:masterClrMapping/>
@@ -18892,7 +19087,7 @@
               <a:buNone/>
             </a:pPr>
             <a:r>
-              <a:rPr lang="de-AT" sz="1000" dirty="0" smtClean="0">
+              <a:rPr lang="de-AT" sz="1000" dirty="0">
                 <a:solidFill>
                   <a:srgbClr val="888888"/>
                 </a:solidFill>
@@ -18903,15 +19098,6 @@
               </a:rPr>
               <a:t>IMS16</a:t>
             </a:r>
-            <a:endParaRPr lang="de-AT" sz="1000" dirty="0">
-              <a:solidFill>
-                <a:srgbClr val="888888"/>
-              </a:solidFill>
-              <a:latin typeface="Calibri"/>
-              <a:ea typeface="Calibri"/>
-              <a:cs typeface="Calibri"/>
-              <a:sym typeface="Calibri"/>
-            </a:endParaRPr>
           </a:p>
         </p:txBody>
       </p:sp>
@@ -18977,43 +19163,29 @@
       </p:sp>
       <p:pic>
         <p:nvPicPr>
-          <p:cNvPr id="1026" name="Picture 2" descr="C:\Users\michael.stifter\Downloads\Simulator Screen Shot - iPhone 8 Plus - 2017-11-05 at 21.08.02.png"/>
-          <p:cNvPicPr>
-            <a:picLocks noChangeAspect="1" noChangeArrowheads="1"/>
-          </p:cNvPicPr>
+          <p:cNvPr id="181" name="Shape 181"/>
+          <p:cNvPicPr preferRelativeResize="0"/>
           <p:nvPr/>
         </p:nvPicPr>
-        <p:blipFill>
+        <p:blipFill rotWithShape="1">
           <a:blip r:embed="rId3">
-            <a:extLst>
-              <a:ext uri="{28A0092B-C50C-407E-A947-70E740481C1C}">
-                <a14:useLocalDpi xmlns:a14="http://schemas.microsoft.com/office/drawing/2010/main" val="0"/>
-              </a:ext>
-            </a:extLst>
+            <a:alphaModFix/>
           </a:blip>
-          <a:srcRect/>
-          <a:stretch>
-            <a:fillRect/>
-          </a:stretch>
+          <a:srcRect t="-7210" b="7210"/>
+          <a:stretch/>
         </p:blipFill>
-        <p:spPr bwMode="auto">
+        <p:spPr>
           <a:xfrm>
-            <a:off x="2989611" y="751956"/>
-            <a:ext cx="3055139" cy="5433644"/>
+            <a:off x="2962340" y="860200"/>
+            <a:ext cx="3306101" cy="5443973"/>
           </a:xfrm>
           <a:prstGeom prst="rect">
             <a:avLst/>
           </a:prstGeom>
           <a:noFill/>
-          <a:extLst>
-            <a:ext uri="{909E8E84-426E-40DD-AFC4-6F175D3DCCD1}">
-              <a14:hiddenFill xmlns:a14="http://schemas.microsoft.com/office/drawing/2010/main">
-                <a:solidFill>
-                  <a:srgbClr val="FFFFFF"/>
-                </a:solidFill>
-              </a14:hiddenFill>
-            </a:ext>
-          </a:extLst>
+          <a:ln>
+            <a:noFill/>
+          </a:ln>
         </p:spPr>
       </p:pic>
     </p:spTree>
@@ -19134,7 +19306,7 @@
               <a:buNone/>
             </a:pPr>
             <a:r>
-              <a:rPr lang="de-AT" sz="1000" dirty="0" smtClean="0">
+              <a:rPr lang="de-AT" sz="1000" dirty="0">
                 <a:solidFill>
                   <a:srgbClr val="888888"/>
                 </a:solidFill>
@@ -19145,15 +19317,6 @@
               </a:rPr>
               <a:t>IMS16</a:t>
             </a:r>
-            <a:endParaRPr lang="de-AT" sz="1000" dirty="0">
-              <a:solidFill>
-                <a:srgbClr val="888888"/>
-              </a:solidFill>
-              <a:latin typeface="Calibri"/>
-              <a:ea typeface="Calibri"/>
-              <a:cs typeface="Calibri"/>
-              <a:sym typeface="Calibri"/>
-            </a:endParaRPr>
           </a:p>
         </p:txBody>
       </p:sp>
@@ -19204,6 +19367,239 @@
                 <a:sym typeface="Calibri"/>
               </a:rPr>
               <a:t>11</a:t>
+            </a:fld>
+            <a:endParaRPr lang="de-AT" sz="1000">
+              <a:solidFill>
+                <a:srgbClr val="888888"/>
+              </a:solidFill>
+              <a:latin typeface="Calibri"/>
+              <a:ea typeface="Calibri"/>
+              <a:cs typeface="Calibri"/>
+              <a:sym typeface="Calibri"/>
+            </a:endParaRPr>
+          </a:p>
+        </p:txBody>
+      </p:sp>
+      <p:pic>
+        <p:nvPicPr>
+          <p:cNvPr id="1026" name="Picture 2" descr="C:\Users\michael.stifter\Downloads\Simulator Screen Shot - iPhone 8 Plus - 2017-11-05 at 21.08.02.png"/>
+          <p:cNvPicPr>
+            <a:picLocks noChangeAspect="1" noChangeArrowheads="1"/>
+          </p:cNvPicPr>
+          <p:nvPr/>
+        </p:nvPicPr>
+        <p:blipFill>
+          <a:blip r:embed="rId3">
+            <a:extLst>
+              <a:ext uri="{28A0092B-C50C-407E-A947-70E740481C1C}">
+                <a14:useLocalDpi xmlns:a14="http://schemas.microsoft.com/office/drawing/2010/main" val="0"/>
+              </a:ext>
+            </a:extLst>
+          </a:blip>
+          <a:srcRect/>
+          <a:stretch>
+            <a:fillRect/>
+          </a:stretch>
+        </p:blipFill>
+        <p:spPr bwMode="auto">
+          <a:xfrm>
+            <a:off x="2989611" y="751956"/>
+            <a:ext cx="3055139" cy="5433644"/>
+          </a:xfrm>
+          <a:prstGeom prst="rect">
+            <a:avLst/>
+          </a:prstGeom>
+          <a:noFill/>
+          <a:extLst>
+            <a:ext uri="{909E8E84-426E-40DD-AFC4-6F175D3DCCD1}">
+              <a14:hiddenFill xmlns:a14="http://schemas.microsoft.com/office/drawing/2010/main">
+                <a:solidFill>
+                  <a:srgbClr val="FFFFFF"/>
+                </a:solidFill>
+              </a14:hiddenFill>
+            </a:ext>
+          </a:extLst>
+        </p:spPr>
+      </p:pic>
+    </p:spTree>
+    <p:extLst>
+      <p:ext uri="{BB962C8B-B14F-4D97-AF65-F5344CB8AC3E}">
+        <p14:creationId xmlns:p14="http://schemas.microsoft.com/office/powerpoint/2010/main" val="3925748778"/>
+      </p:ext>
+    </p:extLst>
+  </p:cSld>
+  <p:clrMapOvr>
+    <a:masterClrMapping/>
+  </p:clrMapOvr>
+</p:sld>
+</file>
+
+<file path=ppt/slides/slide12.xml><?xml version="1.0" encoding="utf-8"?>
+<p:sld xmlns:a="http://schemas.openxmlformats.org/drawingml/2006/main" xmlns:r="http://schemas.openxmlformats.org/officeDocument/2006/relationships" xmlns:p="http://schemas.openxmlformats.org/presentationml/2006/main">
+  <p:cSld>
+    <p:spTree>
+      <p:nvGrpSpPr>
+        <p:cNvPr id="1" name="Shape 176"/>
+        <p:cNvGrpSpPr/>
+        <p:nvPr/>
+      </p:nvGrpSpPr>
+      <p:grpSpPr>
+        <a:xfrm>
+          <a:off x="0" y="0"/>
+          <a:ext cx="0" cy="0"/>
+          <a:chOff x="0" y="0"/>
+          <a:chExt cx="0" cy="0"/>
+        </a:xfrm>
+      </p:grpSpPr>
+      <p:sp>
+        <p:nvSpPr>
+          <p:cNvPr id="177" name="Shape 177"/>
+          <p:cNvSpPr txBox="1">
+            <a:spLocks noGrp="1"/>
+          </p:cNvSpPr>
+          <p:nvPr>
+            <p:ph type="dt" idx="10"/>
+          </p:nvPr>
+        </p:nvSpPr>
+        <p:spPr>
+          <a:xfrm>
+            <a:off x="264980" y="6356350"/>
+            <a:ext cx="2133600" cy="365125"/>
+          </a:xfrm>
+          <a:prstGeom prst="rect">
+            <a:avLst/>
+          </a:prstGeom>
+          <a:noFill/>
+          <a:ln>
+            <a:noFill/>
+          </a:ln>
+        </p:spPr>
+        <p:txBody>
+          <a:bodyPr wrap="square" lIns="91425" tIns="45700" rIns="91425" bIns="45700" anchor="ctr" anchorCtr="0">
+            <a:noAutofit/>
+          </a:bodyPr>
+          <a:lstStyle/>
+          <a:p>
+            <a:pPr marL="0" marR="0" lvl="0" indent="0" algn="l" rtl="0">
+              <a:spcBef>
+                <a:spcPts val="0"/>
+              </a:spcBef>
+              <a:buSzPct val="25000"/>
+              <a:buNone/>
+            </a:pPr>
+            <a:r>
+              <a:rPr lang="de-AT" sz="1000">
+                <a:solidFill>
+                  <a:srgbClr val="888888"/>
+                </a:solidFill>
+                <a:latin typeface="Calibri"/>
+                <a:ea typeface="Calibri"/>
+                <a:cs typeface="Calibri"/>
+                <a:sym typeface="Calibri"/>
+              </a:rPr>
+              <a:t>06.11.2017</a:t>
+            </a:r>
+          </a:p>
+        </p:txBody>
+      </p:sp>
+      <p:sp>
+        <p:nvSpPr>
+          <p:cNvPr id="178" name="Shape 178"/>
+          <p:cNvSpPr txBox="1">
+            <a:spLocks noGrp="1"/>
+          </p:cNvSpPr>
+          <p:nvPr>
+            <p:ph type="ftr" idx="11"/>
+          </p:nvPr>
+        </p:nvSpPr>
+        <p:spPr>
+          <a:xfrm>
+            <a:off x="3124200" y="6356350"/>
+            <a:ext cx="2895600" cy="365100"/>
+          </a:xfrm>
+          <a:prstGeom prst="rect">
+            <a:avLst/>
+          </a:prstGeom>
+          <a:noFill/>
+          <a:ln>
+            <a:noFill/>
+          </a:ln>
+        </p:spPr>
+        <p:txBody>
+          <a:bodyPr wrap="square" lIns="91425" tIns="45700" rIns="91425" bIns="45700" anchor="ctr" anchorCtr="0">
+            <a:noAutofit/>
+          </a:bodyPr>
+          <a:lstStyle/>
+          <a:p>
+            <a:pPr marL="0" marR="0" lvl="0" indent="0" algn="ctr" rtl="0">
+              <a:spcBef>
+                <a:spcPts val="0"/>
+              </a:spcBef>
+              <a:buSzPct val="25000"/>
+              <a:buNone/>
+            </a:pPr>
+            <a:r>
+              <a:rPr lang="de-AT" sz="1000" dirty="0">
+                <a:solidFill>
+                  <a:srgbClr val="888888"/>
+                </a:solidFill>
+                <a:latin typeface="Calibri"/>
+                <a:ea typeface="Calibri"/>
+                <a:cs typeface="Calibri"/>
+                <a:sym typeface="Calibri"/>
+              </a:rPr>
+              <a:t>IMS16</a:t>
+            </a:r>
+          </a:p>
+        </p:txBody>
+      </p:sp>
+      <p:sp>
+        <p:nvSpPr>
+          <p:cNvPr id="179" name="Shape 179"/>
+          <p:cNvSpPr txBox="1">
+            <a:spLocks noGrp="1"/>
+          </p:cNvSpPr>
+          <p:nvPr>
+            <p:ph type="sldNum" idx="12"/>
+          </p:nvPr>
+        </p:nvSpPr>
+        <p:spPr>
+          <a:xfrm>
+            <a:off x="6738555" y="6356350"/>
+            <a:ext cx="2133600" cy="365125"/>
+          </a:xfrm>
+          <a:prstGeom prst="rect">
+            <a:avLst/>
+          </a:prstGeom>
+          <a:noFill/>
+          <a:ln>
+            <a:noFill/>
+          </a:ln>
+        </p:spPr>
+        <p:txBody>
+          <a:bodyPr wrap="square" lIns="91425" tIns="45700" rIns="91425" bIns="45700" anchor="ctr" anchorCtr="0">
+            <a:noAutofit/>
+          </a:bodyPr>
+          <a:lstStyle/>
+          <a:p>
+            <a:pPr marL="0" marR="0" lvl="0" indent="0" algn="r" rtl="0">
+              <a:spcBef>
+                <a:spcPts val="0"/>
+              </a:spcBef>
+              <a:buSzPct val="25000"/>
+              <a:buNone/>
+            </a:pPr>
+            <a:fld id="{00000000-1234-1234-1234-123412341234}" type="slidenum">
+              <a:rPr lang="de-AT" sz="1000">
+                <a:solidFill>
+                  <a:srgbClr val="888888"/>
+                </a:solidFill>
+                <a:latin typeface="Calibri"/>
+                <a:ea typeface="Calibri"/>
+                <a:cs typeface="Calibri"/>
+                <a:sym typeface="Calibri"/>
+              </a:rPr>
+              <a:t>12</a:t>
             </a:fld>
             <a:endParaRPr lang="de-AT" sz="1000">
               <a:solidFill>
@@ -19271,7 +19667,7 @@
 </p:sld>
 </file>
 
-<file path=ppt/slides/slide12.xml><?xml version="1.0" encoding="utf-8"?>
+<file path=ppt/slides/slide13.xml><?xml version="1.0" encoding="utf-8"?>
 <p:sld xmlns:a="http://schemas.openxmlformats.org/drawingml/2006/main" xmlns:r="http://schemas.openxmlformats.org/officeDocument/2006/relationships" xmlns:p="http://schemas.openxmlformats.org/presentationml/2006/main">
   <p:cSld>
     <p:spTree>
@@ -20164,7 +20560,7 @@
           <p:cNvPr id="7" name="Shape 142">
             <a:extLst>
               <a:ext uri="{FF2B5EF4-FFF2-40B4-BE49-F238E27FC236}">
-                <a16:creationId xmlns:a16="http://schemas.microsoft.com/office/drawing/2014/main" xmlns="" id="{22578643-D4F2-4D65-8661-31443AF016F1}"/>
+                <a16:creationId xmlns:a16="http://schemas.microsoft.com/office/drawing/2014/main" id="{22578643-D4F2-4D65-8661-31443AF016F1}"/>
               </a:ext>
             </a:extLst>
           </p:cNvPr>
@@ -20566,7 +20962,7 @@
           <p:cNvPr id="3" name="Grafik 2">
             <a:extLst>
               <a:ext uri="{FF2B5EF4-FFF2-40B4-BE49-F238E27FC236}">
-                <a16:creationId xmlns:a16="http://schemas.microsoft.com/office/drawing/2014/main" xmlns="" id="{4222AC85-7A8C-484A-B9AA-70FFBC249CDC}"/>
+                <a16:creationId xmlns:a16="http://schemas.microsoft.com/office/drawing/2014/main" id="{4222AC85-7A8C-484A-B9AA-70FFBC249CDC}"/>
               </a:ext>
             </a:extLst>
           </p:cNvPr>
@@ -20893,6 +21289,32 @@
               <a:buFont typeface="Arial"/>
               <a:buChar char="•"/>
             </a:pPr>
+            <a:r>
+              <a:rPr lang="de-AT" dirty="0"/>
+              <a:t>Prevent </a:t>
+            </a:r>
+            <a:r>
+              <a:rPr lang="de-AT" dirty="0" err="1"/>
+              <a:t>false</a:t>
+            </a:r>
+            <a:r>
+              <a:rPr lang="de-AT" dirty="0"/>
+              <a:t> </a:t>
+            </a:r>
+            <a:r>
+              <a:rPr lang="de-AT" dirty="0" err="1"/>
+              <a:t>Alerts</a:t>
+            </a:r>
+            <a:endParaRPr lang="de-AT" dirty="0"/>
+          </a:p>
+          <a:p>
+            <a:pPr marL="342900" indent="-342900">
+              <a:spcBef>
+                <a:spcPts val="0"/>
+              </a:spcBef>
+              <a:buFont typeface="Arial"/>
+              <a:buChar char="•"/>
+            </a:pPr>
             <a:endParaRPr lang="de-AT" dirty="0"/>
           </a:p>
           <a:p>
@@ -21147,7 +21569,7 @@
           <p:cNvPr id="1026" name="Picture 2" descr="https://images-na.ssl-images-amazon.com/images/I/41eWJUdMIzL._SX466_.jpg">
             <a:extLst>
               <a:ext uri="{FF2B5EF4-FFF2-40B4-BE49-F238E27FC236}">
-                <a16:creationId xmlns:a16="http://schemas.microsoft.com/office/drawing/2014/main" xmlns="" id="{9AAF2E4A-DBA7-41C1-A58B-8600AB53068B}"/>
+                <a16:creationId xmlns:a16="http://schemas.microsoft.com/office/drawing/2014/main" id="{9AAF2E4A-DBA7-41C1-A58B-8600AB53068B}"/>
               </a:ext>
             </a:extLst>
           </p:cNvPr>
@@ -21194,7 +21616,7 @@
           <p:cNvPr id="4" name="Textfeld 3">
             <a:extLst>
               <a:ext uri="{FF2B5EF4-FFF2-40B4-BE49-F238E27FC236}">
-                <a16:creationId xmlns:a16="http://schemas.microsoft.com/office/drawing/2014/main" xmlns="" id="{B444CF7D-B155-4C42-8DAB-6AD1965C0E88}"/>
+                <a16:creationId xmlns:a16="http://schemas.microsoft.com/office/drawing/2014/main" id="{B444CF7D-B155-4C42-8DAB-6AD1965C0E88}"/>
               </a:ext>
             </a:extLst>
           </p:cNvPr>
@@ -21313,7 +21735,7 @@
               <a:buNone/>
             </a:pPr>
             <a:r>
-              <a:rPr lang="de-AT" sz="3200" b="1" i="0" u="none" strike="noStrike" cap="none" dirty="0" smtClean="0">
+              <a:rPr lang="de-AT" sz="3200" b="1" i="0" u="none" strike="noStrike" cap="none" dirty="0">
                 <a:solidFill>
                   <a:schemeClr val="dk1"/>
                 </a:solidFill>
@@ -21324,15 +21746,6 @@
               </a:rPr>
               <a:t>Persona</a:t>
             </a:r>
-            <a:endParaRPr lang="de-AT" sz="3200" b="1" i="0" u="none" strike="noStrike" cap="none" dirty="0">
-              <a:solidFill>
-                <a:schemeClr val="dk1"/>
-              </a:solidFill>
-              <a:latin typeface="Calibri"/>
-              <a:ea typeface="Calibri"/>
-              <a:cs typeface="Calibri"/>
-              <a:sym typeface="Calibri"/>
-            </a:endParaRPr>
           </a:p>
         </p:txBody>
       </p:sp>
@@ -21666,18 +22079,14 @@
             </a:r>
             <a:r>
               <a:rPr lang="de-AT" dirty="0"/>
-              <a:t> </a:t>
-            </a:r>
-            <a:r>
-              <a:rPr lang="de-AT" dirty="0" smtClean="0"/>
-              <a:t>an </a:t>
-            </a:r>
-            <a:r>
-              <a:rPr lang="de-AT" dirty="0" err="1" smtClean="0"/>
+              <a:t> an </a:t>
+            </a:r>
+            <a:r>
+              <a:rPr lang="de-AT" dirty="0" err="1"/>
               <a:t>unpleasant</a:t>
             </a:r>
             <a:r>
-              <a:rPr lang="de-AT" dirty="0" smtClean="0"/>
+              <a:rPr lang="de-AT" dirty="0"/>
               <a:t> </a:t>
             </a:r>
             <a:r>
@@ -22133,7 +22542,7 @@
               <a:buNone/>
             </a:pPr>
             <a:r>
-              <a:rPr lang="de-AT" sz="3200" b="1" i="0" u="none" strike="noStrike" cap="none" dirty="0" smtClean="0">
+              <a:rPr lang="de-AT" sz="3200" b="1" i="0" u="none" strike="noStrike" cap="none" dirty="0">
                 <a:solidFill>
                   <a:schemeClr val="dk1"/>
                 </a:solidFill>
@@ -22144,15 +22553,6 @@
               </a:rPr>
               <a:t>Persona</a:t>
             </a:r>
-            <a:endParaRPr lang="de-AT" sz="3200" b="1" i="0" u="none" strike="noStrike" cap="none" dirty="0">
-              <a:solidFill>
-                <a:schemeClr val="dk1"/>
-              </a:solidFill>
-              <a:latin typeface="Calibri"/>
-              <a:ea typeface="Calibri"/>
-              <a:cs typeface="Calibri"/>
-              <a:sym typeface="Calibri"/>
-            </a:endParaRPr>
           </a:p>
         </p:txBody>
       </p:sp>
@@ -22195,10 +22595,9 @@
               <a:buChar char="●"/>
             </a:pPr>
             <a:r>
-              <a:rPr lang="de-AT" dirty="0" smtClean="0"/>
+              <a:rPr lang="de-AT" dirty="0"/>
               <a:t>Klaus</a:t>
             </a:r>
-            <a:endParaRPr lang="de-AT" dirty="0"/>
           </a:p>
           <a:p>
             <a:pPr marL="914400" lvl="0" indent="-381000">
@@ -22211,298 +22610,297 @@
               <a:buChar char="-"/>
             </a:pPr>
             <a:r>
-              <a:rPr lang="de-AT" dirty="0" smtClean="0"/>
+              <a:rPr lang="de-AT" dirty="0"/>
               <a:t>Klaus </a:t>
             </a:r>
             <a:r>
-              <a:rPr lang="de-AT" dirty="0" err="1" smtClean="0"/>
+              <a:rPr lang="de-AT" dirty="0" err="1"/>
               <a:t>is</a:t>
             </a:r>
             <a:r>
-              <a:rPr lang="de-AT" dirty="0" smtClean="0"/>
+              <a:rPr lang="de-AT" dirty="0"/>
               <a:t> a </a:t>
             </a:r>
             <a:r>
-              <a:rPr lang="de-AT" dirty="0" err="1" smtClean="0"/>
+              <a:rPr lang="de-AT" dirty="0" err="1"/>
               <a:t>father</a:t>
-            </a:r>
-            <a:r>
-              <a:rPr lang="de-AT" dirty="0" smtClean="0"/>
-              <a:t> </a:t>
-            </a:r>
-            <a:r>
-              <a:rPr lang="de-AT" dirty="0" err="1" smtClean="0"/>
-              <a:t>of</a:t>
-            </a:r>
-            <a:r>
-              <a:rPr lang="de-AT" dirty="0" smtClean="0"/>
-              <a:t> </a:t>
-            </a:r>
-            <a:r>
-              <a:rPr lang="de-AT" dirty="0" err="1" smtClean="0"/>
-              <a:t>two</a:t>
-            </a:r>
-            <a:r>
-              <a:rPr lang="de-AT" dirty="0" smtClean="0"/>
-              <a:t> </a:t>
-            </a:r>
-            <a:r>
-              <a:rPr lang="de-AT" dirty="0" err="1" smtClean="0"/>
-              <a:t>children</a:t>
             </a:r>
             <a:r>
               <a:rPr lang="de-AT" dirty="0"/>
               <a:t> </a:t>
             </a:r>
             <a:r>
-              <a:rPr lang="de-AT" dirty="0" err="1" smtClean="0"/>
+              <a:rPr lang="de-AT" dirty="0" err="1"/>
+              <a:t>of</a:t>
+            </a:r>
+            <a:r>
+              <a:rPr lang="de-AT" dirty="0"/>
+              <a:t> </a:t>
+            </a:r>
+            <a:r>
+              <a:rPr lang="de-AT" dirty="0" err="1"/>
+              <a:t>two</a:t>
+            </a:r>
+            <a:r>
+              <a:rPr lang="de-AT" dirty="0"/>
+              <a:t> </a:t>
+            </a:r>
+            <a:r>
+              <a:rPr lang="de-AT" dirty="0" err="1"/>
+              <a:t>children</a:t>
+            </a:r>
+            <a:r>
+              <a:rPr lang="de-AT" dirty="0"/>
+              <a:t> </a:t>
+            </a:r>
+            <a:r>
+              <a:rPr lang="de-AT" dirty="0" err="1"/>
               <a:t>and</a:t>
             </a:r>
             <a:r>
-              <a:rPr lang="de-AT" dirty="0" smtClean="0"/>
+              <a:rPr lang="de-AT" dirty="0"/>
               <a:t> </a:t>
             </a:r>
             <a:r>
-              <a:rPr lang="de-AT" dirty="0" err="1" smtClean="0"/>
+              <a:rPr lang="de-AT" dirty="0" err="1"/>
               <a:t>is</a:t>
             </a:r>
             <a:r>
-              <a:rPr lang="de-AT" dirty="0" smtClean="0"/>
+              <a:rPr lang="de-AT" dirty="0"/>
               <a:t> </a:t>
             </a:r>
             <a:r>
-              <a:rPr lang="de-AT" dirty="0" err="1" smtClean="0"/>
+              <a:rPr lang="de-AT" dirty="0" err="1"/>
               <a:t>very</a:t>
             </a:r>
             <a:r>
-              <a:rPr lang="de-AT" dirty="0" smtClean="0"/>
+              <a:rPr lang="de-AT" dirty="0"/>
               <a:t> </a:t>
             </a:r>
             <a:r>
-              <a:rPr lang="de-AT" dirty="0" err="1" smtClean="0"/>
+              <a:rPr lang="de-AT" dirty="0" err="1"/>
               <a:t>protective</a:t>
             </a:r>
             <a:r>
-              <a:rPr lang="de-AT" dirty="0" smtClean="0"/>
+              <a:rPr lang="de-AT" dirty="0"/>
               <a:t> </a:t>
             </a:r>
             <a:r>
-              <a:rPr lang="de-AT" dirty="0" err="1" smtClean="0"/>
+              <a:rPr lang="de-AT" dirty="0" err="1"/>
               <a:t>about</a:t>
             </a:r>
             <a:r>
-              <a:rPr lang="de-AT" dirty="0" smtClean="0"/>
+              <a:rPr lang="de-AT" dirty="0"/>
               <a:t> </a:t>
             </a:r>
             <a:r>
-              <a:rPr lang="de-AT" dirty="0" err="1" smtClean="0"/>
+              <a:rPr lang="de-AT" dirty="0" err="1"/>
               <a:t>them</a:t>
             </a:r>
             <a:r>
-              <a:rPr lang="de-AT" dirty="0" smtClean="0"/>
+              <a:rPr lang="de-AT" dirty="0"/>
               <a:t>. He </a:t>
             </a:r>
             <a:r>
-              <a:rPr lang="de-AT" dirty="0" err="1" smtClean="0"/>
+              <a:rPr lang="de-AT" dirty="0" err="1"/>
               <a:t>is</a:t>
             </a:r>
             <a:r>
-              <a:rPr lang="de-AT" dirty="0" smtClean="0"/>
+              <a:rPr lang="de-AT" dirty="0"/>
               <a:t> </a:t>
             </a:r>
             <a:r>
-              <a:rPr lang="de-AT" dirty="0" err="1" smtClean="0"/>
+              <a:rPr lang="de-AT" dirty="0" err="1"/>
               <a:t>always</a:t>
             </a:r>
             <a:r>
-              <a:rPr lang="de-AT" dirty="0" smtClean="0"/>
+              <a:rPr lang="de-AT" dirty="0"/>
               <a:t> </a:t>
             </a:r>
             <a:r>
-              <a:rPr lang="de-AT" dirty="0" err="1" smtClean="0"/>
+              <a:rPr lang="de-AT" dirty="0" err="1"/>
               <a:t>anxious</a:t>
             </a:r>
             <a:r>
-              <a:rPr lang="de-AT" dirty="0" smtClean="0"/>
+              <a:rPr lang="de-AT" dirty="0"/>
               <a:t> </a:t>
             </a:r>
             <a:r>
-              <a:rPr lang="de-AT" dirty="0" err="1" smtClean="0"/>
+              <a:rPr lang="de-AT" dirty="0" err="1"/>
               <a:t>that</a:t>
             </a:r>
             <a:r>
-              <a:rPr lang="de-AT" dirty="0" smtClean="0"/>
+              <a:rPr lang="de-AT" dirty="0"/>
               <a:t> </a:t>
             </a:r>
             <a:r>
-              <a:rPr lang="de-AT" dirty="0" err="1" smtClean="0"/>
+              <a:rPr lang="de-AT" dirty="0" err="1"/>
               <a:t>something</a:t>
             </a:r>
             <a:r>
-              <a:rPr lang="de-AT" dirty="0" smtClean="0"/>
+              <a:rPr lang="de-AT" dirty="0"/>
               <a:t> </a:t>
             </a:r>
             <a:r>
-              <a:rPr lang="de-AT" dirty="0" err="1" smtClean="0"/>
+              <a:rPr lang="de-AT" dirty="0" err="1"/>
               <a:t>could</a:t>
             </a:r>
             <a:r>
-              <a:rPr lang="de-AT" dirty="0" smtClean="0"/>
+              <a:rPr lang="de-AT" dirty="0"/>
               <a:t> happen </a:t>
             </a:r>
             <a:r>
-              <a:rPr lang="de-AT" dirty="0" err="1" smtClean="0"/>
+              <a:rPr lang="de-AT" dirty="0" err="1"/>
               <a:t>to</a:t>
             </a:r>
             <a:r>
-              <a:rPr lang="de-AT" dirty="0" smtClean="0"/>
+              <a:rPr lang="de-AT" dirty="0"/>
               <a:t> </a:t>
             </a:r>
             <a:r>
-              <a:rPr lang="de-AT" dirty="0" err="1" smtClean="0"/>
+              <a:rPr lang="de-AT" dirty="0" err="1"/>
               <a:t>them</a:t>
             </a:r>
             <a:r>
-              <a:rPr lang="de-AT" dirty="0" smtClean="0"/>
+              <a:rPr lang="de-AT" dirty="0"/>
               <a:t>. </a:t>
             </a:r>
             <a:r>
-              <a:rPr lang="de-AT" dirty="0" err="1" smtClean="0"/>
+              <a:rPr lang="de-AT" dirty="0" err="1"/>
               <a:t>Although</a:t>
             </a:r>
             <a:r>
-              <a:rPr lang="de-AT" dirty="0" smtClean="0"/>
+              <a:rPr lang="de-AT" dirty="0"/>
               <a:t> </a:t>
             </a:r>
             <a:r>
-              <a:rPr lang="de-AT" dirty="0" err="1" smtClean="0"/>
+              <a:rPr lang="de-AT" dirty="0" err="1"/>
               <a:t>they</a:t>
             </a:r>
             <a:r>
-              <a:rPr lang="de-AT" dirty="0" smtClean="0"/>
+              <a:rPr lang="de-AT" dirty="0"/>
               <a:t> </a:t>
             </a:r>
             <a:r>
-              <a:rPr lang="de-AT" dirty="0" err="1" smtClean="0"/>
+              <a:rPr lang="de-AT" dirty="0" err="1"/>
               <a:t>have</a:t>
             </a:r>
             <a:r>
-              <a:rPr lang="de-AT" dirty="0" smtClean="0"/>
+              <a:rPr lang="de-AT" dirty="0"/>
               <a:t> </a:t>
             </a:r>
             <a:r>
-              <a:rPr lang="de-AT" dirty="0" err="1" smtClean="0"/>
+              <a:rPr lang="de-AT" dirty="0" err="1"/>
               <a:t>smartphones</a:t>
             </a:r>
             <a:r>
-              <a:rPr lang="de-AT" dirty="0" smtClean="0"/>
+              <a:rPr lang="de-AT" dirty="0"/>
               <a:t> he </a:t>
             </a:r>
             <a:r>
-              <a:rPr lang="de-AT" dirty="0" err="1" smtClean="0"/>
+              <a:rPr lang="de-AT" dirty="0" err="1"/>
               <a:t>is</a:t>
             </a:r>
             <a:r>
-              <a:rPr lang="de-AT" dirty="0" smtClean="0"/>
+              <a:rPr lang="de-AT" dirty="0"/>
               <a:t> </a:t>
             </a:r>
             <a:r>
-              <a:rPr lang="de-AT" dirty="0" err="1" smtClean="0"/>
+              <a:rPr lang="de-AT" dirty="0" err="1"/>
               <a:t>worried</a:t>
             </a:r>
             <a:r>
-              <a:rPr lang="de-AT" dirty="0" smtClean="0"/>
+              <a:rPr lang="de-AT" dirty="0"/>
               <a:t> </a:t>
             </a:r>
             <a:r>
-              <a:rPr lang="de-AT" dirty="0" err="1" smtClean="0"/>
+              <a:rPr lang="de-AT" dirty="0" err="1"/>
               <a:t>they</a:t>
             </a:r>
             <a:r>
-              <a:rPr lang="de-AT" dirty="0" smtClean="0"/>
+              <a:rPr lang="de-AT" dirty="0"/>
               <a:t> </a:t>
             </a:r>
             <a:r>
-              <a:rPr lang="de-AT" dirty="0" err="1" smtClean="0"/>
+              <a:rPr lang="de-AT" dirty="0" err="1"/>
               <a:t>might</a:t>
             </a:r>
             <a:r>
-              <a:rPr lang="de-AT" dirty="0" smtClean="0"/>
+              <a:rPr lang="de-AT" dirty="0"/>
               <a:t> not </a:t>
             </a:r>
             <a:r>
-              <a:rPr lang="de-AT" dirty="0" err="1" smtClean="0"/>
+              <a:rPr lang="de-AT" dirty="0" err="1"/>
               <a:t>be</a:t>
             </a:r>
             <a:r>
-              <a:rPr lang="de-AT" dirty="0" smtClean="0"/>
+              <a:rPr lang="de-AT" dirty="0"/>
               <a:t> </a:t>
             </a:r>
             <a:r>
-              <a:rPr lang="de-AT" dirty="0" err="1" smtClean="0"/>
+              <a:rPr lang="de-AT" dirty="0" err="1"/>
               <a:t>able</a:t>
             </a:r>
             <a:r>
-              <a:rPr lang="de-AT" dirty="0" smtClean="0"/>
+              <a:rPr lang="de-AT" dirty="0"/>
               <a:t> </a:t>
             </a:r>
             <a:r>
-              <a:rPr lang="de-AT" dirty="0" err="1" smtClean="0"/>
+              <a:rPr lang="de-AT" dirty="0" err="1"/>
               <a:t>to</a:t>
             </a:r>
             <a:r>
-              <a:rPr lang="de-AT" dirty="0" smtClean="0"/>
+              <a:rPr lang="de-AT" dirty="0"/>
               <a:t> </a:t>
             </a:r>
             <a:r>
-              <a:rPr lang="de-AT" dirty="0" err="1" smtClean="0"/>
+              <a:rPr lang="de-AT" dirty="0" err="1"/>
               <a:t>contact</a:t>
             </a:r>
             <a:r>
-              <a:rPr lang="de-AT" dirty="0" smtClean="0"/>
+              <a:rPr lang="de-AT" dirty="0"/>
               <a:t> </a:t>
             </a:r>
             <a:r>
-              <a:rPr lang="de-AT" dirty="0" err="1" smtClean="0"/>
+              <a:rPr lang="de-AT" dirty="0" err="1"/>
               <a:t>him</a:t>
             </a:r>
             <a:r>
-              <a:rPr lang="de-AT" dirty="0" smtClean="0"/>
+              <a:rPr lang="de-AT" dirty="0"/>
               <a:t> </a:t>
             </a:r>
             <a:r>
-              <a:rPr lang="de-AT" dirty="0" err="1" smtClean="0"/>
+              <a:rPr lang="de-AT" dirty="0" err="1"/>
               <a:t>when</a:t>
             </a:r>
             <a:r>
-              <a:rPr lang="de-AT" dirty="0" smtClean="0"/>
+              <a:rPr lang="de-AT" dirty="0"/>
               <a:t> </a:t>
             </a:r>
             <a:r>
-              <a:rPr lang="de-AT" dirty="0" err="1" smtClean="0"/>
+              <a:rPr lang="de-AT" dirty="0" err="1"/>
               <a:t>they</a:t>
             </a:r>
             <a:r>
-              <a:rPr lang="de-AT" dirty="0" smtClean="0"/>
+              <a:rPr lang="de-AT" dirty="0"/>
               <a:t> </a:t>
             </a:r>
             <a:r>
-              <a:rPr lang="de-AT" dirty="0" err="1" smtClean="0"/>
+              <a:rPr lang="de-AT" dirty="0" err="1"/>
               <a:t>are</a:t>
             </a:r>
             <a:r>
-              <a:rPr lang="de-AT" dirty="0" smtClean="0"/>
+              <a:rPr lang="de-AT" dirty="0"/>
               <a:t> in </a:t>
             </a:r>
             <a:r>
-              <a:rPr lang="de-AT" dirty="0" err="1" smtClean="0"/>
+              <a:rPr lang="de-AT" dirty="0" err="1"/>
               <a:t>trouble</a:t>
             </a:r>
             <a:r>
-              <a:rPr lang="de-AT" dirty="0" smtClean="0"/>
+              <a:rPr lang="de-AT" dirty="0"/>
               <a:t>.</a:t>
             </a:r>
-            <a:endParaRPr lang="de-AT" dirty="0"/>
           </a:p>
           <a:p>
             <a:pPr marL="914400" lvl="0" indent="-381000">
@@ -22515,214 +22913,213 @@
               <a:buChar char="-"/>
             </a:pPr>
             <a:r>
-              <a:rPr lang="de-AT" dirty="0" err="1" smtClean="0"/>
+              <a:rPr lang="de-AT" dirty="0" err="1"/>
               <a:t>With</a:t>
-            </a:r>
-            <a:r>
-              <a:rPr lang="de-AT" dirty="0" smtClean="0"/>
-              <a:t> </a:t>
-            </a:r>
-            <a:r>
-              <a:rPr lang="de-AT" dirty="0" err="1" smtClean="0"/>
-              <a:t>the</a:t>
-            </a:r>
-            <a:r>
-              <a:rPr lang="de-AT" dirty="0" smtClean="0"/>
-              <a:t> Emergency Alerter </a:t>
-            </a:r>
-            <a:r>
-              <a:rPr lang="de-AT" dirty="0" err="1" smtClean="0"/>
-              <a:t>Smartwatch</a:t>
-            </a:r>
-            <a:r>
-              <a:rPr lang="de-AT" dirty="0" smtClean="0"/>
-              <a:t> </a:t>
-            </a:r>
-            <a:r>
-              <a:rPr lang="de-AT" dirty="0" err="1" smtClean="0"/>
-              <a:t>app</a:t>
-            </a:r>
-            <a:r>
-              <a:rPr lang="de-AT" dirty="0" smtClean="0"/>
-              <a:t>, </a:t>
-            </a:r>
-            <a:r>
-              <a:rPr lang="de-AT" dirty="0" err="1" smtClean="0"/>
-              <a:t>the</a:t>
-            </a:r>
-            <a:r>
-              <a:rPr lang="de-AT" dirty="0" smtClean="0"/>
-              <a:t> </a:t>
-            </a:r>
-            <a:r>
-              <a:rPr lang="de-AT" dirty="0" err="1" smtClean="0"/>
-              <a:t>children</a:t>
-            </a:r>
-            <a:r>
-              <a:rPr lang="de-AT" dirty="0" smtClean="0"/>
-              <a:t> </a:t>
-            </a:r>
-            <a:r>
-              <a:rPr lang="de-AT" dirty="0" err="1" smtClean="0"/>
-              <a:t>only</a:t>
-            </a:r>
-            <a:r>
-              <a:rPr lang="de-AT" dirty="0" smtClean="0"/>
-              <a:t> </a:t>
-            </a:r>
-            <a:r>
-              <a:rPr lang="de-AT" dirty="0" err="1" smtClean="0"/>
-              <a:t>would</a:t>
-            </a:r>
-            <a:r>
-              <a:rPr lang="de-AT" dirty="0" smtClean="0"/>
-              <a:t> </a:t>
-            </a:r>
-            <a:r>
-              <a:rPr lang="de-AT" dirty="0" err="1" smtClean="0"/>
-              <a:t>have</a:t>
-            </a:r>
-            <a:r>
-              <a:rPr lang="de-AT" dirty="0" smtClean="0"/>
-              <a:t> </a:t>
-            </a:r>
-            <a:r>
-              <a:rPr lang="de-AT" dirty="0" err="1" smtClean="0"/>
-              <a:t>to</a:t>
-            </a:r>
-            <a:r>
-              <a:rPr lang="de-AT" dirty="0" smtClean="0"/>
-              <a:t> </a:t>
-            </a:r>
-            <a:r>
-              <a:rPr lang="de-AT" dirty="0" err="1" smtClean="0"/>
-              <a:t>tap</a:t>
-            </a:r>
-            <a:r>
-              <a:rPr lang="de-AT" dirty="0" smtClean="0"/>
-              <a:t> </a:t>
-            </a:r>
-            <a:r>
-              <a:rPr lang="de-AT" dirty="0" err="1" smtClean="0"/>
-              <a:t>one</a:t>
-            </a:r>
-            <a:r>
-              <a:rPr lang="de-AT" dirty="0" smtClean="0"/>
-              <a:t> </a:t>
-            </a:r>
-            <a:r>
-              <a:rPr lang="de-AT" dirty="0" err="1" smtClean="0"/>
-              <a:t>button</a:t>
-            </a:r>
-            <a:r>
-              <a:rPr lang="de-AT" dirty="0" smtClean="0"/>
-              <a:t> </a:t>
-            </a:r>
-            <a:r>
-              <a:rPr lang="de-AT" dirty="0" err="1" smtClean="0"/>
-              <a:t>to</a:t>
-            </a:r>
-            <a:r>
-              <a:rPr lang="de-AT" dirty="0" smtClean="0"/>
-              <a:t> </a:t>
-            </a:r>
-            <a:r>
-              <a:rPr lang="de-AT" dirty="0" err="1" smtClean="0"/>
-              <a:t>instantly</a:t>
-            </a:r>
-            <a:r>
-              <a:rPr lang="de-AT" dirty="0" smtClean="0"/>
-              <a:t> </a:t>
-            </a:r>
-            <a:r>
-              <a:rPr lang="de-AT" dirty="0" err="1" smtClean="0"/>
-              <a:t>notify</a:t>
-            </a:r>
-            <a:r>
-              <a:rPr lang="de-AT" dirty="0" smtClean="0"/>
-              <a:t> </a:t>
-            </a:r>
-            <a:r>
-              <a:rPr lang="de-AT" dirty="0" err="1" smtClean="0"/>
-              <a:t>the</a:t>
-            </a:r>
-            <a:r>
-              <a:rPr lang="de-AT" dirty="0" smtClean="0"/>
-              <a:t> </a:t>
-            </a:r>
-            <a:r>
-              <a:rPr lang="de-AT" dirty="0" err="1" smtClean="0"/>
-              <a:t>police</a:t>
-            </a:r>
-            <a:r>
-              <a:rPr lang="de-AT" dirty="0" smtClean="0"/>
-              <a:t> </a:t>
-            </a:r>
-            <a:r>
-              <a:rPr lang="de-AT" dirty="0" err="1" smtClean="0"/>
-              <a:t>or</a:t>
-            </a:r>
-            <a:r>
-              <a:rPr lang="de-AT" dirty="0" smtClean="0"/>
-              <a:t> </a:t>
-            </a:r>
-            <a:r>
-              <a:rPr lang="de-AT" dirty="0" err="1" smtClean="0"/>
-              <a:t>their</a:t>
-            </a:r>
-            <a:r>
-              <a:rPr lang="de-AT" dirty="0" smtClean="0"/>
-              <a:t> </a:t>
-            </a:r>
-            <a:r>
-              <a:rPr lang="de-AT" dirty="0" err="1" smtClean="0"/>
-              <a:t>father</a:t>
-            </a:r>
-            <a:r>
-              <a:rPr lang="de-AT" dirty="0" smtClean="0"/>
-              <a:t>, </a:t>
-            </a:r>
-            <a:r>
-              <a:rPr lang="de-AT" dirty="0" err="1" smtClean="0"/>
-              <a:t>which</a:t>
-            </a:r>
-            <a:r>
-              <a:rPr lang="de-AT" dirty="0" smtClean="0"/>
-              <a:t> </a:t>
-            </a:r>
-            <a:r>
-              <a:rPr lang="de-AT" dirty="0" err="1" smtClean="0"/>
-              <a:t>would</a:t>
             </a:r>
             <a:r>
               <a:rPr lang="de-AT" dirty="0"/>
               <a:t> </a:t>
             </a:r>
             <a:r>
-              <a:rPr lang="de-AT" dirty="0" err="1" smtClean="0"/>
+              <a:rPr lang="de-AT" dirty="0" err="1"/>
+              <a:t>the</a:t>
+            </a:r>
+            <a:r>
+              <a:rPr lang="de-AT" dirty="0"/>
+              <a:t> Emergency Alerter </a:t>
+            </a:r>
+            <a:r>
+              <a:rPr lang="de-AT" dirty="0" err="1"/>
+              <a:t>Smartwatch</a:t>
+            </a:r>
+            <a:r>
+              <a:rPr lang="de-AT" dirty="0"/>
+              <a:t> </a:t>
+            </a:r>
+            <a:r>
+              <a:rPr lang="de-AT" dirty="0" err="1"/>
+              <a:t>app</a:t>
+            </a:r>
+            <a:r>
+              <a:rPr lang="de-AT" dirty="0"/>
+              <a:t>, </a:t>
+            </a:r>
+            <a:r>
+              <a:rPr lang="de-AT" dirty="0" err="1"/>
+              <a:t>the</a:t>
+            </a:r>
+            <a:r>
+              <a:rPr lang="de-AT" dirty="0"/>
+              <a:t> </a:t>
+            </a:r>
+            <a:r>
+              <a:rPr lang="de-AT" dirty="0" err="1"/>
+              <a:t>children</a:t>
+            </a:r>
+            <a:r>
+              <a:rPr lang="de-AT" dirty="0"/>
+              <a:t> </a:t>
+            </a:r>
+            <a:r>
+              <a:rPr lang="de-AT" dirty="0" err="1"/>
+              <a:t>only</a:t>
+            </a:r>
+            <a:r>
+              <a:rPr lang="de-AT" dirty="0"/>
+              <a:t> </a:t>
+            </a:r>
+            <a:r>
+              <a:rPr lang="de-AT" dirty="0" err="1"/>
+              <a:t>would</a:t>
+            </a:r>
+            <a:r>
+              <a:rPr lang="de-AT" dirty="0"/>
+              <a:t> </a:t>
+            </a:r>
+            <a:r>
+              <a:rPr lang="de-AT" dirty="0" err="1"/>
+              <a:t>have</a:t>
+            </a:r>
+            <a:r>
+              <a:rPr lang="de-AT" dirty="0"/>
+              <a:t> </a:t>
+            </a:r>
+            <a:r>
+              <a:rPr lang="de-AT" dirty="0" err="1"/>
+              <a:t>to</a:t>
+            </a:r>
+            <a:r>
+              <a:rPr lang="de-AT" dirty="0"/>
+              <a:t> </a:t>
+            </a:r>
+            <a:r>
+              <a:rPr lang="de-AT" dirty="0" err="1"/>
+              <a:t>tap</a:t>
+            </a:r>
+            <a:r>
+              <a:rPr lang="de-AT" dirty="0"/>
+              <a:t> </a:t>
+            </a:r>
+            <a:r>
+              <a:rPr lang="de-AT" dirty="0" err="1"/>
+              <a:t>one</a:t>
+            </a:r>
+            <a:r>
+              <a:rPr lang="de-AT" dirty="0"/>
+              <a:t> </a:t>
+            </a:r>
+            <a:r>
+              <a:rPr lang="de-AT" dirty="0" err="1"/>
+              <a:t>button</a:t>
+            </a:r>
+            <a:r>
+              <a:rPr lang="de-AT" dirty="0"/>
+              <a:t> </a:t>
+            </a:r>
+            <a:r>
+              <a:rPr lang="de-AT" dirty="0" err="1"/>
+              <a:t>to</a:t>
+            </a:r>
+            <a:r>
+              <a:rPr lang="de-AT" dirty="0"/>
+              <a:t> </a:t>
+            </a:r>
+            <a:r>
+              <a:rPr lang="de-AT" dirty="0" err="1"/>
+              <a:t>instantly</a:t>
+            </a:r>
+            <a:r>
+              <a:rPr lang="de-AT" dirty="0"/>
+              <a:t> </a:t>
+            </a:r>
+            <a:r>
+              <a:rPr lang="de-AT" dirty="0" err="1"/>
+              <a:t>notify</a:t>
+            </a:r>
+            <a:r>
+              <a:rPr lang="de-AT" dirty="0"/>
+              <a:t> </a:t>
+            </a:r>
+            <a:r>
+              <a:rPr lang="de-AT" dirty="0" err="1"/>
+              <a:t>the</a:t>
+            </a:r>
+            <a:r>
+              <a:rPr lang="de-AT" dirty="0"/>
+              <a:t> </a:t>
+            </a:r>
+            <a:r>
+              <a:rPr lang="de-AT" dirty="0" err="1"/>
+              <a:t>police</a:t>
+            </a:r>
+            <a:r>
+              <a:rPr lang="de-AT" dirty="0"/>
+              <a:t> </a:t>
+            </a:r>
+            <a:r>
+              <a:rPr lang="de-AT" dirty="0" err="1"/>
+              <a:t>or</a:t>
+            </a:r>
+            <a:r>
+              <a:rPr lang="de-AT" dirty="0"/>
+              <a:t> </a:t>
+            </a:r>
+            <a:r>
+              <a:rPr lang="de-AT" dirty="0" err="1"/>
+              <a:t>their</a:t>
+            </a:r>
+            <a:r>
+              <a:rPr lang="de-AT" dirty="0"/>
+              <a:t> </a:t>
+            </a:r>
+            <a:r>
+              <a:rPr lang="de-AT" dirty="0" err="1"/>
+              <a:t>father</a:t>
+            </a:r>
+            <a:r>
+              <a:rPr lang="de-AT" dirty="0"/>
+              <a:t>, </a:t>
+            </a:r>
+            <a:r>
+              <a:rPr lang="de-AT" dirty="0" err="1"/>
+              <a:t>which</a:t>
+            </a:r>
+            <a:r>
+              <a:rPr lang="de-AT" dirty="0"/>
+              <a:t> </a:t>
+            </a:r>
+            <a:r>
+              <a:rPr lang="de-AT" dirty="0" err="1"/>
+              <a:t>would</a:t>
+            </a:r>
+            <a:r>
+              <a:rPr lang="de-AT" dirty="0"/>
+              <a:t> </a:t>
+            </a:r>
+            <a:r>
+              <a:rPr lang="de-AT" dirty="0" err="1"/>
               <a:t>help</a:t>
             </a:r>
             <a:r>
-              <a:rPr lang="de-AT" dirty="0" smtClean="0"/>
+              <a:rPr lang="de-AT" dirty="0"/>
               <a:t> Klaus relax a </a:t>
             </a:r>
             <a:r>
-              <a:rPr lang="de-AT" dirty="0" err="1" smtClean="0"/>
+              <a:rPr lang="de-AT" dirty="0" err="1"/>
               <a:t>little</a:t>
             </a:r>
             <a:r>
-              <a:rPr lang="de-AT" dirty="0" smtClean="0"/>
+              <a:rPr lang="de-AT" dirty="0"/>
               <a:t> </a:t>
             </a:r>
             <a:r>
-              <a:rPr lang="de-AT" dirty="0" err="1" smtClean="0"/>
+              <a:rPr lang="de-AT" dirty="0" err="1"/>
               <a:t>more</a:t>
             </a:r>
             <a:r>
-              <a:rPr lang="de-AT" dirty="0" smtClean="0"/>
+              <a:rPr lang="de-AT" dirty="0"/>
               <a:t>.</a:t>
             </a:r>
-            <a:endParaRPr lang="de-AT" dirty="0"/>
           </a:p>
           <a:p>
             <a:pPr lvl="0" rtl="0">
@@ -23020,7 +23417,7 @@
               <a:buNone/>
             </a:pPr>
             <a:r>
-              <a:rPr lang="de-AT" sz="3200" b="1" i="0" u="none" strike="noStrike" cap="none" dirty="0" smtClean="0">
+              <a:rPr lang="de-AT" sz="3200" b="1" i="0" u="none" strike="noStrike" cap="none" dirty="0">
                 <a:solidFill>
                   <a:schemeClr val="dk1"/>
                 </a:solidFill>
@@ -23029,17 +23426,8 @@
                 <a:cs typeface="Calibri"/>
                 <a:sym typeface="Calibri"/>
               </a:rPr>
-              <a:t>User Stories</a:t>
-            </a:r>
-            <a:endParaRPr lang="de-AT" sz="3200" b="1" i="0" u="none" strike="noStrike" cap="none" dirty="0">
-              <a:solidFill>
-                <a:schemeClr val="dk1"/>
-              </a:solidFill>
-              <a:latin typeface="Calibri"/>
-              <a:ea typeface="Calibri"/>
-              <a:cs typeface="Calibri"/>
-              <a:sym typeface="Calibri"/>
-            </a:endParaRPr>
+              <a:t>User Stories </a:t>
+            </a:r>
           </a:p>
         </p:txBody>
       </p:sp>
@@ -23082,207 +23470,207 @@
               <a:buChar char="●"/>
             </a:pPr>
             <a:r>
-              <a:rPr lang="de-AT" dirty="0" smtClean="0"/>
+              <a:rPr lang="de-AT" dirty="0"/>
               <a:t>As a </a:t>
             </a:r>
             <a:r>
-              <a:rPr lang="de-AT" dirty="0" err="1" smtClean="0"/>
+              <a:rPr lang="de-AT" dirty="0" err="1"/>
               <a:t>user</a:t>
             </a:r>
             <a:r>
-              <a:rPr lang="de-AT" dirty="0" smtClean="0"/>
+              <a:rPr lang="de-AT" dirty="0"/>
               <a:t>, I </a:t>
             </a:r>
             <a:r>
-              <a:rPr lang="de-AT" dirty="0" err="1" smtClean="0"/>
+              <a:rPr lang="de-AT" dirty="0" err="1"/>
               <a:t>want</a:t>
             </a:r>
             <a:r>
-              <a:rPr lang="de-AT" dirty="0" smtClean="0"/>
+              <a:rPr lang="de-AT" dirty="0"/>
               <a:t> </a:t>
             </a:r>
             <a:r>
-              <a:rPr lang="de-AT" dirty="0" err="1" smtClean="0"/>
+              <a:rPr lang="de-AT" dirty="0" err="1"/>
               <a:t>to</a:t>
             </a:r>
             <a:r>
-              <a:rPr lang="de-AT" dirty="0" smtClean="0"/>
+              <a:rPr lang="de-AT" dirty="0"/>
               <a:t> </a:t>
             </a:r>
             <a:r>
-              <a:rPr lang="de-AT" dirty="0" err="1" smtClean="0"/>
+              <a:rPr lang="de-AT" dirty="0" err="1"/>
               <a:t>be</a:t>
             </a:r>
             <a:r>
-              <a:rPr lang="de-AT" dirty="0" smtClean="0"/>
+              <a:rPr lang="de-AT" dirty="0"/>
               <a:t> </a:t>
             </a:r>
             <a:r>
-              <a:rPr lang="de-AT" dirty="0" err="1" smtClean="0"/>
+              <a:rPr lang="de-AT" dirty="0" err="1"/>
               <a:t>able</a:t>
             </a:r>
             <a:r>
-              <a:rPr lang="de-AT" dirty="0" smtClean="0"/>
+              <a:rPr lang="de-AT" dirty="0"/>
               <a:t> </a:t>
             </a:r>
             <a:r>
-              <a:rPr lang="de-AT" dirty="0" err="1" smtClean="0"/>
+              <a:rPr lang="de-AT" dirty="0" err="1"/>
               <a:t>to</a:t>
             </a:r>
             <a:r>
-              <a:rPr lang="de-AT" dirty="0" smtClean="0"/>
+              <a:rPr lang="de-AT" dirty="0"/>
               <a:t> </a:t>
             </a:r>
             <a:r>
-              <a:rPr lang="de-AT" dirty="0" err="1" smtClean="0"/>
+              <a:rPr lang="de-AT" dirty="0" err="1"/>
               <a:t>notify</a:t>
             </a:r>
             <a:r>
-              <a:rPr lang="de-AT" dirty="0" smtClean="0"/>
+              <a:rPr lang="de-AT" dirty="0"/>
               <a:t> a </a:t>
             </a:r>
             <a:r>
-              <a:rPr lang="de-AT" dirty="0" err="1" smtClean="0"/>
+              <a:rPr lang="de-AT" dirty="0" err="1"/>
               <a:t>pre-defined</a:t>
             </a:r>
             <a:r>
-              <a:rPr lang="de-AT" dirty="0" smtClean="0"/>
+              <a:rPr lang="de-AT" dirty="0"/>
               <a:t> </a:t>
             </a:r>
             <a:r>
-              <a:rPr lang="de-AT" dirty="0" err="1" smtClean="0"/>
+              <a:rPr lang="de-AT" dirty="0" err="1"/>
               <a:t>list</a:t>
             </a:r>
             <a:r>
-              <a:rPr lang="de-AT" dirty="0" smtClean="0"/>
+              <a:rPr lang="de-AT" dirty="0"/>
               <a:t> </a:t>
             </a:r>
             <a:r>
-              <a:rPr lang="de-AT" dirty="0" err="1" smtClean="0"/>
+              <a:rPr lang="de-AT" dirty="0" err="1"/>
               <a:t>of</a:t>
             </a:r>
             <a:r>
-              <a:rPr lang="de-AT" dirty="0" smtClean="0"/>
+              <a:rPr lang="de-AT" dirty="0"/>
               <a:t> </a:t>
             </a:r>
             <a:r>
-              <a:rPr lang="de-AT" dirty="0" err="1" smtClean="0"/>
+              <a:rPr lang="de-AT" dirty="0" err="1"/>
               <a:t>contacts</a:t>
             </a:r>
             <a:r>
-              <a:rPr lang="de-AT" dirty="0" smtClean="0"/>
+              <a:rPr lang="de-AT" dirty="0"/>
               <a:t> </a:t>
             </a:r>
             <a:r>
-              <a:rPr lang="de-AT" dirty="0" err="1" smtClean="0"/>
+              <a:rPr lang="de-AT" dirty="0" err="1"/>
               <a:t>that</a:t>
             </a:r>
             <a:r>
-              <a:rPr lang="de-AT" dirty="0" smtClean="0"/>
+              <a:rPr lang="de-AT" dirty="0"/>
               <a:t> I </a:t>
             </a:r>
             <a:r>
-              <a:rPr lang="de-AT" dirty="0" err="1" smtClean="0"/>
+              <a:rPr lang="de-AT" dirty="0" err="1"/>
               <a:t>need</a:t>
             </a:r>
             <a:r>
-              <a:rPr lang="de-AT" dirty="0" smtClean="0"/>
+              <a:rPr lang="de-AT" dirty="0"/>
               <a:t> </a:t>
             </a:r>
             <a:r>
-              <a:rPr lang="de-AT" dirty="0" err="1" smtClean="0"/>
+              <a:rPr lang="de-AT" dirty="0" err="1"/>
               <a:t>help</a:t>
             </a:r>
             <a:r>
-              <a:rPr lang="de-AT" dirty="0" smtClean="0"/>
+              <a:rPr lang="de-AT" dirty="0"/>
               <a:t>, </a:t>
             </a:r>
             <a:r>
-              <a:rPr lang="de-AT" dirty="0" err="1" smtClean="0"/>
+              <a:rPr lang="de-AT" dirty="0" err="1"/>
               <a:t>together</a:t>
             </a:r>
             <a:r>
-              <a:rPr lang="de-AT" dirty="0" smtClean="0"/>
+              <a:rPr lang="de-AT" dirty="0"/>
               <a:t> </a:t>
             </a:r>
             <a:r>
-              <a:rPr lang="de-AT" dirty="0" err="1" smtClean="0"/>
+              <a:rPr lang="de-AT" dirty="0" err="1"/>
               <a:t>with</a:t>
             </a:r>
             <a:r>
-              <a:rPr lang="de-AT" dirty="0" smtClean="0"/>
+              <a:rPr lang="de-AT" dirty="0"/>
               <a:t> </a:t>
             </a:r>
             <a:r>
-              <a:rPr lang="de-AT" dirty="0" err="1" smtClean="0"/>
+              <a:rPr lang="de-AT" dirty="0" err="1"/>
               <a:t>my</a:t>
             </a:r>
             <a:r>
-              <a:rPr lang="de-AT" dirty="0" smtClean="0"/>
+              <a:rPr lang="de-AT" dirty="0"/>
               <a:t> last-</a:t>
             </a:r>
             <a:r>
-              <a:rPr lang="de-AT" dirty="0" err="1" smtClean="0"/>
+              <a:rPr lang="de-AT" dirty="0" err="1"/>
               <a:t>known</a:t>
             </a:r>
             <a:r>
-              <a:rPr lang="de-AT" dirty="0" smtClean="0"/>
+              <a:rPr lang="de-AT" dirty="0"/>
               <a:t> </a:t>
             </a:r>
             <a:r>
-              <a:rPr lang="de-AT" dirty="0" err="1" smtClean="0"/>
+              <a:rPr lang="de-AT" dirty="0" err="1"/>
               <a:t>location</a:t>
             </a:r>
             <a:r>
-              <a:rPr lang="de-AT" dirty="0" smtClean="0"/>
+              <a:rPr lang="de-AT" dirty="0"/>
               <a:t> </a:t>
             </a:r>
             <a:r>
-              <a:rPr lang="de-AT" dirty="0" err="1" smtClean="0"/>
+              <a:rPr lang="de-AT" dirty="0" err="1"/>
               <a:t>with</a:t>
             </a:r>
             <a:r>
-              <a:rPr lang="de-AT" dirty="0" smtClean="0"/>
+              <a:rPr lang="de-AT" dirty="0"/>
               <a:t> </a:t>
             </a:r>
             <a:r>
-              <a:rPr lang="de-AT" dirty="0" err="1" smtClean="0"/>
+              <a:rPr lang="de-AT" dirty="0" err="1"/>
               <a:t>the</a:t>
             </a:r>
             <a:r>
-              <a:rPr lang="de-AT" dirty="0" smtClean="0"/>
+              <a:rPr lang="de-AT" dirty="0"/>
               <a:t> </a:t>
             </a:r>
             <a:r>
-              <a:rPr lang="de-AT" dirty="0" err="1" smtClean="0"/>
+              <a:rPr lang="de-AT" dirty="0" err="1"/>
               <a:t>tap</a:t>
             </a:r>
             <a:r>
-              <a:rPr lang="de-AT" dirty="0" smtClean="0"/>
+              <a:rPr lang="de-AT" dirty="0"/>
               <a:t> </a:t>
             </a:r>
             <a:r>
-              <a:rPr lang="de-AT" dirty="0" err="1" smtClean="0"/>
+              <a:rPr lang="de-AT" dirty="0" err="1"/>
               <a:t>of</a:t>
             </a:r>
             <a:r>
-              <a:rPr lang="de-AT" dirty="0" smtClean="0"/>
+              <a:rPr lang="de-AT" dirty="0"/>
               <a:t> </a:t>
             </a:r>
             <a:r>
-              <a:rPr lang="de-AT" dirty="0" err="1" smtClean="0"/>
+              <a:rPr lang="de-AT" dirty="0" err="1"/>
               <a:t>one</a:t>
             </a:r>
             <a:r>
-              <a:rPr lang="de-AT" dirty="0" smtClean="0"/>
+              <a:rPr lang="de-AT" dirty="0"/>
               <a:t> </a:t>
             </a:r>
             <a:r>
-              <a:rPr lang="de-AT" dirty="0" err="1" smtClean="0"/>
+              <a:rPr lang="de-AT" dirty="0" err="1"/>
               <a:t>button</a:t>
             </a:r>
             <a:r>
-              <a:rPr lang="de-AT" dirty="0" smtClean="0"/>
+              <a:rPr lang="de-AT" dirty="0"/>
               <a:t>.</a:t>
             </a:r>
           </a:p>
@@ -23296,130 +23684,7 @@
               </a:spcBef>
               <a:buChar char="●"/>
             </a:pPr>
-            <a:r>
-              <a:rPr lang="de-AT" dirty="0" smtClean="0"/>
-              <a:t>As a </a:t>
-            </a:r>
-            <a:r>
-              <a:rPr lang="de-AT" dirty="0" err="1" smtClean="0"/>
-              <a:t>user</a:t>
-            </a:r>
-            <a:r>
-              <a:rPr lang="de-AT" dirty="0" smtClean="0"/>
-              <a:t>, I </a:t>
-            </a:r>
-            <a:r>
-              <a:rPr lang="de-AT" dirty="0" err="1" smtClean="0"/>
-              <a:t>want</a:t>
-            </a:r>
-            <a:r>
-              <a:rPr lang="de-AT" dirty="0" smtClean="0"/>
-              <a:t> </a:t>
-            </a:r>
-            <a:r>
-              <a:rPr lang="de-AT" dirty="0" err="1" smtClean="0"/>
-              <a:t>to</a:t>
-            </a:r>
-            <a:r>
-              <a:rPr lang="de-AT" dirty="0" smtClean="0"/>
-              <a:t> </a:t>
-            </a:r>
-            <a:r>
-              <a:rPr lang="de-AT" dirty="0" err="1" smtClean="0"/>
-              <a:t>be</a:t>
-            </a:r>
-            <a:r>
-              <a:rPr lang="de-AT" dirty="0" smtClean="0"/>
-              <a:t> </a:t>
-            </a:r>
-            <a:r>
-              <a:rPr lang="de-AT" dirty="0" err="1" smtClean="0"/>
-              <a:t>able</a:t>
-            </a:r>
-            <a:r>
-              <a:rPr lang="de-AT" dirty="0" smtClean="0"/>
-              <a:t> </a:t>
-            </a:r>
-            <a:r>
-              <a:rPr lang="de-AT" dirty="0" err="1" smtClean="0"/>
-              <a:t>to</a:t>
-            </a:r>
-            <a:r>
-              <a:rPr lang="de-AT" dirty="0" smtClean="0"/>
-              <a:t> </a:t>
-            </a:r>
-            <a:r>
-              <a:rPr lang="de-AT" dirty="0" err="1" smtClean="0"/>
-              <a:t>call</a:t>
-            </a:r>
-            <a:r>
-              <a:rPr lang="de-AT" dirty="0" smtClean="0"/>
-              <a:t> </a:t>
-            </a:r>
-            <a:r>
-              <a:rPr lang="de-AT" dirty="0" err="1" smtClean="0"/>
-              <a:t>the</a:t>
-            </a:r>
-            <a:r>
-              <a:rPr lang="de-AT" dirty="0" smtClean="0"/>
-              <a:t> </a:t>
-            </a:r>
-            <a:r>
-              <a:rPr lang="de-AT" dirty="0" err="1" smtClean="0"/>
-              <a:t>police</a:t>
-            </a:r>
-            <a:r>
-              <a:rPr lang="de-AT" dirty="0" smtClean="0"/>
-              <a:t> </a:t>
-            </a:r>
-            <a:r>
-              <a:rPr lang="de-AT" dirty="0" err="1" smtClean="0"/>
-              <a:t>with</a:t>
-            </a:r>
-            <a:r>
-              <a:rPr lang="de-AT" dirty="0" smtClean="0"/>
-              <a:t> </a:t>
-            </a:r>
-            <a:r>
-              <a:rPr lang="de-AT" dirty="0" err="1" smtClean="0"/>
-              <a:t>the</a:t>
-            </a:r>
-            <a:r>
-              <a:rPr lang="de-AT" dirty="0" smtClean="0"/>
-              <a:t> </a:t>
-            </a:r>
-            <a:r>
-              <a:rPr lang="de-AT" dirty="0" err="1" smtClean="0"/>
-              <a:t>tap</a:t>
-            </a:r>
-            <a:r>
-              <a:rPr lang="de-AT" dirty="0" smtClean="0"/>
-              <a:t> </a:t>
-            </a:r>
-            <a:r>
-              <a:rPr lang="de-AT" dirty="0" err="1" smtClean="0"/>
-              <a:t>of</a:t>
-            </a:r>
-            <a:r>
-              <a:rPr lang="de-AT" dirty="0" smtClean="0"/>
-              <a:t> </a:t>
-            </a:r>
-            <a:r>
-              <a:rPr lang="de-AT" dirty="0" err="1" smtClean="0"/>
-              <a:t>one</a:t>
-            </a:r>
-            <a:r>
-              <a:rPr lang="de-AT" dirty="0" smtClean="0"/>
-              <a:t> </a:t>
-            </a:r>
-            <a:r>
-              <a:rPr lang="de-AT" dirty="0" err="1" smtClean="0"/>
-              <a:t>button</a:t>
-            </a:r>
-            <a:r>
-              <a:rPr lang="de-AT" dirty="0" smtClean="0"/>
-              <a:t>.</a:t>
-            </a:r>
+            <a:endParaRPr lang="de-AT" dirty="0"/>
           </a:p>
           <a:p>
             <a:pPr marL="457200" lvl="0" indent="-381000">
@@ -23432,241 +23697,129 @@
               <a:buChar char="●"/>
             </a:pPr>
             <a:r>
-              <a:rPr lang="de-AT" dirty="0" smtClean="0"/>
+              <a:rPr lang="de-AT" dirty="0"/>
               <a:t>As a </a:t>
             </a:r>
             <a:r>
-              <a:rPr lang="de-AT" dirty="0" err="1" smtClean="0"/>
+              <a:rPr lang="de-AT" dirty="0" err="1"/>
               <a:t>user</a:t>
             </a:r>
             <a:r>
-              <a:rPr lang="de-AT" dirty="0" smtClean="0"/>
+              <a:rPr lang="de-AT" dirty="0"/>
               <a:t>, I </a:t>
             </a:r>
             <a:r>
-              <a:rPr lang="de-AT" dirty="0" err="1" smtClean="0"/>
+              <a:rPr lang="de-AT" dirty="0" err="1"/>
               <a:t>want</a:t>
             </a:r>
             <a:r>
-              <a:rPr lang="de-AT" dirty="0" smtClean="0"/>
+              <a:rPr lang="de-AT" dirty="0"/>
               <a:t> </a:t>
             </a:r>
             <a:r>
-              <a:rPr lang="de-AT" dirty="0" err="1" smtClean="0"/>
+              <a:rPr lang="de-AT" dirty="0" err="1"/>
               <a:t>to</a:t>
             </a:r>
             <a:r>
-              <a:rPr lang="de-AT" dirty="0" smtClean="0"/>
+              <a:rPr lang="de-AT" dirty="0"/>
               <a:t> </a:t>
             </a:r>
             <a:r>
-              <a:rPr lang="de-AT" dirty="0" err="1" smtClean="0"/>
-              <a:t>see</a:t>
-            </a:r>
-            <a:r>
-              <a:rPr lang="de-AT" dirty="0" smtClean="0"/>
+              <a:rPr lang="de-AT" dirty="0" err="1"/>
+              <a:t>be</a:t>
+            </a:r>
+            <a:r>
+              <a:rPr lang="de-AT" dirty="0"/>
               <a:t> </a:t>
             </a:r>
             <a:r>
-              <a:rPr lang="de-AT" dirty="0" err="1" smtClean="0"/>
-              <a:t>how</a:t>
-            </a:r>
-            <a:r>
-              <a:rPr lang="de-AT" dirty="0" smtClean="0"/>
+              <a:rPr lang="de-AT" dirty="0" err="1"/>
+              <a:t>able</a:t>
+            </a:r>
+            <a:r>
+              <a:rPr lang="de-AT" dirty="0"/>
               <a:t> </a:t>
             </a:r>
             <a:r>
-              <a:rPr lang="de-AT" dirty="0" err="1" smtClean="0"/>
-              <a:t>far</a:t>
-            </a:r>
-            <a:r>
-              <a:rPr lang="de-AT" dirty="0" smtClean="0"/>
+              <a:rPr lang="de-AT" dirty="0" err="1"/>
+              <a:t>to</a:t>
+            </a:r>
+            <a:r>
+              <a:rPr lang="de-AT" dirty="0"/>
               <a:t> </a:t>
             </a:r>
             <a:r>
-              <a:rPr lang="de-AT" dirty="0" err="1" smtClean="0"/>
-              <a:t>away</a:t>
-            </a:r>
-            <a:r>
-              <a:rPr lang="de-AT" dirty="0" smtClean="0"/>
+              <a:rPr lang="de-AT" dirty="0" err="1"/>
+              <a:t>call</a:t>
+            </a:r>
+            <a:r>
+              <a:rPr lang="de-AT" dirty="0"/>
               <a:t> </a:t>
             </a:r>
             <a:r>
-              <a:rPr lang="de-AT" dirty="0" err="1" smtClean="0"/>
+              <a:rPr lang="de-AT" dirty="0" err="1"/>
               <a:t>the</a:t>
             </a:r>
             <a:r>
-              <a:rPr lang="de-AT" dirty="0" smtClean="0"/>
+              <a:rPr lang="de-AT" dirty="0"/>
               <a:t> </a:t>
             </a:r>
             <a:r>
-              <a:rPr lang="de-AT" dirty="0" err="1" smtClean="0"/>
-              <a:t>nearest</a:t>
-            </a:r>
-            <a:r>
-              <a:rPr lang="de-AT" dirty="0" smtClean="0"/>
+              <a:rPr lang="de-AT" dirty="0" err="1"/>
+              <a:t>police</a:t>
+            </a:r>
+            <a:r>
+              <a:rPr lang="de-AT" dirty="0"/>
               <a:t> </a:t>
             </a:r>
             <a:r>
-              <a:rPr lang="de-AT" dirty="0" err="1" smtClean="0"/>
-              <a:t>police</a:t>
-            </a:r>
-            <a:r>
-              <a:rPr lang="de-AT" dirty="0" smtClean="0"/>
+              <a:rPr lang="de-AT" dirty="0" err="1"/>
+              <a:t>with</a:t>
+            </a:r>
+            <a:r>
+              <a:rPr lang="de-AT" dirty="0"/>
               <a:t> </a:t>
             </a:r>
             <a:r>
-              <a:rPr lang="de-AT" dirty="0" err="1" smtClean="0"/>
-              <a:t>station</a:t>
-            </a:r>
-            <a:r>
-              <a:rPr lang="de-AT" dirty="0" smtClean="0"/>
+              <a:rPr lang="de-AT" dirty="0" err="1"/>
+              <a:t>the</a:t>
+            </a:r>
+            <a:r>
+              <a:rPr lang="de-AT" dirty="0"/>
               <a:t> </a:t>
             </a:r>
             <a:r>
-              <a:rPr lang="de-AT" dirty="0" err="1" smtClean="0"/>
-              <a:t>is</a:t>
-            </a:r>
-            <a:r>
-              <a:rPr lang="de-AT" dirty="0" smtClean="0"/>
+              <a:rPr lang="de-AT" dirty="0" err="1"/>
+              <a:t>tap</a:t>
+            </a:r>
+            <a:r>
+              <a:rPr lang="de-AT" dirty="0"/>
+              <a:t> </a:t>
+            </a:r>
+            <a:r>
+              <a:rPr lang="de-AT" dirty="0" err="1"/>
+              <a:t>of</a:t>
+            </a:r>
+            <a:r>
+              <a:rPr lang="de-AT" dirty="0"/>
+              <a:t> </a:t>
+            </a:r>
+            <a:r>
+              <a:rPr lang="de-AT" dirty="0" err="1"/>
+              <a:t>one</a:t>
+            </a:r>
+            <a:r>
+              <a:rPr lang="de-AT" dirty="0"/>
+              <a:t> </a:t>
+            </a:r>
+            <a:r>
+              <a:rPr lang="de-AT" dirty="0" err="1"/>
+              <a:t>button</a:t>
+            </a:r>
+            <a:r>
+              <a:rPr lang="de-AT" dirty="0"/>
               <a:t>.</a:t>
             </a:r>
-          </a:p>
-          <a:p>
-            <a:pPr marL="457200" lvl="0" indent="-381000">
-              <a:lnSpc>
-                <a:spcPct val="115000"/>
-              </a:lnSpc>
-              <a:spcBef>
-                <a:spcPts val="0"/>
-              </a:spcBef>
-              <a:buChar char="●"/>
-            </a:pPr>
-            <a:r>
-              <a:rPr lang="de-AT" dirty="0" smtClean="0"/>
-              <a:t>As a </a:t>
-            </a:r>
-            <a:r>
-              <a:rPr lang="de-AT" dirty="0" err="1" smtClean="0"/>
-              <a:t>user</a:t>
-            </a:r>
-            <a:r>
-              <a:rPr lang="de-AT" dirty="0" smtClean="0"/>
-              <a:t>, I </a:t>
-            </a:r>
-            <a:r>
-              <a:rPr lang="de-AT" dirty="0" err="1" smtClean="0"/>
-              <a:t>want</a:t>
-            </a:r>
-            <a:r>
-              <a:rPr lang="de-AT" dirty="0" smtClean="0"/>
-              <a:t> </a:t>
-            </a:r>
-            <a:r>
-              <a:rPr lang="de-AT" dirty="0" err="1" smtClean="0"/>
-              <a:t>that</a:t>
-            </a:r>
-            <a:r>
-              <a:rPr lang="de-AT" dirty="0" smtClean="0"/>
-              <a:t> </a:t>
-            </a:r>
-            <a:r>
-              <a:rPr lang="de-AT" dirty="0" err="1" smtClean="0"/>
-              <a:t>my</a:t>
-            </a:r>
-            <a:r>
-              <a:rPr lang="de-AT" dirty="0" smtClean="0"/>
-              <a:t> </a:t>
-            </a:r>
-            <a:r>
-              <a:rPr lang="de-AT" dirty="0" err="1" smtClean="0"/>
-              <a:t>emergency</a:t>
-            </a:r>
-            <a:r>
-              <a:rPr lang="de-AT" dirty="0" smtClean="0"/>
-              <a:t> </a:t>
-            </a:r>
-            <a:r>
-              <a:rPr lang="de-AT" dirty="0" err="1" smtClean="0"/>
-              <a:t>contacts</a:t>
-            </a:r>
-            <a:r>
-              <a:rPr lang="de-AT" dirty="0" smtClean="0"/>
-              <a:t> </a:t>
-            </a:r>
-            <a:r>
-              <a:rPr lang="de-AT" dirty="0" err="1" smtClean="0"/>
-              <a:t>are</a:t>
-            </a:r>
-            <a:r>
-              <a:rPr lang="de-AT" dirty="0" smtClean="0"/>
-              <a:t> </a:t>
-            </a:r>
-            <a:r>
-              <a:rPr lang="de-AT" dirty="0" err="1" smtClean="0"/>
-              <a:t>alerted</a:t>
-            </a:r>
-            <a:r>
-              <a:rPr lang="de-AT" dirty="0" smtClean="0"/>
-              <a:t> in </a:t>
-            </a:r>
-            <a:r>
-              <a:rPr lang="de-AT" dirty="0" err="1" smtClean="0"/>
-              <a:t>case</a:t>
-            </a:r>
-            <a:r>
-              <a:rPr lang="de-AT" dirty="0" smtClean="0"/>
-              <a:t> </a:t>
-            </a:r>
-            <a:r>
-              <a:rPr lang="de-AT" dirty="0" err="1" smtClean="0"/>
-              <a:t>my</a:t>
-            </a:r>
-            <a:r>
-              <a:rPr lang="de-AT" dirty="0" smtClean="0"/>
-              <a:t> </a:t>
-            </a:r>
-            <a:r>
-              <a:rPr lang="de-AT" dirty="0" err="1" smtClean="0"/>
-              <a:t>heartrate</a:t>
-            </a:r>
-            <a:r>
-              <a:rPr lang="de-AT" dirty="0" smtClean="0"/>
-              <a:t> </a:t>
-            </a:r>
-            <a:r>
-              <a:rPr lang="de-AT" dirty="0" err="1" smtClean="0"/>
-              <a:t>rises</a:t>
-            </a:r>
-            <a:r>
-              <a:rPr lang="de-AT" dirty="0" smtClean="0"/>
-              <a:t> </a:t>
-            </a:r>
-            <a:r>
-              <a:rPr lang="de-AT" dirty="0" err="1" smtClean="0"/>
-              <a:t>above</a:t>
-            </a:r>
-            <a:r>
-              <a:rPr lang="de-AT" dirty="0" smtClean="0"/>
-              <a:t> a </a:t>
-            </a:r>
-            <a:r>
-              <a:rPr lang="de-AT" dirty="0" err="1" smtClean="0"/>
-              <a:t>pre-defined</a:t>
-            </a:r>
-            <a:r>
-              <a:rPr lang="de-AT" dirty="0" smtClean="0"/>
-              <a:t> </a:t>
-            </a:r>
-            <a:r>
-              <a:rPr lang="de-AT" dirty="0" err="1" smtClean="0"/>
-              <a:t>threshold</a:t>
-            </a:r>
-            <a:r>
-              <a:rPr lang="de-AT" dirty="0" smtClean="0"/>
-              <a:t>.</a:t>
-            </a:r>
-            <a:endParaRPr lang="de-AT" dirty="0"/>
           </a:p>
           <a:p>
             <a:pPr lvl="0" rtl="0">
@@ -23862,7 +24015,7 @@
   <p:cSld>
     <p:spTree>
       <p:nvGrpSpPr>
-        <p:cNvPr id="1" name="Shape 176"/>
+        <p:cNvPr id="1" name="Shape 167"/>
         <p:cNvGrpSpPr/>
         <p:nvPr/>
       </p:nvGrpSpPr>
@@ -23876,7 +24029,418 @@
       </p:grpSpPr>
       <p:sp>
         <p:nvSpPr>
-          <p:cNvPr id="177" name="Shape 177"/>
+          <p:cNvPr id="168" name="Shape 168"/>
+          <p:cNvSpPr txBox="1">
+            <a:spLocks noGrp="1"/>
+          </p:cNvSpPr>
+          <p:nvPr>
+            <p:ph type="title"/>
+          </p:nvPr>
+        </p:nvSpPr>
+        <p:spPr>
+          <a:xfrm>
+            <a:off x="269875" y="1090515"/>
+            <a:ext cx="8602200" cy="1143000"/>
+          </a:xfrm>
+          <a:prstGeom prst="rect">
+            <a:avLst/>
+          </a:prstGeom>
+          <a:noFill/>
+          <a:ln>
+            <a:noFill/>
+          </a:ln>
+        </p:spPr>
+        <p:txBody>
+          <a:bodyPr wrap="square" lIns="91425" tIns="45700" rIns="91425" bIns="45700" anchor="b" anchorCtr="0">
+            <a:noAutofit/>
+          </a:bodyPr>
+          <a:lstStyle/>
+          <a:p>
+            <a:pPr marL="0" marR="0" lvl="0" indent="-203200" algn="l" rtl="0">
+              <a:spcBef>
+                <a:spcPts val="0"/>
+              </a:spcBef>
+              <a:buClr>
+                <a:schemeClr val="dk1"/>
+              </a:buClr>
+              <a:buSzPct val="100000"/>
+              <a:buFont typeface="Calibri"/>
+              <a:buNone/>
+            </a:pPr>
+            <a:r>
+              <a:rPr lang="de-AT" sz="3200" b="1" i="0" u="none" strike="noStrike" cap="none" dirty="0">
+                <a:solidFill>
+                  <a:schemeClr val="dk1"/>
+                </a:solidFill>
+                <a:latin typeface="Calibri"/>
+                <a:ea typeface="Calibri"/>
+                <a:cs typeface="Calibri"/>
+                <a:sym typeface="Calibri"/>
+              </a:rPr>
+              <a:t>User Stories </a:t>
+            </a:r>
+            <a:r>
+              <a:rPr lang="de-AT" sz="3200" b="1" i="0" u="none" strike="noStrike" cap="none" dirty="0" err="1">
+                <a:solidFill>
+                  <a:schemeClr val="dk1"/>
+                </a:solidFill>
+                <a:latin typeface="Calibri"/>
+                <a:ea typeface="Calibri"/>
+                <a:cs typeface="Calibri"/>
+                <a:sym typeface="Calibri"/>
+              </a:rPr>
+              <a:t>ctd</a:t>
+            </a:r>
+            <a:r>
+              <a:rPr lang="de-AT" sz="3200" b="1" i="0" u="none" strike="noStrike" cap="none" dirty="0">
+                <a:solidFill>
+                  <a:schemeClr val="dk1"/>
+                </a:solidFill>
+                <a:latin typeface="Calibri"/>
+                <a:ea typeface="Calibri"/>
+                <a:cs typeface="Calibri"/>
+                <a:sym typeface="Calibri"/>
+              </a:rPr>
+              <a:t>. </a:t>
+            </a:r>
+          </a:p>
+        </p:txBody>
+      </p:sp>
+      <p:sp>
+        <p:nvSpPr>
+          <p:cNvPr id="169" name="Shape 169"/>
+          <p:cNvSpPr txBox="1">
+            <a:spLocks noGrp="1"/>
+          </p:cNvSpPr>
+          <p:nvPr>
+            <p:ph type="body" idx="1"/>
+          </p:nvPr>
+        </p:nvSpPr>
+        <p:spPr>
+          <a:xfrm>
+            <a:off x="269875" y="2344057"/>
+            <a:ext cx="8604300" cy="3748800"/>
+          </a:xfrm>
+          <a:prstGeom prst="rect">
+            <a:avLst/>
+          </a:prstGeom>
+          <a:noFill/>
+          <a:ln>
+            <a:noFill/>
+          </a:ln>
+        </p:spPr>
+        <p:txBody>
+          <a:bodyPr wrap="square" lIns="91425" tIns="45700" rIns="91425" bIns="45700" anchor="t" anchorCtr="0">
+            <a:noAutofit/>
+          </a:bodyPr>
+          <a:lstStyle/>
+          <a:p>
+            <a:pPr marL="457200" lvl="0" indent="-381000">
+              <a:lnSpc>
+                <a:spcPct val="115000"/>
+              </a:lnSpc>
+              <a:spcBef>
+                <a:spcPts val="0"/>
+              </a:spcBef>
+              <a:buChar char="●"/>
+            </a:pPr>
+            <a:r>
+              <a:rPr lang="de-AT" dirty="0"/>
+              <a:t>As a </a:t>
+            </a:r>
+            <a:r>
+              <a:rPr lang="de-AT" dirty="0" err="1"/>
+              <a:t>user</a:t>
+            </a:r>
+            <a:r>
+              <a:rPr lang="de-AT" dirty="0"/>
+              <a:t>, I </a:t>
+            </a:r>
+            <a:r>
+              <a:rPr lang="de-AT" dirty="0" err="1"/>
+              <a:t>want</a:t>
+            </a:r>
+            <a:r>
+              <a:rPr lang="de-AT" dirty="0"/>
+              <a:t> </a:t>
+            </a:r>
+            <a:r>
+              <a:rPr lang="de-AT" dirty="0" err="1"/>
+              <a:t>to</a:t>
+            </a:r>
+            <a:r>
+              <a:rPr lang="de-AT" dirty="0"/>
+              <a:t> </a:t>
+            </a:r>
+            <a:r>
+              <a:rPr lang="de-AT" dirty="0" err="1"/>
+              <a:t>see</a:t>
+            </a:r>
+            <a:r>
+              <a:rPr lang="de-AT" dirty="0"/>
+              <a:t> </a:t>
+            </a:r>
+            <a:r>
+              <a:rPr lang="de-AT" dirty="0" err="1"/>
+              <a:t>how</a:t>
+            </a:r>
+            <a:r>
+              <a:rPr lang="de-AT" dirty="0"/>
+              <a:t> </a:t>
+            </a:r>
+            <a:r>
+              <a:rPr lang="de-AT" dirty="0" err="1"/>
+              <a:t>far</a:t>
+            </a:r>
+            <a:r>
+              <a:rPr lang="de-AT" dirty="0"/>
+              <a:t> </a:t>
+            </a:r>
+            <a:r>
+              <a:rPr lang="de-AT" dirty="0" err="1"/>
+              <a:t>away</a:t>
+            </a:r>
+            <a:r>
+              <a:rPr lang="de-AT" dirty="0"/>
+              <a:t> </a:t>
+            </a:r>
+            <a:r>
+              <a:rPr lang="de-AT" dirty="0" err="1"/>
+              <a:t>the</a:t>
+            </a:r>
+            <a:r>
+              <a:rPr lang="de-AT" dirty="0"/>
+              <a:t> </a:t>
+            </a:r>
+            <a:r>
+              <a:rPr lang="de-AT" dirty="0" err="1"/>
+              <a:t>nearest</a:t>
+            </a:r>
+            <a:r>
+              <a:rPr lang="de-AT" dirty="0"/>
+              <a:t> </a:t>
+            </a:r>
+            <a:r>
+              <a:rPr lang="de-AT" dirty="0" err="1"/>
+              <a:t>police</a:t>
+            </a:r>
+            <a:r>
+              <a:rPr lang="de-AT" dirty="0"/>
+              <a:t> </a:t>
+            </a:r>
+            <a:r>
+              <a:rPr lang="de-AT" dirty="0" err="1"/>
+              <a:t>station</a:t>
+            </a:r>
+            <a:r>
+              <a:rPr lang="de-AT" dirty="0"/>
+              <a:t> </a:t>
+            </a:r>
+            <a:r>
+              <a:rPr lang="de-AT" dirty="0" err="1"/>
+              <a:t>is</a:t>
+            </a:r>
+            <a:r>
+              <a:rPr lang="de-AT"/>
+              <a:t>.</a:t>
+            </a:r>
+          </a:p>
+          <a:p>
+            <a:pPr marL="457200" lvl="0" indent="-381000">
+              <a:lnSpc>
+                <a:spcPct val="115000"/>
+              </a:lnSpc>
+              <a:spcBef>
+                <a:spcPts val="0"/>
+              </a:spcBef>
+              <a:buChar char="●"/>
+            </a:pPr>
+            <a:endParaRPr lang="de-AT" dirty="0"/>
+          </a:p>
+          <a:p>
+            <a:pPr marL="457200" lvl="0" indent="-381000">
+              <a:lnSpc>
+                <a:spcPct val="115000"/>
+              </a:lnSpc>
+              <a:spcBef>
+                <a:spcPts val="0"/>
+              </a:spcBef>
+              <a:buChar char="●"/>
+            </a:pPr>
+            <a:r>
+              <a:rPr lang="de-AT" dirty="0"/>
+              <a:t>As a </a:t>
+            </a:r>
+            <a:r>
+              <a:rPr lang="de-AT" dirty="0" err="1"/>
+              <a:t>user</a:t>
+            </a:r>
+            <a:r>
+              <a:rPr lang="de-AT" dirty="0"/>
+              <a:t>, I </a:t>
+            </a:r>
+            <a:r>
+              <a:rPr lang="de-AT" dirty="0" err="1"/>
+              <a:t>want</a:t>
+            </a:r>
+            <a:r>
+              <a:rPr lang="de-AT" dirty="0"/>
+              <a:t> </a:t>
+            </a:r>
+            <a:r>
+              <a:rPr lang="de-AT" dirty="0" err="1"/>
+              <a:t>my</a:t>
+            </a:r>
+            <a:r>
+              <a:rPr lang="de-AT" dirty="0"/>
+              <a:t> </a:t>
+            </a:r>
+            <a:r>
+              <a:rPr lang="de-AT" dirty="0" err="1"/>
+              <a:t>emergency</a:t>
+            </a:r>
+            <a:r>
+              <a:rPr lang="de-AT" dirty="0"/>
+              <a:t> </a:t>
+            </a:r>
+            <a:r>
+              <a:rPr lang="de-AT" dirty="0" err="1"/>
+              <a:t>contacts</a:t>
+            </a:r>
+            <a:r>
+              <a:rPr lang="de-AT" dirty="0"/>
+              <a:t> </a:t>
+            </a:r>
+            <a:r>
+              <a:rPr lang="de-AT" dirty="0" err="1"/>
+              <a:t>to</a:t>
+            </a:r>
+            <a:r>
+              <a:rPr lang="de-AT" dirty="0"/>
+              <a:t> </a:t>
+            </a:r>
+            <a:r>
+              <a:rPr lang="de-AT" dirty="0" err="1"/>
+              <a:t>be</a:t>
+            </a:r>
+            <a:r>
+              <a:rPr lang="de-AT" dirty="0"/>
+              <a:t> </a:t>
+            </a:r>
+            <a:r>
+              <a:rPr lang="de-AT" dirty="0" err="1"/>
+              <a:t>alerted</a:t>
+            </a:r>
+            <a:r>
+              <a:rPr lang="de-AT" dirty="0"/>
+              <a:t> in </a:t>
+            </a:r>
+            <a:r>
+              <a:rPr lang="de-AT" dirty="0" err="1"/>
+              <a:t>case</a:t>
+            </a:r>
+            <a:r>
+              <a:rPr lang="de-AT" dirty="0"/>
+              <a:t> </a:t>
+            </a:r>
+            <a:r>
+              <a:rPr lang="de-AT" dirty="0" err="1"/>
+              <a:t>my</a:t>
+            </a:r>
+            <a:r>
+              <a:rPr lang="de-AT" dirty="0"/>
+              <a:t> </a:t>
+            </a:r>
+            <a:r>
+              <a:rPr lang="de-AT" dirty="0" err="1"/>
+              <a:t>heart</a:t>
+            </a:r>
+            <a:r>
+              <a:rPr lang="de-AT" dirty="0"/>
+              <a:t> </a:t>
+            </a:r>
+            <a:r>
+              <a:rPr lang="de-AT" dirty="0" err="1"/>
+              <a:t>stops</a:t>
+            </a:r>
+            <a:r>
+              <a:rPr lang="de-AT" dirty="0"/>
+              <a:t> </a:t>
+            </a:r>
+            <a:r>
+              <a:rPr lang="de-AT" dirty="0" err="1"/>
+              <a:t>or</a:t>
+            </a:r>
+            <a:r>
+              <a:rPr lang="de-AT" dirty="0"/>
+              <a:t> </a:t>
+            </a:r>
+            <a:r>
+              <a:rPr lang="de-AT" dirty="0" err="1"/>
+              <a:t>the</a:t>
+            </a:r>
+            <a:r>
+              <a:rPr lang="de-AT" dirty="0"/>
+              <a:t> </a:t>
+            </a:r>
+            <a:r>
+              <a:rPr lang="de-AT" dirty="0" err="1"/>
+              <a:t>heartrate</a:t>
+            </a:r>
+            <a:r>
+              <a:rPr lang="de-AT" dirty="0"/>
+              <a:t> </a:t>
+            </a:r>
+            <a:r>
+              <a:rPr lang="de-AT" dirty="0" err="1"/>
+              <a:t>rises</a:t>
+            </a:r>
+            <a:r>
+              <a:rPr lang="de-AT" dirty="0"/>
+              <a:t> </a:t>
+            </a:r>
+            <a:r>
+              <a:rPr lang="de-AT" dirty="0" err="1"/>
+              <a:t>above</a:t>
+            </a:r>
+            <a:r>
+              <a:rPr lang="de-AT" dirty="0"/>
+              <a:t> a </a:t>
+            </a:r>
+            <a:r>
+              <a:rPr lang="de-AT" dirty="0" err="1"/>
+              <a:t>pre-defined</a:t>
+            </a:r>
+            <a:r>
+              <a:rPr lang="de-AT" dirty="0"/>
+              <a:t> </a:t>
+            </a:r>
+            <a:r>
+              <a:rPr lang="de-AT" dirty="0" err="1"/>
+              <a:t>threshold</a:t>
+            </a:r>
+            <a:r>
+              <a:rPr lang="de-AT" dirty="0"/>
+              <a:t>.</a:t>
+            </a:r>
+          </a:p>
+          <a:p>
+            <a:pPr lvl="0" rtl="0">
+              <a:lnSpc>
+                <a:spcPct val="115000"/>
+              </a:lnSpc>
+              <a:spcBef>
+                <a:spcPts val="0"/>
+              </a:spcBef>
+              <a:buNone/>
+            </a:pPr>
+            <a:endParaRPr dirty="0"/>
+          </a:p>
+        </p:txBody>
+      </p:sp>
+      <p:sp>
+        <p:nvSpPr>
+          <p:cNvPr id="170" name="Shape 170"/>
           <p:cNvSpPr txBox="1">
             <a:spLocks noGrp="1"/>
           </p:cNvSpPr>
@@ -23887,7 +24451,7 @@
         <p:spPr>
           <a:xfrm>
             <a:off x="264980" y="6356350"/>
-            <a:ext cx="2133600" cy="365125"/>
+            <a:ext cx="2133600" cy="365100"/>
           </a:xfrm>
           <a:prstGeom prst="rect">
             <a:avLst/>
@@ -23927,7 +24491,7 @@
       </p:sp>
       <p:sp>
         <p:nvSpPr>
-          <p:cNvPr id="178" name="Shape 178"/>
+          <p:cNvPr id="171" name="Shape 171"/>
           <p:cNvSpPr txBox="1">
             <a:spLocks noGrp="1"/>
           </p:cNvSpPr>
@@ -23962,7 +24526,7 @@
               <a:buNone/>
             </a:pPr>
             <a:r>
-              <a:rPr lang="de-AT" sz="1000" dirty="0" smtClean="0">
+              <a:rPr lang="de-AT" sz="1000">
                 <a:solidFill>
                   <a:srgbClr val="888888"/>
                 </a:solidFill>
@@ -23973,21 +24537,12 @@
               </a:rPr>
               <a:t>IMS16</a:t>
             </a:r>
-            <a:endParaRPr lang="de-AT" sz="1000" dirty="0">
-              <a:solidFill>
-                <a:srgbClr val="888888"/>
-              </a:solidFill>
-              <a:latin typeface="Calibri"/>
-              <a:ea typeface="Calibri"/>
-              <a:cs typeface="Calibri"/>
-              <a:sym typeface="Calibri"/>
-            </a:endParaRPr>
           </a:p>
         </p:txBody>
       </p:sp>
       <p:sp>
         <p:nvSpPr>
-          <p:cNvPr id="179" name="Shape 179"/>
+          <p:cNvPr id="172" name="Shape 172"/>
           <p:cNvSpPr txBox="1">
             <a:spLocks noGrp="1"/>
           </p:cNvSpPr>
@@ -23998,7 +24553,7 @@
         <p:spPr>
           <a:xfrm>
             <a:off x="6738555" y="6356350"/>
-            <a:ext cx="2133600" cy="365125"/>
+            <a:ext cx="2133600" cy="365100"/>
           </a:xfrm>
           <a:prstGeom prst="rect">
             <a:avLst/>
@@ -24045,34 +24600,12 @@
           </a:p>
         </p:txBody>
       </p:sp>
-      <p:pic>
-        <p:nvPicPr>
-          <p:cNvPr id="180" name="Shape 180"/>
-          <p:cNvPicPr preferRelativeResize="0"/>
-          <p:nvPr/>
-        </p:nvPicPr>
-        <p:blipFill rotWithShape="1">
-          <a:blip r:embed="rId3">
-            <a:alphaModFix/>
-          </a:blip>
-          <a:srcRect t="-8936" b="14068"/>
-          <a:stretch/>
-        </p:blipFill>
-        <p:spPr>
-          <a:xfrm>
-            <a:off x="2603895" y="765938"/>
-            <a:ext cx="3484976" cy="5538250"/>
-          </a:xfrm>
-          <a:prstGeom prst="rect">
-            <a:avLst/>
-          </a:prstGeom>
-          <a:noFill/>
-          <a:ln>
-            <a:noFill/>
-          </a:ln>
-        </p:spPr>
-      </p:pic>
     </p:spTree>
+    <p:extLst>
+      <p:ext uri="{BB962C8B-B14F-4D97-AF65-F5344CB8AC3E}">
+        <p14:creationId xmlns:p14="http://schemas.microsoft.com/office/powerpoint/2010/main" val="1392398344"/>
+      </p:ext>
+    </p:extLst>
   </p:cSld>
   <p:clrMapOvr>
     <a:masterClrMapping/>
@@ -24185,7 +24718,7 @@
               <a:buNone/>
             </a:pPr>
             <a:r>
-              <a:rPr lang="de-AT" sz="1000" dirty="0" smtClean="0">
+              <a:rPr lang="de-AT" sz="1000" dirty="0">
                 <a:solidFill>
                   <a:srgbClr val="888888"/>
                 </a:solidFill>
@@ -24196,15 +24729,6 @@
               </a:rPr>
               <a:t>IMS16</a:t>
             </a:r>
-            <a:endParaRPr lang="de-AT" sz="1000" dirty="0">
-              <a:solidFill>
-                <a:srgbClr val="888888"/>
-              </a:solidFill>
-              <a:latin typeface="Calibri"/>
-              <a:ea typeface="Calibri"/>
-              <a:cs typeface="Calibri"/>
-              <a:sym typeface="Calibri"/>
-            </a:endParaRPr>
           </a:p>
         </p:txBody>
       </p:sp>
@@ -24270,7 +24794,7 @@
       </p:sp>
       <p:pic>
         <p:nvPicPr>
-          <p:cNvPr id="181" name="Shape 181"/>
+          <p:cNvPr id="180" name="Shape 180"/>
           <p:cNvPicPr preferRelativeResize="0"/>
           <p:nvPr/>
         </p:nvPicPr>
@@ -24278,13 +24802,13 @@
           <a:blip r:embed="rId3">
             <a:alphaModFix/>
           </a:blip>
-          <a:srcRect t="-7210" b="7210"/>
+          <a:srcRect t="-8936" b="14068"/>
           <a:stretch/>
         </p:blipFill>
         <p:spPr>
           <a:xfrm>
-            <a:off x="2962340" y="860200"/>
-            <a:ext cx="3306101" cy="5443973"/>
+            <a:off x="2603895" y="765938"/>
+            <a:ext cx="3484976" cy="5538250"/>
           </a:xfrm>
           <a:prstGeom prst="rect">
             <a:avLst/>
@@ -24296,11 +24820,6 @@
         </p:spPr>
       </p:pic>
     </p:spTree>
-    <p:extLst>
-      <p:ext uri="{BB962C8B-B14F-4D97-AF65-F5344CB8AC3E}">
-        <p14:creationId xmlns:p14="http://schemas.microsoft.com/office/powerpoint/2010/main" val="3925748778"/>
-      </p:ext>
-    </p:extLst>
   </p:cSld>
   <p:clrMapOvr>
     <a:masterClrMapping/>

</xml_diff>